<commit_message>
slide and code updates
</commit_message>
<xml_diff>
--- a/slides/r_slides.pptx
+++ b/slides/r_slides.pptx
@@ -226,7 +226,7 @@
           <a:p>
             <a:fld id="{2EF9E3F5-87A8-46BA-A07D-41DEE1AB9BCE}" type="datetimeFigureOut">
               <a:rPr lang="en-US" smtClean="0"/>
-              <a:t>5/15/2017</a:t>
+              <a:t>5/27/2017</a:t>
             </a:fld>
             <a:endParaRPr lang="en-US"/>
           </a:p>
@@ -656,6 +656,23 @@
           <a:p>
             <a:r>
               <a:rPr lang="en-US" dirty="0"/>
+              <a:t>There are other languages: Julia, Go, </a:t>
+            </a:r>
+            <a:r>
+              <a:rPr lang="en-US" dirty="0" err="1"/>
+              <a:t>etc</a:t>
+            </a:r>
+            <a:r>
+              <a:rPr lang="en-US" dirty="0"/>
+              <a:t>…</a:t>
+            </a:r>
+          </a:p>
+          <a:p>
+            <a:endParaRPr lang="en-US" dirty="0"/>
+          </a:p>
+          <a:p>
+            <a:r>
+              <a:rPr lang="en-US" dirty="0"/>
               <a:t>http://www.infoworld.com/article/3049672/application-development/which-freaking-big-data-programming-language-should-i-use.html</a:t>
             </a:r>
           </a:p>
@@ -788,6 +805,18 @@
             </a:r>
           </a:p>
           <a:p>
+            <a:endParaRPr lang="en-US" dirty="0"/>
+          </a:p>
+          <a:p>
+            <a:r>
+              <a:rPr lang="en-US" dirty="0"/>
+              <a:t>Consultant answer – it depends. </a:t>
+            </a:r>
+          </a:p>
+          <a:p>
+            <a:endParaRPr lang="en-US" dirty="0"/>
+          </a:p>
+          <a:p>
             <a:r>
               <a:rPr lang="en-US" dirty="0"/>
               <a:t>Each has their own flavor and advantages. </a:t>
@@ -887,7 +916,7 @@
           <a:p>
             <a:r>
               <a:rPr lang="en-US" dirty="0"/>
-              <a:t>I’m personally an advocate of the polyglot approach. Learn them both… </a:t>
+              <a:t>I’m personally an advocate of the polyglot approach. Learn them all… </a:t>
             </a:r>
           </a:p>
           <a:p>
@@ -2168,10 +2197,7 @@
           <a:bodyPr/>
           <a:lstStyle/>
           <a:p>
-            <a:r>
-              <a:rPr lang="en-US" dirty="0"/>
-              <a:t>Stats and machine learning definitely</a:t>
-            </a:r>
+            <a:endParaRPr lang="en-US" dirty="0"/>
           </a:p>
         </p:txBody>
       </p:sp>
@@ -2597,53 +2623,7 @@
             </a:pPr>
             <a:r>
               <a:rPr lang="en-US" sz="1200" dirty="0"/>
-              <a:t>There’s lots of ways to use R</a:t>
-            </a:r>
-          </a:p>
-          <a:p>
-            <a:pPr marL="0" indent="0">
-              <a:buNone/>
-            </a:pPr>
-            <a:r>
-              <a:rPr lang="en-US" sz="1200" dirty="0"/>
-              <a:t>- Microsoft, </a:t>
-            </a:r>
-            <a:r>
-              <a:rPr lang="en-US" sz="1200" dirty="0" err="1"/>
-              <a:t>Rstudio</a:t>
-            </a:r>
-            <a:r>
-              <a:rPr lang="en-US" sz="1200" dirty="0"/>
-              <a:t>, SQL Server, Notebooks, </a:t>
-            </a:r>
-            <a:r>
-              <a:rPr lang="en-US" sz="1200" dirty="0" err="1"/>
-              <a:t>etc</a:t>
-            </a:r>
-            <a:r>
-              <a:rPr lang="en-US" sz="1200" dirty="0"/>
-              <a:t>… </a:t>
-            </a:r>
-          </a:p>
-          <a:p>
-            <a:pPr marL="0" indent="0">
-              <a:buNone/>
-            </a:pPr>
-            <a:endParaRPr lang="en-US" sz="1200" dirty="0"/>
-          </a:p>
-          <a:p>
-            <a:pPr marL="0" indent="0">
-              <a:buNone/>
-            </a:pPr>
-            <a:endParaRPr lang="en-US" sz="1200" dirty="0"/>
-          </a:p>
-          <a:p>
-            <a:pPr marL="0" indent="0">
-              <a:buNone/>
-            </a:pPr>
-            <a:r>
-              <a:rPr lang="en-US" sz="1200" dirty="0"/>
-              <a:t>R is a fantastic data exploration tool</a:t>
+              <a:t>R is a great way to learn about stats</a:t>
             </a:r>
           </a:p>
           <a:p>
@@ -2652,8 +2632,50 @@
               <a:buChar char="-"/>
             </a:pPr>
             <a:r>
+              <a:rPr lang="en-US" sz="1200" dirty="0"/>
+              <a:t>there’s lots of built in help and datasets to learn from</a:t>
+            </a:r>
+          </a:p>
+          <a:p>
+            <a:pPr marL="171450" indent="-171450">
+              <a:buFontTx/>
+              <a:buChar char="-"/>
+            </a:pPr>
+            <a:endParaRPr lang="en-US" sz="1200" dirty="0"/>
+          </a:p>
+          <a:p>
+            <a:pPr marL="0" indent="0">
+              <a:buNone/>
+            </a:pPr>
+            <a:endParaRPr lang="en-US" sz="1200" dirty="0"/>
+          </a:p>
+          <a:p>
+            <a:pPr marL="0" indent="0">
+              <a:buNone/>
+            </a:pPr>
+            <a:r>
+              <a:rPr lang="en-US" sz="1200" dirty="0"/>
+              <a:t>R is a fantastic data exploration tool</a:t>
+            </a:r>
+          </a:p>
+          <a:p>
+            <a:pPr marL="171450" indent="-171450">
+              <a:buFontTx/>
+              <a:buChar char="-"/>
+            </a:pPr>
+            <a:r>
               <a:rPr lang="en-US" dirty="0"/>
               <a:t>It can slice and dice datasets with ease</a:t>
+            </a:r>
+          </a:p>
+          <a:p>
+            <a:pPr marL="171450" indent="-171450">
+              <a:buFontTx/>
+              <a:buChar char="-"/>
+            </a:pPr>
+            <a:r>
+              <a:rPr lang="en-US" dirty="0"/>
+              <a:t>It’s usable in a variety of ways</a:t>
             </a:r>
           </a:p>
           <a:p>
@@ -2946,7 +2968,7 @@
             </a:pPr>
             <a:r>
               <a:rPr lang="en-US" dirty="0"/>
-              <a:t>- Logs, usage stats, creepy tracking stuff</a:t>
+              <a:t>- Logs, usage stats, creepy tracking stuff (that makes you want to put on a tinfoil hat and live in the woods) </a:t>
             </a:r>
           </a:p>
           <a:p>
@@ -3279,6 +3301,21 @@
               <a:t>(This article talks about how the massive data stores of big companies gives them a huge competitive advantage)</a:t>
             </a:r>
           </a:p>
+          <a:p>
+            <a:endParaRPr lang="en-US" dirty="0"/>
+          </a:p>
+          <a:p>
+            <a:r>
+              <a:rPr lang="en-US" dirty="0"/>
+              <a:t>There’s money to be made on data. </a:t>
+            </a:r>
+          </a:p>
+          <a:p>
+            <a:r>
+              <a:rPr lang="en-US" dirty="0"/>
+              <a:t>If you like money, data is for you. </a:t>
+            </a:r>
+          </a:p>
         </p:txBody>
       </p:sp>
       <p:sp>
@@ -3904,7 +3941,7 @@
           <a:p>
             <a:fld id="{0E462D58-24D5-460E-A073-5F56B9E1F7E7}" type="datetimeFigureOut">
               <a:rPr lang="en-US" smtClean="0"/>
-              <a:t>5/15/2017</a:t>
+              <a:t>5/27/2017</a:t>
             </a:fld>
             <a:endParaRPr lang="en-US"/>
           </a:p>
@@ -4072,7 +4109,7 @@
           <a:p>
             <a:fld id="{0E462D58-24D5-460E-A073-5F56B9E1F7E7}" type="datetimeFigureOut">
               <a:rPr lang="en-US" smtClean="0"/>
-              <a:t>5/15/2017</a:t>
+              <a:t>5/27/2017</a:t>
             </a:fld>
             <a:endParaRPr lang="en-US"/>
           </a:p>
@@ -4250,7 +4287,7 @@
           <a:p>
             <a:fld id="{0E462D58-24D5-460E-A073-5F56B9E1F7E7}" type="datetimeFigureOut">
               <a:rPr lang="en-US" smtClean="0"/>
-              <a:t>5/15/2017</a:t>
+              <a:t>5/27/2017</a:t>
             </a:fld>
             <a:endParaRPr lang="en-US"/>
           </a:p>
@@ -4418,7 +4455,7 @@
           <a:p>
             <a:fld id="{0E462D58-24D5-460E-A073-5F56B9E1F7E7}" type="datetimeFigureOut">
               <a:rPr lang="en-US" smtClean="0"/>
-              <a:t>5/15/2017</a:t>
+              <a:t>5/27/2017</a:t>
             </a:fld>
             <a:endParaRPr lang="en-US"/>
           </a:p>
@@ -4663,7 +4700,7 @@
           <a:p>
             <a:fld id="{0E462D58-24D5-460E-A073-5F56B9E1F7E7}" type="datetimeFigureOut">
               <a:rPr lang="en-US" smtClean="0"/>
-              <a:t>5/15/2017</a:t>
+              <a:t>5/27/2017</a:t>
             </a:fld>
             <a:endParaRPr lang="en-US"/>
           </a:p>
@@ -4892,7 +4929,7 @@
           <a:p>
             <a:fld id="{0E462D58-24D5-460E-A073-5F56B9E1F7E7}" type="datetimeFigureOut">
               <a:rPr lang="en-US" smtClean="0"/>
-              <a:t>5/15/2017</a:t>
+              <a:t>5/27/2017</a:t>
             </a:fld>
             <a:endParaRPr lang="en-US"/>
           </a:p>
@@ -5256,7 +5293,7 @@
           <a:p>
             <a:fld id="{0E462D58-24D5-460E-A073-5F56B9E1F7E7}" type="datetimeFigureOut">
               <a:rPr lang="en-US" smtClean="0"/>
-              <a:t>5/15/2017</a:t>
+              <a:t>5/27/2017</a:t>
             </a:fld>
             <a:endParaRPr lang="en-US"/>
           </a:p>
@@ -5373,7 +5410,7 @@
           <a:p>
             <a:fld id="{0E462D58-24D5-460E-A073-5F56B9E1F7E7}" type="datetimeFigureOut">
               <a:rPr lang="en-US" smtClean="0"/>
-              <a:t>5/15/2017</a:t>
+              <a:t>5/27/2017</a:t>
             </a:fld>
             <a:endParaRPr lang="en-US"/>
           </a:p>
@@ -5468,7 +5505,7 @@
           <a:p>
             <a:fld id="{0E462D58-24D5-460E-A073-5F56B9E1F7E7}" type="datetimeFigureOut">
               <a:rPr lang="en-US" smtClean="0"/>
-              <a:t>5/15/2017</a:t>
+              <a:t>5/27/2017</a:t>
             </a:fld>
             <a:endParaRPr lang="en-US"/>
           </a:p>
@@ -5743,7 +5780,7 @@
           <a:p>
             <a:fld id="{0E462D58-24D5-460E-A073-5F56B9E1F7E7}" type="datetimeFigureOut">
               <a:rPr lang="en-US" smtClean="0"/>
-              <a:t>5/15/2017</a:t>
+              <a:t>5/27/2017</a:t>
             </a:fld>
             <a:endParaRPr lang="en-US"/>
           </a:p>
@@ -5995,7 +6032,7 @@
           <a:p>
             <a:fld id="{0E462D58-24D5-460E-A073-5F56B9E1F7E7}" type="datetimeFigureOut">
               <a:rPr lang="en-US" smtClean="0"/>
-              <a:t>5/15/2017</a:t>
+              <a:t>5/27/2017</a:t>
             </a:fld>
             <a:endParaRPr lang="en-US"/>
           </a:p>
@@ -6213,7 +6250,7 @@
           <a:p>
             <a:fld id="{0E462D58-24D5-460E-A073-5F56B9E1F7E7}" type="datetimeFigureOut">
               <a:rPr lang="en-US" smtClean="0"/>
-              <a:t>5/15/2017</a:t>
+              <a:t>5/27/2017</a:t>
             </a:fld>
             <a:endParaRPr lang="en-US" dirty="0"/>
           </a:p>
@@ -6824,7 +6861,12 @@
             <p:ph idx="1"/>
           </p:nvPr>
         </p:nvSpPr>
-        <p:spPr/>
+        <p:spPr>
+          <a:xfrm>
+            <a:off x="838200" y="1825625"/>
+            <a:ext cx="5586454" cy="4351338"/>
+          </a:xfrm>
+        </p:spPr>
         <p:txBody>
           <a:bodyPr>
             <a:normAutofit/>
@@ -6836,15 +6878,6 @@
             </a:pPr>
             <a:r>
               <a:rPr lang="en-US" sz="3600" dirty="0"/>
-              <a:t>Data Analysis Languages</a:t>
-            </a:r>
-          </a:p>
-          <a:p>
-            <a:pPr marL="0" indent="0">
-              <a:buNone/>
-            </a:pPr>
-            <a:r>
-              <a:rPr lang="en-US" sz="3600" dirty="0"/>
               <a:t>Why R? </a:t>
             </a:r>
           </a:p>
@@ -6864,15 +6897,6 @@
             <a:r>
               <a:rPr lang="en-US" sz="3600" dirty="0"/>
               <a:t>A Brief Tour of R</a:t>
-            </a:r>
-          </a:p>
-          <a:p>
-            <a:pPr marL="0" indent="0">
-              <a:buNone/>
-            </a:pPr>
-            <a:r>
-              <a:rPr lang="en-US" sz="3600" dirty="0"/>
-              <a:t>R Recipes (Demos)</a:t>
             </a:r>
           </a:p>
         </p:txBody>
@@ -6929,7 +6953,7 @@
           <a:p>
             <a:r>
               <a:rPr lang="en-US" dirty="0"/>
-              <a:t>Popular Data Science Languages</a:t>
+              <a:t>Popular Data Analysis Languages</a:t>
             </a:r>
           </a:p>
         </p:txBody>
@@ -8752,7 +8776,7 @@
             </a:pPr>
             <a:r>
               <a:rPr lang="en-US" sz="3600" dirty="0"/>
-              <a:t>There’s lots of ways to use R</a:t>
+              <a:t>R is great for learning</a:t>
             </a:r>
           </a:p>
           <a:p>
@@ -8767,20 +8791,8 @@
             </a:pPr>
             <a:r>
               <a:rPr lang="en-US" sz="3600" dirty="0"/>
-              <a:t>R is a fantastic data exploration tool</a:t>
-            </a:r>
-          </a:p>
-          <a:p>
-            <a:pPr marL="0" indent="0">
-              <a:buNone/>
-            </a:pPr>
-            <a:endParaRPr lang="en-US" sz="3600" dirty="0"/>
-          </a:p>
-          <a:p>
-            <a:pPr marL="0" indent="0">
-              <a:buNone/>
-            </a:pPr>
-            <a:endParaRPr lang="en-US" sz="3600" dirty="0"/>
+              <a:t>R is great for data exploration</a:t>
+            </a:r>
           </a:p>
         </p:txBody>
       </p:sp>

</xml_diff>

<commit_message>
Assorted improvements to the demos and slides
</commit_message>
<xml_diff>
--- a/slides/r_slides.pptx
+++ b/slides/r_slides.pptx
@@ -5,35 +5,36 @@
     <p:sldMasterId id="2147483648" r:id="rId1"/>
   </p:sldMasterIdLst>
   <p:notesMasterIdLst>
-    <p:notesMasterId r:id="rId28"/>
+    <p:notesMasterId r:id="rId29"/>
   </p:notesMasterIdLst>
   <p:sldIdLst>
     <p:sldId id="256" r:id="rId2"/>
     <p:sldId id="306" r:id="rId3"/>
-    <p:sldId id="329" r:id="rId4"/>
-    <p:sldId id="316" r:id="rId5"/>
-    <p:sldId id="333" r:id="rId6"/>
-    <p:sldId id="327" r:id="rId7"/>
-    <p:sldId id="309" r:id="rId8"/>
-    <p:sldId id="328" r:id="rId9"/>
-    <p:sldId id="315" r:id="rId10"/>
-    <p:sldId id="310" r:id="rId11"/>
-    <p:sldId id="319" r:id="rId12"/>
-    <p:sldId id="334" r:id="rId13"/>
-    <p:sldId id="326" r:id="rId14"/>
-    <p:sldId id="321" r:id="rId15"/>
-    <p:sldId id="324" r:id="rId16"/>
-    <p:sldId id="325" r:id="rId17"/>
-    <p:sldId id="323" r:id="rId18"/>
-    <p:sldId id="332" r:id="rId19"/>
-    <p:sldId id="330" r:id="rId20"/>
-    <p:sldId id="331" r:id="rId21"/>
-    <p:sldId id="298" r:id="rId22"/>
-    <p:sldId id="280" r:id="rId23"/>
-    <p:sldId id="337" r:id="rId24"/>
-    <p:sldId id="336" r:id="rId25"/>
-    <p:sldId id="335" r:id="rId26"/>
-    <p:sldId id="281" r:id="rId27"/>
+    <p:sldId id="310" r:id="rId4"/>
+    <p:sldId id="338" r:id="rId5"/>
+    <p:sldId id="329" r:id="rId6"/>
+    <p:sldId id="316" r:id="rId7"/>
+    <p:sldId id="333" r:id="rId8"/>
+    <p:sldId id="327" r:id="rId9"/>
+    <p:sldId id="309" r:id="rId10"/>
+    <p:sldId id="328" r:id="rId11"/>
+    <p:sldId id="315" r:id="rId12"/>
+    <p:sldId id="319" r:id="rId13"/>
+    <p:sldId id="334" r:id="rId14"/>
+    <p:sldId id="326" r:id="rId15"/>
+    <p:sldId id="321" r:id="rId16"/>
+    <p:sldId id="324" r:id="rId17"/>
+    <p:sldId id="325" r:id="rId18"/>
+    <p:sldId id="323" r:id="rId19"/>
+    <p:sldId id="332" r:id="rId20"/>
+    <p:sldId id="330" r:id="rId21"/>
+    <p:sldId id="331" r:id="rId22"/>
+    <p:sldId id="298" r:id="rId23"/>
+    <p:sldId id="280" r:id="rId24"/>
+    <p:sldId id="337" r:id="rId25"/>
+    <p:sldId id="336" r:id="rId26"/>
+    <p:sldId id="335" r:id="rId27"/>
+    <p:sldId id="281" r:id="rId28"/>
   </p:sldIdLst>
   <p:sldSz cx="12192000" cy="6858000"/>
   <p:notesSz cx="6858000" cy="9144000"/>
@@ -226,7 +227,7 @@
           <a:p>
             <a:fld id="{2EF9E3F5-87A8-46BA-A07D-41DEE1AB9BCE}" type="datetimeFigureOut">
               <a:rPr lang="en-US" smtClean="0"/>
-              <a:t>5/27/2017</a:t>
+              <a:t>5/31/2017</a:t>
             </a:fld>
             <a:endParaRPr lang="en-US"/>
           </a:p>
@@ -719,7 +720,7 @@
           <a:p>
             <a:fld id="{E5A097B1-DDF2-47DB-BEB4-A56B76E0BD07}" type="slidenum">
               <a:rPr lang="en-US" smtClean="0"/>
-              <a:t>11</a:t>
+              <a:t>12</a:t>
             </a:fld>
             <a:endParaRPr lang="en-US"/>
           </a:p>
@@ -941,7 +942,7 @@
           <a:p>
             <a:fld id="{E5A097B1-DDF2-47DB-BEB4-A56B76E0BD07}" type="slidenum">
               <a:rPr lang="en-US" smtClean="0"/>
-              <a:t>12</a:t>
+              <a:t>13</a:t>
             </a:fld>
             <a:endParaRPr lang="en-US"/>
           </a:p>
@@ -1049,7 +1050,7 @@
           <a:p>
             <a:fld id="{E5A097B1-DDF2-47DB-BEB4-A56B76E0BD07}" type="slidenum">
               <a:rPr lang="en-US" smtClean="0"/>
-              <a:t>14</a:t>
+              <a:t>15</a:t>
             </a:fld>
             <a:endParaRPr lang="en-US"/>
           </a:p>
@@ -1154,7 +1155,7 @@
           <a:p>
             <a:fld id="{E5A097B1-DDF2-47DB-BEB4-A56B76E0BD07}" type="slidenum">
               <a:rPr lang="en-US" smtClean="0"/>
-              <a:t>15</a:t>
+              <a:t>16</a:t>
             </a:fld>
             <a:endParaRPr lang="en-US"/>
           </a:p>
@@ -1280,7 +1281,7 @@
           <a:p>
             <a:fld id="{E5A097B1-DDF2-47DB-BEB4-A56B76E0BD07}" type="slidenum">
               <a:rPr lang="en-US" smtClean="0"/>
-              <a:t>16</a:t>
+              <a:t>17</a:t>
             </a:fld>
             <a:endParaRPr lang="en-US"/>
           </a:p>
@@ -1373,7 +1374,7 @@
           <a:p>
             <a:fld id="{E5A097B1-DDF2-47DB-BEB4-A56B76E0BD07}" type="slidenum">
               <a:rPr lang="en-US" smtClean="0"/>
-              <a:t>17</a:t>
+              <a:t>18</a:t>
             </a:fld>
             <a:endParaRPr lang="en-US"/>
           </a:p>
@@ -1490,7 +1491,7 @@
           <a:p>
             <a:fld id="{E5A097B1-DDF2-47DB-BEB4-A56B76E0BD07}" type="slidenum">
               <a:rPr lang="en-US" smtClean="0"/>
-              <a:t>18</a:t>
+              <a:t>19</a:t>
             </a:fld>
             <a:endParaRPr lang="en-US"/>
           </a:p>
@@ -1619,7 +1620,7 @@
           <a:p>
             <a:fld id="{E5A097B1-DDF2-47DB-BEB4-A56B76E0BD07}" type="slidenum">
               <a:rPr lang="en-US" smtClean="0"/>
-              <a:t>19</a:t>
+              <a:t>20</a:t>
             </a:fld>
             <a:endParaRPr lang="en-US"/>
           </a:p>
@@ -1772,7 +1773,7 @@
           <a:p>
             <a:fld id="{E5A097B1-DDF2-47DB-BEB4-A56B76E0BD07}" type="slidenum">
               <a:rPr lang="en-US" smtClean="0"/>
-              <a:t>20</a:t>
+              <a:t>21</a:t>
             </a:fld>
             <a:endParaRPr lang="en-US"/>
           </a:p>
@@ -1972,7 +1973,7 @@
           <a:p>
             <a:fld id="{E5A097B1-DDF2-47DB-BEB4-A56B76E0BD07}" type="slidenum">
               <a:rPr lang="en-US" smtClean="0"/>
-              <a:t>21</a:t>
+              <a:t>22</a:t>
             </a:fld>
             <a:endParaRPr lang="en-US"/>
           </a:p>
@@ -2218,7 +2219,7 @@
           <a:p>
             <a:fld id="{E5A097B1-DDF2-47DB-BEB4-A56B76E0BD07}" type="slidenum">
               <a:rPr lang="en-US" smtClean="0"/>
-              <a:t>22</a:t>
+              <a:t>23</a:t>
             </a:fld>
             <a:endParaRPr lang="en-US"/>
           </a:p>
@@ -2314,7 +2315,7 @@
           <a:p>
             <a:fld id="{E5A097B1-DDF2-47DB-BEB4-A56B76E0BD07}" type="slidenum">
               <a:rPr lang="en-US" smtClean="0"/>
-              <a:t>23</a:t>
+              <a:t>24</a:t>
             </a:fld>
             <a:endParaRPr lang="en-US"/>
           </a:p>
@@ -2410,7 +2411,7 @@
           <a:p>
             <a:fld id="{E5A097B1-DDF2-47DB-BEB4-A56B76E0BD07}" type="slidenum">
               <a:rPr lang="en-US" smtClean="0"/>
-              <a:t>24</a:t>
+              <a:t>25</a:t>
             </a:fld>
             <a:endParaRPr lang="en-US"/>
           </a:p>
@@ -2507,7 +2508,7 @@
           <a:p>
             <a:fld id="{E5A097B1-DDF2-47DB-BEB4-A56B76E0BD07}" type="slidenum">
               <a:rPr lang="en-US" smtClean="0"/>
-              <a:t>25</a:t>
+              <a:t>26</a:t>
             </a:fld>
             <a:endParaRPr lang="en-US"/>
           </a:p>
@@ -2731,7 +2732,7 @@
           <a:p>
             <a:fld id="{E5A097B1-DDF2-47DB-BEB4-A56B76E0BD07}" type="slidenum">
               <a:rPr lang="en-US" smtClean="0"/>
-              <a:t>26</a:t>
+              <a:t>27</a:t>
             </a:fld>
             <a:endParaRPr lang="en-US"/>
           </a:p>
@@ -3117,7 +3118,7 @@
           <a:p>
             <a:fld id="{E5A097B1-DDF2-47DB-BEB4-A56B76E0BD07}" type="slidenum">
               <a:rPr lang="en-US" smtClean="0"/>
-              <a:t>3</a:t>
+              <a:t>5</a:t>
             </a:fld>
             <a:endParaRPr lang="en-US"/>
           </a:p>
@@ -3227,7 +3228,7 @@
           <a:p>
             <a:fld id="{E5A097B1-DDF2-47DB-BEB4-A56B76E0BD07}" type="slidenum">
               <a:rPr lang="en-US" smtClean="0"/>
-              <a:t>4</a:t>
+              <a:t>6</a:t>
             </a:fld>
             <a:endParaRPr lang="en-US"/>
           </a:p>
@@ -3335,7 +3336,7 @@
           <a:p>
             <a:fld id="{E5A097B1-DDF2-47DB-BEB4-A56B76E0BD07}" type="slidenum">
               <a:rPr lang="en-US" smtClean="0"/>
-              <a:t>5</a:t>
+              <a:t>7</a:t>
             </a:fld>
             <a:endParaRPr lang="en-US"/>
           </a:p>
@@ -3470,7 +3471,7 @@
           <a:p>
             <a:fld id="{E5A097B1-DDF2-47DB-BEB4-A56B76E0BD07}" type="slidenum">
               <a:rPr lang="en-US" smtClean="0"/>
-              <a:t>6</a:t>
+              <a:t>8</a:t>
             </a:fld>
             <a:endParaRPr lang="en-US"/>
           </a:p>
@@ -3578,7 +3579,7 @@
           <a:p>
             <a:fld id="{E5A097B1-DDF2-47DB-BEB4-A56B76E0BD07}" type="slidenum">
               <a:rPr lang="en-US" smtClean="0"/>
-              <a:t>7</a:t>
+              <a:t>9</a:t>
             </a:fld>
             <a:endParaRPr lang="en-US"/>
           </a:p>
@@ -3674,7 +3675,7 @@
           <a:p>
             <a:fld id="{E5A097B1-DDF2-47DB-BEB4-A56B76E0BD07}" type="slidenum">
               <a:rPr lang="en-US" smtClean="0"/>
-              <a:t>8</a:t>
+              <a:t>10</a:t>
             </a:fld>
             <a:endParaRPr lang="en-US"/>
           </a:p>
@@ -3793,7 +3794,7 @@
           <a:p>
             <a:fld id="{E5A097B1-DDF2-47DB-BEB4-A56B76E0BD07}" type="slidenum">
               <a:rPr lang="en-US" smtClean="0"/>
-              <a:t>9</a:t>
+              <a:t>11</a:t>
             </a:fld>
             <a:endParaRPr lang="en-US"/>
           </a:p>
@@ -3941,7 +3942,7 @@
           <a:p>
             <a:fld id="{0E462D58-24D5-460E-A073-5F56B9E1F7E7}" type="datetimeFigureOut">
               <a:rPr lang="en-US" smtClean="0"/>
-              <a:t>5/27/2017</a:t>
+              <a:t>5/31/2017</a:t>
             </a:fld>
             <a:endParaRPr lang="en-US"/>
           </a:p>
@@ -4109,7 +4110,7 @@
           <a:p>
             <a:fld id="{0E462D58-24D5-460E-A073-5F56B9E1F7E7}" type="datetimeFigureOut">
               <a:rPr lang="en-US" smtClean="0"/>
-              <a:t>5/27/2017</a:t>
+              <a:t>5/31/2017</a:t>
             </a:fld>
             <a:endParaRPr lang="en-US"/>
           </a:p>
@@ -4287,7 +4288,7 @@
           <a:p>
             <a:fld id="{0E462D58-24D5-460E-A073-5F56B9E1F7E7}" type="datetimeFigureOut">
               <a:rPr lang="en-US" smtClean="0"/>
-              <a:t>5/27/2017</a:t>
+              <a:t>5/31/2017</a:t>
             </a:fld>
             <a:endParaRPr lang="en-US"/>
           </a:p>
@@ -4455,7 +4456,7 @@
           <a:p>
             <a:fld id="{0E462D58-24D5-460E-A073-5F56B9E1F7E7}" type="datetimeFigureOut">
               <a:rPr lang="en-US" smtClean="0"/>
-              <a:t>5/27/2017</a:t>
+              <a:t>5/31/2017</a:t>
             </a:fld>
             <a:endParaRPr lang="en-US"/>
           </a:p>
@@ -4700,7 +4701,7 @@
           <a:p>
             <a:fld id="{0E462D58-24D5-460E-A073-5F56B9E1F7E7}" type="datetimeFigureOut">
               <a:rPr lang="en-US" smtClean="0"/>
-              <a:t>5/27/2017</a:t>
+              <a:t>5/31/2017</a:t>
             </a:fld>
             <a:endParaRPr lang="en-US"/>
           </a:p>
@@ -4929,7 +4930,7 @@
           <a:p>
             <a:fld id="{0E462D58-24D5-460E-A073-5F56B9E1F7E7}" type="datetimeFigureOut">
               <a:rPr lang="en-US" smtClean="0"/>
-              <a:t>5/27/2017</a:t>
+              <a:t>5/31/2017</a:t>
             </a:fld>
             <a:endParaRPr lang="en-US"/>
           </a:p>
@@ -5293,7 +5294,7 @@
           <a:p>
             <a:fld id="{0E462D58-24D5-460E-A073-5F56B9E1F7E7}" type="datetimeFigureOut">
               <a:rPr lang="en-US" smtClean="0"/>
-              <a:t>5/27/2017</a:t>
+              <a:t>5/31/2017</a:t>
             </a:fld>
             <a:endParaRPr lang="en-US"/>
           </a:p>
@@ -5410,7 +5411,7 @@
           <a:p>
             <a:fld id="{0E462D58-24D5-460E-A073-5F56B9E1F7E7}" type="datetimeFigureOut">
               <a:rPr lang="en-US" smtClean="0"/>
-              <a:t>5/27/2017</a:t>
+              <a:t>5/31/2017</a:t>
             </a:fld>
             <a:endParaRPr lang="en-US"/>
           </a:p>
@@ -5505,7 +5506,7 @@
           <a:p>
             <a:fld id="{0E462D58-24D5-460E-A073-5F56B9E1F7E7}" type="datetimeFigureOut">
               <a:rPr lang="en-US" smtClean="0"/>
-              <a:t>5/27/2017</a:t>
+              <a:t>5/31/2017</a:t>
             </a:fld>
             <a:endParaRPr lang="en-US"/>
           </a:p>
@@ -5780,7 +5781,7 @@
           <a:p>
             <a:fld id="{0E462D58-24D5-460E-A073-5F56B9E1F7E7}" type="datetimeFigureOut">
               <a:rPr lang="en-US" smtClean="0"/>
-              <a:t>5/27/2017</a:t>
+              <a:t>5/31/2017</a:t>
             </a:fld>
             <a:endParaRPr lang="en-US"/>
           </a:p>
@@ -6032,7 +6033,7 @@
           <a:p>
             <a:fld id="{0E462D58-24D5-460E-A073-5F56B9E1F7E7}" type="datetimeFigureOut">
               <a:rPr lang="en-US" smtClean="0"/>
-              <a:t>5/27/2017</a:t>
+              <a:t>5/31/2017</a:t>
             </a:fld>
             <a:endParaRPr lang="en-US"/>
           </a:p>
@@ -6250,7 +6251,7 @@
           <a:p>
             <a:fld id="{0E462D58-24D5-460E-A073-5F56B9E1F7E7}" type="datetimeFigureOut">
               <a:rPr lang="en-US" smtClean="0"/>
-              <a:t>5/27/2017</a:t>
+              <a:t>5/31/2017</a:t>
             </a:fld>
             <a:endParaRPr lang="en-US" dirty="0"/>
           </a:p>
@@ -6828,83 +6829,92 @@
           <a:chExt cx="0" cy="0"/>
         </a:xfrm>
       </p:grpSpPr>
-      <p:sp>
-        <p:nvSpPr>
-          <p:cNvPr id="2" name="Title 1"/>
-          <p:cNvSpPr>
-            <a:spLocks noGrp="1"/>
-          </p:cNvSpPr>
-          <p:nvPr>
-            <p:ph type="title"/>
-          </p:nvPr>
-        </p:nvSpPr>
-        <p:spPr/>
-        <p:txBody>
-          <a:bodyPr/>
-          <a:lstStyle/>
-          <a:p>
-            <a:r>
-              <a:rPr lang="en-US" sz="6000" dirty="0"/>
-              <a:t>Roadmap</a:t>
-            </a:r>
-            <a:endParaRPr lang="en-US" dirty="0"/>
-          </a:p>
-        </p:txBody>
-      </p:sp>
-      <p:sp>
-        <p:nvSpPr>
-          <p:cNvPr id="3" name="Content Placeholder 2"/>
-          <p:cNvSpPr>
-            <a:spLocks noGrp="1"/>
-          </p:cNvSpPr>
-          <p:nvPr>
-            <p:ph idx="1"/>
-          </p:nvPr>
-        </p:nvSpPr>
-        <p:spPr>
+      <p:pic>
+        <p:nvPicPr>
+          <p:cNvPr id="4098" name="Picture 2" descr="Image result for hans rosling"/>
+          <p:cNvPicPr>
+            <a:picLocks noChangeAspect="1" noChangeArrowheads="1"/>
+          </p:cNvPicPr>
+          <p:nvPr/>
+        </p:nvPicPr>
+        <p:blipFill>
+          <a:blip r:embed="rId3">
+            <a:extLst>
+              <a:ext uri="{28A0092B-C50C-407E-A947-70E740481C1C}">
+                <a14:useLocalDpi xmlns:a14="http://schemas.microsoft.com/office/drawing/2010/main" val="0"/>
+              </a:ext>
+            </a:extLst>
+          </a:blip>
+          <a:srcRect/>
+          <a:stretch>
+            <a:fillRect/>
+          </a:stretch>
+        </p:blipFill>
+        <p:spPr bwMode="auto">
           <a:xfrm>
-            <a:off x="838200" y="1825625"/>
-            <a:ext cx="5586454" cy="4351338"/>
+            <a:off x="613721" y="1447802"/>
+            <a:ext cx="5696464" cy="4272348"/>
           </a:xfrm>
+          <a:prstGeom prst="rect">
+            <a:avLst/>
+          </a:prstGeom>
+          <a:noFill/>
+          <a:extLst>
+            <a:ext uri="{909E8E84-426E-40DD-AFC4-6F175D3DCCD1}">
+              <a14:hiddenFill xmlns:a14="http://schemas.microsoft.com/office/drawing/2010/main">
+                <a:solidFill>
+                  <a:srgbClr val="FFFFFF"/>
+                </a:solidFill>
+              </a14:hiddenFill>
+            </a:ext>
+          </a:extLst>
         </p:spPr>
-        <p:txBody>
-          <a:bodyPr>
-            <a:normAutofit/>
-          </a:bodyPr>
-          <a:lstStyle/>
-          <a:p>
-            <a:pPr marL="0" indent="0">
-              <a:buNone/>
-            </a:pPr>
-            <a:r>
-              <a:rPr lang="en-US" sz="3600" dirty="0"/>
-              <a:t>Why R? </a:t>
-            </a:r>
-          </a:p>
-          <a:p>
-            <a:pPr marL="0" indent="0">
-              <a:buNone/>
-            </a:pPr>
-            <a:r>
-              <a:rPr lang="en-US" sz="3600" dirty="0"/>
-              <a:t>Navigating the R ecosystem</a:t>
-            </a:r>
-          </a:p>
-          <a:p>
-            <a:pPr marL="0" indent="0">
-              <a:buNone/>
-            </a:pPr>
-            <a:r>
-              <a:rPr lang="en-US" sz="3600" dirty="0"/>
-              <a:t>A Brief Tour of R</a:t>
-            </a:r>
-          </a:p>
-        </p:txBody>
-      </p:sp>
+      </p:pic>
+      <p:pic>
+        <p:nvPicPr>
+          <p:cNvPr id="4100" name="Picture 4" descr="Image result for how to lie with statistics"/>
+          <p:cNvPicPr>
+            <a:picLocks noChangeAspect="1" noChangeArrowheads="1"/>
+          </p:cNvPicPr>
+          <p:nvPr/>
+        </p:nvPicPr>
+        <p:blipFill>
+          <a:blip r:embed="rId4">
+            <a:extLst>
+              <a:ext uri="{28A0092B-C50C-407E-A947-70E740481C1C}">
+                <a14:useLocalDpi xmlns:a14="http://schemas.microsoft.com/office/drawing/2010/main" val="0"/>
+              </a:ext>
+            </a:extLst>
+          </a:blip>
+          <a:srcRect/>
+          <a:stretch>
+            <a:fillRect/>
+          </a:stretch>
+        </p:blipFill>
+        <p:spPr bwMode="auto">
+          <a:xfrm>
+            <a:off x="7092779" y="1447802"/>
+            <a:ext cx="4261020" cy="4261020"/>
+          </a:xfrm>
+          <a:prstGeom prst="rect">
+            <a:avLst/>
+          </a:prstGeom>
+          <a:noFill/>
+          <a:extLst>
+            <a:ext uri="{909E8E84-426E-40DD-AFC4-6F175D3DCCD1}">
+              <a14:hiddenFill xmlns:a14="http://schemas.microsoft.com/office/drawing/2010/main">
+                <a:solidFill>
+                  <a:srgbClr val="FFFFFF"/>
+                </a:solidFill>
+              </a14:hiddenFill>
+            </a:ext>
+          </a:extLst>
+        </p:spPr>
+      </p:pic>
     </p:spTree>
     <p:extLst>
       <p:ext uri="{BB962C8B-B14F-4D97-AF65-F5344CB8AC3E}">
-        <p14:creationId xmlns:p14="http://schemas.microsoft.com/office/powerpoint/2010/main" val="650433400"/>
+        <p14:creationId xmlns:p14="http://schemas.microsoft.com/office/powerpoint/2010/main" val="412592758"/>
       </p:ext>
     </p:extLst>
   </p:cSld>
@@ -6915,6 +6925,77 @@
 </file>
 
 <file path=ppt/slides/slide11.xml><?xml version="1.0" encoding="utf-8"?>
+<p:sld xmlns:a="http://schemas.openxmlformats.org/drawingml/2006/main" xmlns:r="http://schemas.openxmlformats.org/officeDocument/2006/relationships" xmlns:p="http://schemas.openxmlformats.org/presentationml/2006/main">
+  <p:cSld>
+    <p:spTree>
+      <p:nvGrpSpPr>
+        <p:cNvPr id="1" name=""/>
+        <p:cNvGrpSpPr/>
+        <p:nvPr/>
+      </p:nvGrpSpPr>
+      <p:grpSpPr>
+        <a:xfrm>
+          <a:off x="0" y="0"/>
+          <a:ext cx="0" cy="0"/>
+          <a:chOff x="0" y="0"/>
+          <a:chExt cx="0" cy="0"/>
+        </a:xfrm>
+      </p:grpSpPr>
+      <p:sp>
+        <p:nvSpPr>
+          <p:cNvPr id="3" name="Content Placeholder 2"/>
+          <p:cNvSpPr>
+            <a:spLocks noGrp="1"/>
+          </p:cNvSpPr>
+          <p:nvPr>
+            <p:ph idx="1"/>
+          </p:nvPr>
+        </p:nvSpPr>
+        <p:spPr>
+          <a:xfrm>
+            <a:off x="611606" y="2561139"/>
+            <a:ext cx="10968789" cy="1735722"/>
+          </a:xfrm>
+        </p:spPr>
+        <p:txBody>
+          <a:bodyPr>
+            <a:normAutofit fontScale="92500"/>
+          </a:bodyPr>
+          <a:lstStyle/>
+          <a:p>
+            <a:pPr marL="0" indent="0">
+              <a:buNone/>
+            </a:pPr>
+            <a:r>
+              <a:rPr lang="en-US" sz="4800" dirty="0"/>
+              <a:t>“In God we trust, all others must bring data”</a:t>
+            </a:r>
+          </a:p>
+          <a:p>
+            <a:pPr marL="0" indent="0">
+              <a:buNone/>
+            </a:pPr>
+            <a:r>
+              <a:rPr lang="en-US" sz="4800" dirty="0"/>
+              <a:t>- W. Edwards Deming</a:t>
+            </a:r>
+          </a:p>
+        </p:txBody>
+      </p:sp>
+    </p:spTree>
+    <p:extLst>
+      <p:ext uri="{BB962C8B-B14F-4D97-AF65-F5344CB8AC3E}">
+        <p14:creationId xmlns:p14="http://schemas.microsoft.com/office/powerpoint/2010/main" val="484091321"/>
+      </p:ext>
+    </p:extLst>
+  </p:cSld>
+  <p:clrMapOvr>
+    <a:masterClrMapping/>
+  </p:clrMapOvr>
+</p:sld>
+</file>
+
+<file path=ppt/slides/slide12.xml><?xml version="1.0" encoding="utf-8"?>
 <p:sld xmlns:a="http://schemas.openxmlformats.org/drawingml/2006/main" xmlns:r="http://schemas.openxmlformats.org/officeDocument/2006/relationships" xmlns:p="http://schemas.openxmlformats.org/presentationml/2006/main">
   <p:cSld>
     <p:spTree>
@@ -7094,63 +7175,6 @@
 </p:sld>
 </file>
 
-<file path=ppt/slides/slide12.xml><?xml version="1.0" encoding="utf-8"?>
-<p:sld xmlns:a="http://schemas.openxmlformats.org/drawingml/2006/main" xmlns:r="http://schemas.openxmlformats.org/officeDocument/2006/relationships" xmlns:p="http://schemas.openxmlformats.org/presentationml/2006/main">
-  <p:cSld>
-    <p:spTree>
-      <p:nvGrpSpPr>
-        <p:cNvPr id="1" name=""/>
-        <p:cNvGrpSpPr/>
-        <p:nvPr/>
-      </p:nvGrpSpPr>
-      <p:grpSpPr>
-        <a:xfrm>
-          <a:off x="0" y="0"/>
-          <a:ext cx="0" cy="0"/>
-          <a:chOff x="0" y="0"/>
-          <a:chExt cx="0" cy="0"/>
-        </a:xfrm>
-      </p:grpSpPr>
-      <p:sp>
-        <p:nvSpPr>
-          <p:cNvPr id="2" name="Title 1"/>
-          <p:cNvSpPr>
-            <a:spLocks noGrp="1"/>
-          </p:cNvSpPr>
-          <p:nvPr>
-            <p:ph type="title"/>
-          </p:nvPr>
-        </p:nvSpPr>
-        <p:spPr>
-          <a:xfrm>
-            <a:off x="339517" y="2527852"/>
-            <a:ext cx="10515600" cy="1325563"/>
-          </a:xfrm>
-        </p:spPr>
-        <p:txBody>
-          <a:bodyPr/>
-          <a:lstStyle/>
-          <a:p>
-            <a:r>
-              <a:rPr lang="en-US" dirty="0"/>
-              <a:t>Which one should I choose?</a:t>
-            </a:r>
-          </a:p>
-        </p:txBody>
-      </p:sp>
-    </p:spTree>
-    <p:extLst>
-      <p:ext uri="{BB962C8B-B14F-4D97-AF65-F5344CB8AC3E}">
-        <p14:creationId xmlns:p14="http://schemas.microsoft.com/office/powerpoint/2010/main" val="1025839124"/>
-      </p:ext>
-    </p:extLst>
-  </p:cSld>
-  <p:clrMapOvr>
-    <a:masterClrMapping/>
-  </p:clrMapOvr>
-</p:sld>
-</file>
-
 <file path=ppt/slides/slide13.xml><?xml version="1.0" encoding="utf-8"?>
 <p:sld xmlns:a="http://schemas.openxmlformats.org/drawingml/2006/main" xmlns:r="http://schemas.openxmlformats.org/officeDocument/2006/relationships" xmlns:p="http://schemas.openxmlformats.org/presentationml/2006/main">
   <p:cSld>
@@ -7180,6 +7204,63 @@
         </p:nvSpPr>
         <p:spPr>
           <a:xfrm>
+            <a:off x="339517" y="2527852"/>
+            <a:ext cx="10515600" cy="1325563"/>
+          </a:xfrm>
+        </p:spPr>
+        <p:txBody>
+          <a:bodyPr/>
+          <a:lstStyle/>
+          <a:p>
+            <a:r>
+              <a:rPr lang="en-US" dirty="0"/>
+              <a:t>Which one should I choose?</a:t>
+            </a:r>
+          </a:p>
+        </p:txBody>
+      </p:sp>
+    </p:spTree>
+    <p:extLst>
+      <p:ext uri="{BB962C8B-B14F-4D97-AF65-F5344CB8AC3E}">
+        <p14:creationId xmlns:p14="http://schemas.microsoft.com/office/powerpoint/2010/main" val="1025839124"/>
+      </p:ext>
+    </p:extLst>
+  </p:cSld>
+  <p:clrMapOvr>
+    <a:masterClrMapping/>
+  </p:clrMapOvr>
+</p:sld>
+</file>
+
+<file path=ppt/slides/slide14.xml><?xml version="1.0" encoding="utf-8"?>
+<p:sld xmlns:a="http://schemas.openxmlformats.org/drawingml/2006/main" xmlns:r="http://schemas.openxmlformats.org/officeDocument/2006/relationships" xmlns:p="http://schemas.openxmlformats.org/presentationml/2006/main">
+  <p:cSld>
+    <p:spTree>
+      <p:nvGrpSpPr>
+        <p:cNvPr id="1" name=""/>
+        <p:cNvGrpSpPr/>
+        <p:nvPr/>
+      </p:nvGrpSpPr>
+      <p:grpSpPr>
+        <a:xfrm>
+          <a:off x="0" y="0"/>
+          <a:ext cx="0" cy="0"/>
+          <a:chOff x="0" y="0"/>
+          <a:chExt cx="0" cy="0"/>
+        </a:xfrm>
+      </p:grpSpPr>
+      <p:sp>
+        <p:nvSpPr>
+          <p:cNvPr id="2" name="Title 1"/>
+          <p:cNvSpPr>
+            <a:spLocks noGrp="1"/>
+          </p:cNvSpPr>
+          <p:nvPr>
+            <p:ph type="title"/>
+          </p:nvPr>
+        </p:nvSpPr>
+        <p:spPr>
+          <a:xfrm>
             <a:off x="497710" y="2518016"/>
             <a:ext cx="10335229" cy="1325563"/>
           </a:xfrm>
@@ -7208,7 +7289,7 @@
 </p:sld>
 </file>
 
-<file path=ppt/slides/slide14.xml><?xml version="1.0" encoding="utf-8"?>
+<file path=ppt/slides/slide15.xml><?xml version="1.0" encoding="utf-8"?>
 <p:sld xmlns:a="http://schemas.openxmlformats.org/drawingml/2006/main" xmlns:r="http://schemas.openxmlformats.org/officeDocument/2006/relationships" xmlns:p="http://schemas.openxmlformats.org/presentationml/2006/main">
   <p:cSld>
     <p:spTree>
@@ -7347,7 +7428,7 @@
 </p:sld>
 </file>
 
-<file path=ppt/slides/slide15.xml><?xml version="1.0" encoding="utf-8"?>
+<file path=ppt/slides/slide16.xml><?xml version="1.0" encoding="utf-8"?>
 <p:sld xmlns:a="http://schemas.openxmlformats.org/drawingml/2006/main" xmlns:r="http://schemas.openxmlformats.org/officeDocument/2006/relationships" xmlns:p="http://schemas.openxmlformats.org/presentationml/2006/main">
   <p:cSld>
     <p:spTree>
@@ -7445,7 +7526,7 @@
 </p:sld>
 </file>
 
-<file path=ppt/slides/slide16.xml><?xml version="1.0" encoding="utf-8"?>
+<file path=ppt/slides/slide17.xml><?xml version="1.0" encoding="utf-8"?>
 <p:sld xmlns:a="http://schemas.openxmlformats.org/drawingml/2006/main" xmlns:r="http://schemas.openxmlformats.org/officeDocument/2006/relationships" xmlns:p="http://schemas.openxmlformats.org/presentationml/2006/main">
   <p:cSld>
     <p:spTree>
@@ -7516,117 +7597,6 @@
 </p:sld>
 </file>
 
-<file path=ppt/slides/slide17.xml><?xml version="1.0" encoding="utf-8"?>
-<p:sld xmlns:a="http://schemas.openxmlformats.org/drawingml/2006/main" xmlns:r="http://schemas.openxmlformats.org/officeDocument/2006/relationships" xmlns:p="http://schemas.openxmlformats.org/presentationml/2006/main">
-  <p:cSld>
-    <p:spTree>
-      <p:nvGrpSpPr>
-        <p:cNvPr id="1" name=""/>
-        <p:cNvGrpSpPr/>
-        <p:nvPr/>
-      </p:nvGrpSpPr>
-      <p:grpSpPr>
-        <a:xfrm>
-          <a:off x="0" y="0"/>
-          <a:ext cx="0" cy="0"/>
-          <a:chOff x="0" y="0"/>
-          <a:chExt cx="0" cy="0"/>
-        </a:xfrm>
-      </p:grpSpPr>
-      <p:sp>
-        <p:nvSpPr>
-          <p:cNvPr id="2" name="Title 1"/>
-          <p:cNvSpPr>
-            <a:spLocks noGrp="1"/>
-          </p:cNvSpPr>
-          <p:nvPr>
-            <p:ph type="title"/>
-          </p:nvPr>
-        </p:nvSpPr>
-        <p:spPr/>
-        <p:txBody>
-          <a:bodyPr>
-            <a:normAutofit/>
-          </a:bodyPr>
-          <a:lstStyle/>
-          <a:p>
-            <a:r>
-              <a:rPr lang="en-US" sz="6600" dirty="0"/>
-              <a:t>When to use it?</a:t>
-            </a:r>
-          </a:p>
-        </p:txBody>
-      </p:sp>
-      <p:sp>
-        <p:nvSpPr>
-          <p:cNvPr id="3" name="Content Placeholder 2"/>
-          <p:cNvSpPr>
-            <a:spLocks noGrp="1"/>
-          </p:cNvSpPr>
-          <p:nvPr>
-            <p:ph idx="1"/>
-          </p:nvPr>
-        </p:nvSpPr>
-        <p:spPr/>
-        <p:txBody>
-          <a:bodyPr>
-            <a:normAutofit/>
-          </a:bodyPr>
-          <a:lstStyle/>
-          <a:p>
-            <a:pPr marL="0" indent="0">
-              <a:buNone/>
-            </a:pPr>
-            <a:r>
-              <a:rPr lang="en-US" sz="4400" dirty="0"/>
-              <a:t>Data Exploration</a:t>
-            </a:r>
-          </a:p>
-          <a:p>
-            <a:pPr marL="0" indent="0">
-              <a:buNone/>
-            </a:pPr>
-            <a:endParaRPr lang="en-US" sz="4400" dirty="0"/>
-          </a:p>
-          <a:p>
-            <a:pPr marL="0" indent="0">
-              <a:buNone/>
-            </a:pPr>
-            <a:r>
-              <a:rPr lang="en-US" sz="4400" dirty="0"/>
-              <a:t>Statistical Analysis</a:t>
-            </a:r>
-          </a:p>
-          <a:p>
-            <a:pPr marL="0" indent="0">
-              <a:buNone/>
-            </a:pPr>
-            <a:endParaRPr lang="en-US" sz="4400" dirty="0"/>
-          </a:p>
-          <a:p>
-            <a:pPr marL="0" indent="0">
-              <a:buNone/>
-            </a:pPr>
-            <a:r>
-              <a:rPr lang="en-US" sz="4400" dirty="0"/>
-              <a:t>Data Visualization</a:t>
-            </a:r>
-          </a:p>
-        </p:txBody>
-      </p:sp>
-    </p:spTree>
-    <p:extLst>
-      <p:ext uri="{BB962C8B-B14F-4D97-AF65-F5344CB8AC3E}">
-        <p14:creationId xmlns:p14="http://schemas.microsoft.com/office/powerpoint/2010/main" val="3163846291"/>
-      </p:ext>
-    </p:extLst>
-  </p:cSld>
-  <p:clrMapOvr>
-    <a:masterClrMapping/>
-  </p:clrMapOvr>
-</p:sld>
-</file>
-
 <file path=ppt/slides/slide18.xml><?xml version="1.0" encoding="utf-8"?>
 <p:sld xmlns:a="http://schemas.openxmlformats.org/drawingml/2006/main" xmlns:r="http://schemas.openxmlformats.org/officeDocument/2006/relationships" xmlns:p="http://schemas.openxmlformats.org/presentationml/2006/main">
   <p:cSld>
@@ -7663,7 +7633,7 @@
           <a:p>
             <a:r>
               <a:rPr lang="en-US" sz="6600" dirty="0"/>
-              <a:t>When to not use it?</a:t>
+              <a:t>When to use it?</a:t>
             </a:r>
           </a:p>
         </p:txBody>
@@ -7678,12 +7648,7 @@
             <p:ph idx="1"/>
           </p:nvPr>
         </p:nvSpPr>
-        <p:spPr>
-          <a:xfrm>
-            <a:off x="838200" y="1690688"/>
-            <a:ext cx="10515600" cy="3386679"/>
-          </a:xfrm>
-        </p:spPr>
+        <p:spPr/>
         <p:txBody>
           <a:bodyPr>
             <a:normAutofit/>
@@ -7695,7 +7660,7 @@
             </a:pPr>
             <a:r>
               <a:rPr lang="en-US" sz="4400" dirty="0"/>
-              <a:t>Anything Non-statistical</a:t>
+              <a:t>Data Exploration</a:t>
             </a:r>
           </a:p>
           <a:p>
@@ -7710,7 +7675,7 @@
             </a:pPr>
             <a:r>
               <a:rPr lang="en-US" sz="4400" dirty="0"/>
-              <a:t>Complex applications</a:t>
+              <a:t>Statistical Analysis</a:t>
             </a:r>
           </a:p>
           <a:p>
@@ -7723,14 +7688,17 @@
             <a:pPr marL="0" indent="0">
               <a:buNone/>
             </a:pPr>
-            <a:endParaRPr lang="en-US" sz="4400" dirty="0"/>
+            <a:r>
+              <a:rPr lang="en-US" sz="4400" dirty="0"/>
+              <a:t>Data Visualization</a:t>
+            </a:r>
           </a:p>
         </p:txBody>
       </p:sp>
     </p:spTree>
     <p:extLst>
       <p:ext uri="{BB962C8B-B14F-4D97-AF65-F5344CB8AC3E}">
-        <p14:creationId xmlns:p14="http://schemas.microsoft.com/office/powerpoint/2010/main" val="2981051004"/>
+        <p14:creationId xmlns:p14="http://schemas.microsoft.com/office/powerpoint/2010/main" val="3163846291"/>
       </p:ext>
     </p:extLst>
   </p:cSld>
@@ -7767,27 +7735,83 @@
             <p:ph type="title"/>
           </p:nvPr>
         </p:nvSpPr>
+        <p:spPr/>
+        <p:txBody>
+          <a:bodyPr>
+            <a:normAutofit/>
+          </a:bodyPr>
+          <a:lstStyle/>
+          <a:p>
+            <a:r>
+              <a:rPr lang="en-US" sz="6600" dirty="0"/>
+              <a:t>When to not use it?</a:t>
+            </a:r>
+          </a:p>
+        </p:txBody>
+      </p:sp>
+      <p:sp>
+        <p:nvSpPr>
+          <p:cNvPr id="3" name="Content Placeholder 2"/>
+          <p:cNvSpPr>
+            <a:spLocks noGrp="1"/>
+          </p:cNvSpPr>
+          <p:nvPr>
+            <p:ph idx="1"/>
+          </p:nvPr>
+        </p:nvSpPr>
         <p:spPr>
           <a:xfrm>
-            <a:off x="398362" y="2610613"/>
-            <a:ext cx="10515600" cy="1325563"/>
+            <a:off x="838200" y="1690688"/>
+            <a:ext cx="10515600" cy="3386679"/>
           </a:xfrm>
         </p:spPr>
         <p:txBody>
-          <a:bodyPr/>
-          <a:lstStyle/>
-          <a:p>
-            <a:r>
-              <a:rPr lang="en-US" dirty="0"/>
-              <a:t>R Basics – Demo</a:t>
-            </a:r>
+          <a:bodyPr>
+            <a:normAutofit/>
+          </a:bodyPr>
+          <a:lstStyle/>
+          <a:p>
+            <a:pPr marL="0" indent="0">
+              <a:buNone/>
+            </a:pPr>
+            <a:r>
+              <a:rPr lang="en-US" sz="4400" dirty="0"/>
+              <a:t>Anything Non-statistical</a:t>
+            </a:r>
+          </a:p>
+          <a:p>
+            <a:pPr marL="0" indent="0">
+              <a:buNone/>
+            </a:pPr>
+            <a:endParaRPr lang="en-US" sz="4400" dirty="0"/>
+          </a:p>
+          <a:p>
+            <a:pPr marL="0" indent="0">
+              <a:buNone/>
+            </a:pPr>
+            <a:r>
+              <a:rPr lang="en-US" sz="4400" dirty="0"/>
+              <a:t>Complex applications</a:t>
+            </a:r>
+          </a:p>
+          <a:p>
+            <a:pPr marL="0" indent="0">
+              <a:buNone/>
+            </a:pPr>
+            <a:endParaRPr lang="en-US" sz="4400" dirty="0"/>
+          </a:p>
+          <a:p>
+            <a:pPr marL="0" indent="0">
+              <a:buNone/>
+            </a:pPr>
+            <a:endParaRPr lang="en-US" sz="4400" dirty="0"/>
           </a:p>
         </p:txBody>
       </p:sp>
     </p:spTree>
     <p:extLst>
       <p:ext uri="{BB962C8B-B14F-4D97-AF65-F5344CB8AC3E}">
-        <p14:creationId xmlns:p14="http://schemas.microsoft.com/office/powerpoint/2010/main" val="3521706402"/>
+        <p14:creationId xmlns:p14="http://schemas.microsoft.com/office/powerpoint/2010/main" val="2981051004"/>
       </p:ext>
     </p:extLst>
   </p:cSld>
@@ -7967,6 +7991,63 @@
         </p:nvSpPr>
         <p:spPr>
           <a:xfrm>
+            <a:off x="398362" y="2610613"/>
+            <a:ext cx="10515600" cy="1325563"/>
+          </a:xfrm>
+        </p:spPr>
+        <p:txBody>
+          <a:bodyPr/>
+          <a:lstStyle/>
+          <a:p>
+            <a:r>
+              <a:rPr lang="en-US" dirty="0"/>
+              <a:t>R Basics – Demo</a:t>
+            </a:r>
+          </a:p>
+        </p:txBody>
+      </p:sp>
+    </p:spTree>
+    <p:extLst>
+      <p:ext uri="{BB962C8B-B14F-4D97-AF65-F5344CB8AC3E}">
+        <p14:creationId xmlns:p14="http://schemas.microsoft.com/office/powerpoint/2010/main" val="3521706402"/>
+      </p:ext>
+    </p:extLst>
+  </p:cSld>
+  <p:clrMapOvr>
+    <a:masterClrMapping/>
+  </p:clrMapOvr>
+</p:sld>
+</file>
+
+<file path=ppt/slides/slide21.xml><?xml version="1.0" encoding="utf-8"?>
+<p:sld xmlns:a="http://schemas.openxmlformats.org/drawingml/2006/main" xmlns:r="http://schemas.openxmlformats.org/officeDocument/2006/relationships" xmlns:p="http://schemas.openxmlformats.org/presentationml/2006/main">
+  <p:cSld>
+    <p:spTree>
+      <p:nvGrpSpPr>
+        <p:cNvPr id="1" name=""/>
+        <p:cNvGrpSpPr/>
+        <p:nvPr/>
+      </p:nvGrpSpPr>
+      <p:grpSpPr>
+        <a:xfrm>
+          <a:off x="0" y="0"/>
+          <a:ext cx="0" cy="0"/>
+          <a:chOff x="0" y="0"/>
+          <a:chExt cx="0" cy="0"/>
+        </a:xfrm>
+      </p:grpSpPr>
+      <p:sp>
+        <p:nvSpPr>
+          <p:cNvPr id="2" name="Title 1"/>
+          <p:cNvSpPr>
+            <a:spLocks noGrp="1"/>
+          </p:cNvSpPr>
+          <p:nvPr>
+            <p:ph type="title"/>
+          </p:nvPr>
+        </p:nvSpPr>
+        <p:spPr>
+          <a:xfrm>
             <a:off x="0" y="0"/>
             <a:ext cx="12191999" cy="915535"/>
           </a:xfrm>
@@ -8037,7 +8118,7 @@
 </p:sld>
 </file>
 
-<file path=ppt/slides/slide21.xml><?xml version="1.0" encoding="utf-8"?>
+<file path=ppt/slides/slide22.xml><?xml version="1.0" encoding="utf-8"?>
 <p:sld xmlns:a="http://schemas.openxmlformats.org/drawingml/2006/main" xmlns:r="http://schemas.openxmlformats.org/officeDocument/2006/relationships" xmlns:p="http://schemas.openxmlformats.org/presentationml/2006/main">
   <p:cSld>
     <p:spTree>
@@ -8206,7 +8287,7 @@
 </p:sld>
 </file>
 
-<file path=ppt/slides/slide22.xml><?xml version="1.0" encoding="utf-8"?>
+<file path=ppt/slides/slide23.xml><?xml version="1.0" encoding="utf-8"?>
 <p:sld xmlns:a="http://schemas.openxmlformats.org/drawingml/2006/main" xmlns:r="http://schemas.openxmlformats.org/officeDocument/2006/relationships" xmlns:p="http://schemas.openxmlformats.org/presentationml/2006/main">
   <p:cSld>
     <p:spTree>
@@ -8265,7 +8346,7 @@
 </p:sld>
 </file>
 
-<file path=ppt/slides/slide23.xml><?xml version="1.0" encoding="utf-8"?>
+<file path=ppt/slides/slide24.xml><?xml version="1.0" encoding="utf-8"?>
 <p:sld xmlns:a="http://schemas.openxmlformats.org/drawingml/2006/main" xmlns:r="http://schemas.openxmlformats.org/officeDocument/2006/relationships" xmlns:p="http://schemas.openxmlformats.org/presentationml/2006/main">
   <p:cSld>
     <p:spTree>
@@ -8336,7 +8417,7 @@
 </p:sld>
 </file>
 
-<file path=ppt/slides/slide24.xml><?xml version="1.0" encoding="utf-8"?>
+<file path=ppt/slides/slide25.xml><?xml version="1.0" encoding="utf-8"?>
 <p:sld xmlns:a="http://schemas.openxmlformats.org/drawingml/2006/main" xmlns:r="http://schemas.openxmlformats.org/officeDocument/2006/relationships" xmlns:p="http://schemas.openxmlformats.org/presentationml/2006/main">
   <p:cSld>
     <p:spTree>
@@ -8407,7 +8488,7 @@
 </p:sld>
 </file>
 
-<file path=ppt/slides/slide25.xml><?xml version="1.0" encoding="utf-8"?>
+<file path=ppt/slides/slide26.xml><?xml version="1.0" encoding="utf-8"?>
 <p:sld xmlns:a="http://schemas.openxmlformats.org/drawingml/2006/main" xmlns:r="http://schemas.openxmlformats.org/officeDocument/2006/relationships" xmlns:p="http://schemas.openxmlformats.org/presentationml/2006/main">
   <p:cSld>
     <p:spTree>
@@ -8699,7 +8780,7 @@
 </p:sld>
 </file>
 
-<file path=ppt/slides/slide26.xml><?xml version="1.0" encoding="utf-8"?>
+<file path=ppt/slides/slide27.xml><?xml version="1.0" encoding="utf-8"?>
 <p:sld xmlns:a="http://schemas.openxmlformats.org/drawingml/2006/main" xmlns:r="http://schemas.openxmlformats.org/officeDocument/2006/relationships" xmlns:p="http://schemas.openxmlformats.org/presentationml/2006/main">
   <p:cSld>
     <p:spTree>
@@ -8810,6 +8891,180 @@
 </file>
 
 <file path=ppt/slides/slide3.xml><?xml version="1.0" encoding="utf-8"?>
+<p:sld xmlns:a="http://schemas.openxmlformats.org/drawingml/2006/main" xmlns:r="http://schemas.openxmlformats.org/officeDocument/2006/relationships" xmlns:p="http://schemas.openxmlformats.org/presentationml/2006/main">
+  <p:cSld>
+    <p:spTree>
+      <p:nvGrpSpPr>
+        <p:cNvPr id="1" name=""/>
+        <p:cNvGrpSpPr/>
+        <p:nvPr/>
+      </p:nvGrpSpPr>
+      <p:grpSpPr>
+        <a:xfrm>
+          <a:off x="0" y="0"/>
+          <a:ext cx="0" cy="0"/>
+          <a:chOff x="0" y="0"/>
+          <a:chExt cx="0" cy="0"/>
+        </a:xfrm>
+      </p:grpSpPr>
+      <p:sp>
+        <p:nvSpPr>
+          <p:cNvPr id="2" name="Title 1"/>
+          <p:cNvSpPr>
+            <a:spLocks noGrp="1"/>
+          </p:cNvSpPr>
+          <p:nvPr>
+            <p:ph type="title"/>
+          </p:nvPr>
+        </p:nvSpPr>
+        <p:spPr/>
+        <p:txBody>
+          <a:bodyPr/>
+          <a:lstStyle/>
+          <a:p>
+            <a:r>
+              <a:rPr lang="en-US" sz="6000" dirty="0"/>
+              <a:t>Roadmap</a:t>
+            </a:r>
+            <a:endParaRPr lang="en-US" dirty="0"/>
+          </a:p>
+        </p:txBody>
+      </p:sp>
+      <p:sp>
+        <p:nvSpPr>
+          <p:cNvPr id="3" name="Content Placeholder 2"/>
+          <p:cNvSpPr>
+            <a:spLocks noGrp="1"/>
+          </p:cNvSpPr>
+          <p:nvPr>
+            <p:ph idx="1"/>
+          </p:nvPr>
+        </p:nvSpPr>
+        <p:spPr>
+          <a:xfrm>
+            <a:off x="838200" y="1825625"/>
+            <a:ext cx="5586454" cy="4351338"/>
+          </a:xfrm>
+        </p:spPr>
+        <p:txBody>
+          <a:bodyPr>
+            <a:normAutofit/>
+          </a:bodyPr>
+          <a:lstStyle/>
+          <a:p>
+            <a:pPr marL="0" indent="0">
+              <a:buNone/>
+            </a:pPr>
+            <a:r>
+              <a:rPr lang="en-US" sz="3600" dirty="0"/>
+              <a:t>Why Data Literacy?</a:t>
+            </a:r>
+          </a:p>
+          <a:p>
+            <a:pPr marL="0" indent="0">
+              <a:buNone/>
+            </a:pPr>
+            <a:r>
+              <a:rPr lang="en-US" sz="3600" dirty="0"/>
+              <a:t>Why R? </a:t>
+            </a:r>
+          </a:p>
+          <a:p>
+            <a:pPr marL="0" indent="0">
+              <a:buNone/>
+            </a:pPr>
+            <a:r>
+              <a:rPr lang="en-US" sz="3600" dirty="0"/>
+              <a:t>Navigating the R ecosystem</a:t>
+            </a:r>
+          </a:p>
+          <a:p>
+            <a:pPr marL="0" indent="0">
+              <a:buNone/>
+            </a:pPr>
+            <a:r>
+              <a:rPr lang="en-US" sz="3600" dirty="0"/>
+              <a:t>A Brief Tour of R</a:t>
+            </a:r>
+          </a:p>
+        </p:txBody>
+      </p:sp>
+    </p:spTree>
+    <p:extLst>
+      <p:ext uri="{BB962C8B-B14F-4D97-AF65-F5344CB8AC3E}">
+        <p14:creationId xmlns:p14="http://schemas.microsoft.com/office/powerpoint/2010/main" val="650433400"/>
+      </p:ext>
+    </p:extLst>
+  </p:cSld>
+  <p:clrMapOvr>
+    <a:masterClrMapping/>
+  </p:clrMapOvr>
+</p:sld>
+</file>
+
+<file path=ppt/slides/slide4.xml><?xml version="1.0" encoding="utf-8"?>
+<p:sld xmlns:a="http://schemas.openxmlformats.org/drawingml/2006/main" xmlns:r="http://schemas.openxmlformats.org/officeDocument/2006/relationships" xmlns:p="http://schemas.openxmlformats.org/presentationml/2006/main">
+  <p:cSld>
+    <p:spTree>
+      <p:nvGrpSpPr>
+        <p:cNvPr id="1" name=""/>
+        <p:cNvGrpSpPr/>
+        <p:nvPr/>
+      </p:nvGrpSpPr>
+      <p:grpSpPr>
+        <a:xfrm>
+          <a:off x="0" y="0"/>
+          <a:ext cx="0" cy="0"/>
+          <a:chOff x="0" y="0"/>
+          <a:chExt cx="0" cy="0"/>
+        </a:xfrm>
+      </p:grpSpPr>
+      <p:sp>
+        <p:nvSpPr>
+          <p:cNvPr id="2" name="Title 1"/>
+          <p:cNvSpPr>
+            <a:spLocks noGrp="1"/>
+          </p:cNvSpPr>
+          <p:nvPr>
+            <p:ph type="title"/>
+          </p:nvPr>
+        </p:nvSpPr>
+        <p:spPr>
+          <a:xfrm>
+            <a:off x="497710" y="2518016"/>
+            <a:ext cx="10335229" cy="1325563"/>
+          </a:xfrm>
+        </p:spPr>
+        <p:txBody>
+          <a:bodyPr/>
+          <a:lstStyle/>
+          <a:p>
+            <a:r>
+              <a:rPr lang="en-US" dirty="0"/>
+              <a:t>Why do we need </a:t>
+            </a:r>
+            <a:r>
+              <a:rPr lang="en-US"/>
+              <a:t>data literacy?</a:t>
+            </a:r>
+            <a:endParaRPr lang="en-US" dirty="0"/>
+          </a:p>
+        </p:txBody>
+      </p:sp>
+    </p:spTree>
+    <p:extLst>
+      <p:ext uri="{BB962C8B-B14F-4D97-AF65-F5344CB8AC3E}">
+        <p14:creationId xmlns:p14="http://schemas.microsoft.com/office/powerpoint/2010/main" val="1062825584"/>
+      </p:ext>
+    </p:extLst>
+  </p:cSld>
+  <p:clrMapOvr>
+    <a:masterClrMapping/>
+  </p:clrMapOvr>
+</p:sld>
+</file>
+
+<file path=ppt/slides/slide5.xml><?xml version="1.0" encoding="utf-8"?>
 <p:sld xmlns:a="http://schemas.openxmlformats.org/drawingml/2006/main" xmlns:r="http://schemas.openxmlformats.org/officeDocument/2006/relationships" xmlns:p="http://schemas.openxmlformats.org/presentationml/2006/main">
   <p:cSld>
     <p:spTree>
@@ -8880,7 +9135,7 @@
 </p:sld>
 </file>
 
-<file path=ppt/slides/slide4.xml><?xml version="1.0" encoding="utf-8"?>
+<file path=ppt/slides/slide6.xml><?xml version="1.0" encoding="utf-8"?>
 <p:sld xmlns:a="http://schemas.openxmlformats.org/drawingml/2006/main" xmlns:r="http://schemas.openxmlformats.org/officeDocument/2006/relationships" xmlns:p="http://schemas.openxmlformats.org/presentationml/2006/main">
   <p:cSld>
     <p:spTree>
@@ -8951,7 +9206,7 @@
 </p:sld>
 </file>
 
-<file path=ppt/slides/slide5.xml><?xml version="1.0" encoding="utf-8"?>
+<file path=ppt/slides/slide7.xml><?xml version="1.0" encoding="utf-8"?>
 <p:sld xmlns:a="http://schemas.openxmlformats.org/drawingml/2006/main" xmlns:r="http://schemas.openxmlformats.org/officeDocument/2006/relationships" xmlns:p="http://schemas.openxmlformats.org/presentationml/2006/main">
   <p:cSld>
     <p:spTree>
@@ -9050,7 +9305,7 @@
 </p:sld>
 </file>
 
-<file path=ppt/slides/slide6.xml><?xml version="1.0" encoding="utf-8"?>
+<file path=ppt/slides/slide8.xml><?xml version="1.0" encoding="utf-8"?>
 <p:sld xmlns:a="http://schemas.openxmlformats.org/drawingml/2006/main" xmlns:r="http://schemas.openxmlformats.org/officeDocument/2006/relationships" xmlns:p="http://schemas.openxmlformats.org/presentationml/2006/main">
   <p:cSld>
     <p:spTree>
@@ -9162,194 +9417,6 @@
 </p:sld>
 </file>
 
-<file path=ppt/slides/slide7.xml><?xml version="1.0" encoding="utf-8"?>
-<p:sld xmlns:a="http://schemas.openxmlformats.org/drawingml/2006/main" xmlns:r="http://schemas.openxmlformats.org/officeDocument/2006/relationships" xmlns:p="http://schemas.openxmlformats.org/presentationml/2006/main">
-  <p:cSld>
-    <p:spTree>
-      <p:nvGrpSpPr>
-        <p:cNvPr id="1" name=""/>
-        <p:cNvGrpSpPr/>
-        <p:nvPr/>
-      </p:nvGrpSpPr>
-      <p:grpSpPr>
-        <a:xfrm>
-          <a:off x="0" y="0"/>
-          <a:ext cx="0" cy="0"/>
-          <a:chOff x="0" y="0"/>
-          <a:chExt cx="0" cy="0"/>
-        </a:xfrm>
-      </p:grpSpPr>
-      <p:sp>
-        <p:nvSpPr>
-          <p:cNvPr id="3" name="Content Placeholder 2"/>
-          <p:cNvSpPr>
-            <a:spLocks noGrp="1"/>
-          </p:cNvSpPr>
-          <p:nvPr>
-            <p:ph idx="1"/>
-          </p:nvPr>
-        </p:nvSpPr>
-        <p:spPr>
-          <a:xfrm>
-            <a:off x="611606" y="2561139"/>
-            <a:ext cx="10968789" cy="1735722"/>
-          </a:xfrm>
-        </p:spPr>
-        <p:txBody>
-          <a:bodyPr>
-            <a:normAutofit/>
-          </a:bodyPr>
-          <a:lstStyle/>
-          <a:p>
-            <a:pPr marL="0" indent="0">
-              <a:buNone/>
-            </a:pPr>
-            <a:r>
-              <a:rPr lang="en-US" sz="4800" dirty="0"/>
-              <a:t>“Let the dataset change your mindset.”</a:t>
-            </a:r>
-          </a:p>
-          <a:p>
-            <a:pPr marL="0" indent="0">
-              <a:buNone/>
-            </a:pPr>
-            <a:r>
-              <a:rPr lang="en-US" sz="4800" dirty="0"/>
-              <a:t>- Hans </a:t>
-            </a:r>
-            <a:r>
-              <a:rPr lang="en-US" sz="4800" dirty="0" err="1"/>
-              <a:t>Rosling</a:t>
-            </a:r>
-            <a:endParaRPr lang="en-US" sz="4800" dirty="0"/>
-          </a:p>
-        </p:txBody>
-      </p:sp>
-    </p:spTree>
-    <p:extLst>
-      <p:ext uri="{BB962C8B-B14F-4D97-AF65-F5344CB8AC3E}">
-        <p14:creationId xmlns:p14="http://schemas.microsoft.com/office/powerpoint/2010/main" val="2504119030"/>
-      </p:ext>
-    </p:extLst>
-  </p:cSld>
-  <p:clrMapOvr>
-    <a:masterClrMapping/>
-  </p:clrMapOvr>
-</p:sld>
-</file>
-
-<file path=ppt/slides/slide8.xml><?xml version="1.0" encoding="utf-8"?>
-<p:sld xmlns:a="http://schemas.openxmlformats.org/drawingml/2006/main" xmlns:r="http://schemas.openxmlformats.org/officeDocument/2006/relationships" xmlns:p="http://schemas.openxmlformats.org/presentationml/2006/main">
-  <p:cSld>
-    <p:spTree>
-      <p:nvGrpSpPr>
-        <p:cNvPr id="1" name=""/>
-        <p:cNvGrpSpPr/>
-        <p:nvPr/>
-      </p:nvGrpSpPr>
-      <p:grpSpPr>
-        <a:xfrm>
-          <a:off x="0" y="0"/>
-          <a:ext cx="0" cy="0"/>
-          <a:chOff x="0" y="0"/>
-          <a:chExt cx="0" cy="0"/>
-        </a:xfrm>
-      </p:grpSpPr>
-      <p:pic>
-        <p:nvPicPr>
-          <p:cNvPr id="4098" name="Picture 2" descr="Image result for hans rosling"/>
-          <p:cNvPicPr>
-            <a:picLocks noChangeAspect="1" noChangeArrowheads="1"/>
-          </p:cNvPicPr>
-          <p:nvPr/>
-        </p:nvPicPr>
-        <p:blipFill>
-          <a:blip r:embed="rId3">
-            <a:extLst>
-              <a:ext uri="{28A0092B-C50C-407E-A947-70E740481C1C}">
-                <a14:useLocalDpi xmlns:a14="http://schemas.microsoft.com/office/drawing/2010/main" val="0"/>
-              </a:ext>
-            </a:extLst>
-          </a:blip>
-          <a:srcRect/>
-          <a:stretch>
-            <a:fillRect/>
-          </a:stretch>
-        </p:blipFill>
-        <p:spPr bwMode="auto">
-          <a:xfrm>
-            <a:off x="613721" y="1447802"/>
-            <a:ext cx="5696464" cy="4272348"/>
-          </a:xfrm>
-          <a:prstGeom prst="rect">
-            <a:avLst/>
-          </a:prstGeom>
-          <a:noFill/>
-          <a:extLst>
-            <a:ext uri="{909E8E84-426E-40DD-AFC4-6F175D3DCCD1}">
-              <a14:hiddenFill xmlns:a14="http://schemas.microsoft.com/office/drawing/2010/main">
-                <a:solidFill>
-                  <a:srgbClr val="FFFFFF"/>
-                </a:solidFill>
-              </a14:hiddenFill>
-            </a:ext>
-          </a:extLst>
-        </p:spPr>
-      </p:pic>
-      <p:pic>
-        <p:nvPicPr>
-          <p:cNvPr id="4100" name="Picture 4" descr="Image result for how to lie with statistics"/>
-          <p:cNvPicPr>
-            <a:picLocks noChangeAspect="1" noChangeArrowheads="1"/>
-          </p:cNvPicPr>
-          <p:nvPr/>
-        </p:nvPicPr>
-        <p:blipFill>
-          <a:blip r:embed="rId4">
-            <a:extLst>
-              <a:ext uri="{28A0092B-C50C-407E-A947-70E740481C1C}">
-                <a14:useLocalDpi xmlns:a14="http://schemas.microsoft.com/office/drawing/2010/main" val="0"/>
-              </a:ext>
-            </a:extLst>
-          </a:blip>
-          <a:srcRect/>
-          <a:stretch>
-            <a:fillRect/>
-          </a:stretch>
-        </p:blipFill>
-        <p:spPr bwMode="auto">
-          <a:xfrm>
-            <a:off x="7092779" y="1447802"/>
-            <a:ext cx="4261020" cy="4261020"/>
-          </a:xfrm>
-          <a:prstGeom prst="rect">
-            <a:avLst/>
-          </a:prstGeom>
-          <a:noFill/>
-          <a:extLst>
-            <a:ext uri="{909E8E84-426E-40DD-AFC4-6F175D3DCCD1}">
-              <a14:hiddenFill xmlns:a14="http://schemas.microsoft.com/office/drawing/2010/main">
-                <a:solidFill>
-                  <a:srgbClr val="FFFFFF"/>
-                </a:solidFill>
-              </a14:hiddenFill>
-            </a:ext>
-          </a:extLst>
-        </p:spPr>
-      </p:pic>
-    </p:spTree>
-    <p:extLst>
-      <p:ext uri="{BB962C8B-B14F-4D97-AF65-F5344CB8AC3E}">
-        <p14:creationId xmlns:p14="http://schemas.microsoft.com/office/powerpoint/2010/main" val="412592758"/>
-      </p:ext>
-    </p:extLst>
-  </p:cSld>
-  <p:clrMapOvr>
-    <a:masterClrMapping/>
-  </p:clrMapOvr>
-</p:sld>
-</file>
-
 <file path=ppt/slides/slide9.xml><?xml version="1.0" encoding="utf-8"?>
 <p:sld xmlns:a="http://schemas.openxmlformats.org/drawingml/2006/main" xmlns:r="http://schemas.openxmlformats.org/officeDocument/2006/relationships" xmlns:p="http://schemas.openxmlformats.org/presentationml/2006/main">
   <p:cSld>
@@ -9385,7 +9452,7 @@
         </p:spPr>
         <p:txBody>
           <a:bodyPr>
-            <a:normAutofit fontScale="92500"/>
+            <a:normAutofit/>
           </a:bodyPr>
           <a:lstStyle/>
           <a:p>
@@ -9394,7 +9461,7 @@
             </a:pPr>
             <a:r>
               <a:rPr lang="en-US" sz="4800" dirty="0"/>
-              <a:t>“In God we trust, all others must bring data”</a:t>
+              <a:t>“Let the dataset change your mindset.”</a:t>
             </a:r>
           </a:p>
           <a:p>
@@ -9403,15 +9470,20 @@
             </a:pPr>
             <a:r>
               <a:rPr lang="en-US" sz="4800" dirty="0"/>
-              <a:t>- W. Edwards Deming</a:t>
-            </a:r>
+              <a:t>- Hans </a:t>
+            </a:r>
+            <a:r>
+              <a:rPr lang="en-US" sz="4800" dirty="0" err="1"/>
+              <a:t>Rosling</a:t>
+            </a:r>
+            <a:endParaRPr lang="en-US" sz="4800" dirty="0"/>
           </a:p>
         </p:txBody>
       </p:sp>
     </p:spTree>
     <p:extLst>
       <p:ext uri="{BB962C8B-B14F-4D97-AF65-F5344CB8AC3E}">
-        <p14:creationId xmlns:p14="http://schemas.microsoft.com/office/powerpoint/2010/main" val="484091321"/>
+        <p14:creationId xmlns:p14="http://schemas.microsoft.com/office/powerpoint/2010/main" val="2504119030"/>
       </p:ext>
     </p:extLst>
   </p:cSld>

</xml_diff>

<commit_message>
Minor updates and tweaks
</commit_message>
<xml_diff>
--- a/slides/r_slides.pptx
+++ b/slides/r_slides.pptx
@@ -5,7 +5,7 @@
     <p:sldMasterId id="2147483648" r:id="rId1"/>
   </p:sldMasterIdLst>
   <p:notesMasterIdLst>
-    <p:notesMasterId r:id="rId29"/>
+    <p:notesMasterId r:id="rId27"/>
   </p:notesMasterIdLst>
   <p:sldIdLst>
     <p:sldId id="256" r:id="rId2"/>
@@ -13,28 +13,26 @@
     <p:sldId id="310" r:id="rId4"/>
     <p:sldId id="338" r:id="rId5"/>
     <p:sldId id="329" r:id="rId6"/>
-    <p:sldId id="316" r:id="rId7"/>
-    <p:sldId id="333" r:id="rId8"/>
-    <p:sldId id="327" r:id="rId9"/>
-    <p:sldId id="309" r:id="rId10"/>
-    <p:sldId id="328" r:id="rId11"/>
-    <p:sldId id="315" r:id="rId12"/>
-    <p:sldId id="319" r:id="rId13"/>
-    <p:sldId id="334" r:id="rId14"/>
-    <p:sldId id="326" r:id="rId15"/>
-    <p:sldId id="321" r:id="rId16"/>
-    <p:sldId id="324" r:id="rId17"/>
-    <p:sldId id="325" r:id="rId18"/>
-    <p:sldId id="323" r:id="rId19"/>
-    <p:sldId id="332" r:id="rId20"/>
-    <p:sldId id="330" r:id="rId21"/>
-    <p:sldId id="331" r:id="rId22"/>
-    <p:sldId id="298" r:id="rId23"/>
-    <p:sldId id="280" r:id="rId24"/>
-    <p:sldId id="337" r:id="rId25"/>
-    <p:sldId id="336" r:id="rId26"/>
-    <p:sldId id="335" r:id="rId27"/>
-    <p:sldId id="281" r:id="rId28"/>
+    <p:sldId id="333" r:id="rId7"/>
+    <p:sldId id="327" r:id="rId8"/>
+    <p:sldId id="328" r:id="rId9"/>
+    <p:sldId id="339" r:id="rId10"/>
+    <p:sldId id="319" r:id="rId11"/>
+    <p:sldId id="334" r:id="rId12"/>
+    <p:sldId id="326" r:id="rId13"/>
+    <p:sldId id="321" r:id="rId14"/>
+    <p:sldId id="324" r:id="rId15"/>
+    <p:sldId id="325" r:id="rId16"/>
+    <p:sldId id="323" r:id="rId17"/>
+    <p:sldId id="332" r:id="rId18"/>
+    <p:sldId id="330" r:id="rId19"/>
+    <p:sldId id="331" r:id="rId20"/>
+    <p:sldId id="280" r:id="rId21"/>
+    <p:sldId id="337" r:id="rId22"/>
+    <p:sldId id="336" r:id="rId23"/>
+    <p:sldId id="335" r:id="rId24"/>
+    <p:sldId id="298" r:id="rId25"/>
+    <p:sldId id="281" r:id="rId26"/>
   </p:sldIdLst>
   <p:sldSz cx="12192000" cy="6858000"/>
   <p:notesSz cx="6858000" cy="9144000"/>
@@ -227,7 +225,7 @@
           <a:p>
             <a:fld id="{2EF9E3F5-87A8-46BA-A07D-41DEE1AB9BCE}" type="datetimeFigureOut">
               <a:rPr lang="en-US" smtClean="0"/>
-              <a:t>5/31/2017</a:t>
+              <a:t>6/2/2017</a:t>
             </a:fld>
             <a:endParaRPr lang="en-US"/>
           </a:p>
@@ -625,9 +623,26 @@
           <a:bodyPr/>
           <a:lstStyle/>
           <a:p>
-            <a:r>
-              <a:rPr lang="en-US" dirty="0"/>
-              <a:t>Scala – JVM based language. Like a more functional version of C#</a:t>
+            <a:pPr marL="0" marR="0" lvl="0" indent="0" algn="l" defTabSz="914400" rtl="0" eaLnBrk="1" fontAlgn="auto" latinLnBrk="0" hangingPunct="1">
+              <a:lnSpc>
+                <a:spcPct val="100000"/>
+              </a:lnSpc>
+              <a:spcBef>
+                <a:spcPts val="0"/>
+              </a:spcBef>
+              <a:spcAft>
+                <a:spcPts val="0"/>
+              </a:spcAft>
+              <a:buClrTx/>
+              <a:buSzTx/>
+              <a:buFontTx/>
+              <a:buNone/>
+              <a:tabLst/>
+              <a:defRPr/>
+            </a:pPr>
+            <a:r>
+              <a:rPr lang="en-US" dirty="0"/>
+              <a:t>Trick question… they’re all good. (though we’re going to talk about R)</a:t>
             </a:r>
           </a:p>
           <a:p>
@@ -636,19 +651,7 @@
           <a:p>
             <a:r>
               <a:rPr lang="en-US" dirty="0"/>
-              <a:t>Python and R are the two heavy hitters in this space. </a:t>
-            </a:r>
-          </a:p>
-          <a:p>
-            <a:r>
-              <a:rPr lang="en-US" dirty="0"/>
-              <a:t>Python – Easy to learn OOP Scripting Language. The default choice for academics</a:t>
-            </a:r>
-          </a:p>
-          <a:p>
-            <a:r>
-              <a:rPr lang="en-US" dirty="0"/>
-              <a:t>R – “built by statisticians, for statisticians” | Based on the S programming language, it came in 2000 and has been steadily gaining in popularity with data scientists. </a:t>
+              <a:t>Consultant answer – it depends. </a:t>
             </a:r>
           </a:p>
           <a:p>
@@ -657,15 +660,7 @@
           <a:p>
             <a:r>
               <a:rPr lang="en-US" dirty="0"/>
-              <a:t>There are other languages: Julia, Go, </a:t>
-            </a:r>
-            <a:r>
-              <a:rPr lang="en-US" dirty="0" err="1"/>
-              <a:t>etc</a:t>
-            </a:r>
-            <a:r>
-              <a:rPr lang="en-US" dirty="0"/>
-              <a:t>…</a:t>
+              <a:t>Each has their own flavor and advantages. </a:t>
             </a:r>
           </a:p>
           <a:p>
@@ -674,32 +669,99 @@
           <a:p>
             <a:r>
               <a:rPr lang="en-US" dirty="0"/>
-              <a:t>http://www.infoworld.com/article/3049672/application-development/which-freaking-big-data-programming-language-should-i-use.html</a:t>
-            </a:r>
-          </a:p>
-          <a:p>
-            <a:r>
-              <a:rPr lang="en-US" dirty="0"/>
-              <a:t>https://en.wikipedia.org/wiki/R_(programming_language)</a:t>
-            </a:r>
-          </a:p>
-          <a:p>
-            <a:r>
-              <a:rPr lang="en-US" dirty="0"/>
-              <a:t>https://en.wikipedia.org/wiki/S_(programming_language)</a:t>
-            </a:r>
-          </a:p>
-          <a:p>
-            <a:r>
-              <a:rPr lang="en-US" dirty="0"/>
-              <a:t>https://en.wikipedia.org/wiki/Python_(programming_language)</a:t>
-            </a:r>
-          </a:p>
-          <a:p>
-            <a:r>
-              <a:rPr lang="en-US" dirty="0"/>
-              <a:t>https://en.wikipedia.org/wiki/Scala_(programming_language)</a:t>
-            </a:r>
+              <a:t>Scala is great for people who are familiar with JVM tools. It’s also great for talking to Apache’s big data tools, like Spark. (relate my experience using .NET for this purpose)</a:t>
+            </a:r>
+          </a:p>
+          <a:p>
+            <a:pPr marL="171450" indent="-171450">
+              <a:buFontTx/>
+              <a:buChar char="-"/>
+            </a:pPr>
+            <a:r>
+              <a:rPr lang="en-US" dirty="0"/>
+              <a:t>Scala is also statically typed. </a:t>
+            </a:r>
+          </a:p>
+          <a:p>
+            <a:pPr marL="171450" indent="-171450">
+              <a:buFontTx/>
+              <a:buChar char="-"/>
+            </a:pPr>
+            <a:endParaRPr lang="en-US" dirty="0"/>
+          </a:p>
+          <a:p>
+            <a:endParaRPr lang="en-US" dirty="0"/>
+          </a:p>
+          <a:p>
+            <a:r>
+              <a:rPr lang="en-US" dirty="0"/>
+              <a:t>Python is really easy to learn and it’s used in lots of different places. You should pick it up for that reason alone. Python excels at data cleanup. </a:t>
+            </a:r>
+          </a:p>
+          <a:p>
+            <a:endParaRPr lang="en-US" dirty="0"/>
+          </a:p>
+          <a:p>
+            <a:pPr marL="0" marR="0" lvl="0" indent="0" algn="l" defTabSz="914400" rtl="0" eaLnBrk="1" fontAlgn="auto" latinLnBrk="0" hangingPunct="1">
+              <a:lnSpc>
+                <a:spcPct val="100000"/>
+              </a:lnSpc>
+              <a:spcBef>
+                <a:spcPts val="0"/>
+              </a:spcBef>
+              <a:spcAft>
+                <a:spcPts val="0"/>
+              </a:spcAft>
+              <a:buClrTx/>
+              <a:buSzTx/>
+              <a:buFontTx/>
+              <a:buNone/>
+              <a:tabLst/>
+              <a:defRPr/>
+            </a:pPr>
+            <a:r>
+              <a:rPr lang="en-US" dirty="0"/>
+              <a:t>R is great at statistical analysis. </a:t>
+            </a:r>
+          </a:p>
+          <a:p>
+            <a:endParaRPr lang="en-US" dirty="0"/>
+          </a:p>
+          <a:p>
+            <a:r>
+              <a:rPr lang="en-US" dirty="0"/>
+              <a:t>-----</a:t>
+            </a:r>
+          </a:p>
+          <a:p>
+            <a:endParaRPr lang="en-US" dirty="0"/>
+          </a:p>
+          <a:p>
+            <a:r>
+              <a:rPr lang="en-US" dirty="0"/>
+              <a:t>As someone who lives in the Microsoft ecosystem, Python and R are intriguing to me because they’re supported in Visual Studio. </a:t>
+            </a:r>
+          </a:p>
+          <a:p>
+            <a:endParaRPr lang="en-US" dirty="0"/>
+          </a:p>
+          <a:p>
+            <a:r>
+              <a:rPr lang="en-US" dirty="0"/>
+              <a:t>-----</a:t>
+            </a:r>
+          </a:p>
+          <a:p>
+            <a:endParaRPr lang="en-US" dirty="0"/>
+          </a:p>
+          <a:p>
+            <a:r>
+              <a:rPr lang="en-US" dirty="0"/>
+              <a:t>I’m personally an advocate of the polyglot approach. Learn them all… </a:t>
+            </a:r>
+          </a:p>
+          <a:p>
+            <a:endParaRPr lang="en-US" dirty="0"/>
           </a:p>
         </p:txBody>
       </p:sp>
@@ -720,7 +782,7 @@
           <a:p>
             <a:fld id="{E5A097B1-DDF2-47DB-BEB4-A56B76E0BD07}" type="slidenum">
               <a:rPr lang="en-US" smtClean="0"/>
-              <a:t>12</a:t>
+              <a:t>11</a:t>
             </a:fld>
             <a:endParaRPr lang="en-US"/>
           </a:p>
@@ -729,7 +791,7 @@
     </p:spTree>
     <p:extLst>
       <p:ext uri="{BB962C8B-B14F-4D97-AF65-F5344CB8AC3E}">
-        <p14:creationId xmlns:p14="http://schemas.microsoft.com/office/powerpoint/2010/main" val="458254567"/>
+        <p14:creationId xmlns:p14="http://schemas.microsoft.com/office/powerpoint/2010/main" val="432235032"/>
       </p:ext>
     </p:extLst>
   </p:cSld>
@@ -783,145 +845,31 @@
           <a:bodyPr/>
           <a:lstStyle/>
           <a:p>
-            <a:pPr marL="0" marR="0" lvl="0" indent="0" algn="l" defTabSz="914400" rtl="0" eaLnBrk="1" fontAlgn="auto" latinLnBrk="0" hangingPunct="1">
-              <a:lnSpc>
-                <a:spcPct val="100000"/>
-              </a:lnSpc>
-              <a:spcBef>
-                <a:spcPts val="0"/>
-              </a:spcBef>
-              <a:spcAft>
-                <a:spcPts val="0"/>
-              </a:spcAft>
-              <a:buClrTx/>
-              <a:buSzTx/>
-              <a:buFontTx/>
-              <a:buNone/>
-              <a:tabLst/>
-              <a:defRPr/>
-            </a:pPr>
-            <a:r>
-              <a:rPr lang="en-US" dirty="0"/>
-              <a:t>Trick question… they’re all good. (though we’re going to talk about R)</a:t>
+            <a:r>
+              <a:rPr lang="en-US" dirty="0"/>
+              <a:t>Free as in speech and beer. </a:t>
+            </a:r>
+          </a:p>
+          <a:p>
+            <a:r>
+              <a:rPr lang="en-US" dirty="0"/>
+              <a:t>Unlike some commercial packages that cost tons of cash. </a:t>
             </a:r>
           </a:p>
           <a:p>
             <a:endParaRPr lang="en-US" dirty="0"/>
           </a:p>
           <a:p>
-            <a:r>
-              <a:rPr lang="en-US" dirty="0"/>
-              <a:t>Consultant answer – it depends. </a:t>
-            </a:r>
-          </a:p>
-          <a:p>
             <a:endParaRPr lang="en-US" dirty="0"/>
           </a:p>
           <a:p>
-            <a:r>
-              <a:rPr lang="en-US" dirty="0"/>
-              <a:t>Each has their own flavor and advantages. </a:t>
-            </a:r>
-          </a:p>
-          <a:p>
             <a:endParaRPr lang="en-US" dirty="0"/>
           </a:p>
           <a:p>
             <a:r>
               <a:rPr lang="en-US" dirty="0"/>
-              <a:t>Scala is great for people who are familiar with JVM tools. It’s also great for talking to Apache’s big data tools, like Spark. (relate my experience using .NET for this purpose)</a:t>
-            </a:r>
-          </a:p>
-          <a:p>
-            <a:pPr marL="171450" indent="-171450">
-              <a:buFontTx/>
-              <a:buChar char="-"/>
-            </a:pPr>
-            <a:r>
-              <a:rPr lang="en-US" dirty="0"/>
-              <a:t>Scala is also statically typed. </a:t>
-            </a:r>
-          </a:p>
-          <a:p>
-            <a:pPr marL="171450" indent="-171450">
-              <a:buFontTx/>
-              <a:buChar char="-"/>
-            </a:pPr>
-            <a:endParaRPr lang="en-US" dirty="0"/>
-          </a:p>
-          <a:p>
-            <a:endParaRPr lang="en-US" dirty="0"/>
-          </a:p>
-          <a:p>
-            <a:r>
-              <a:rPr lang="en-US" dirty="0"/>
-              <a:t>Python is really easy to learn and it’s used in lots of different places. You should pick it up for that reason alone. Python excels at data cleanup. </a:t>
-            </a:r>
-          </a:p>
-          <a:p>
-            <a:endParaRPr lang="en-US" dirty="0"/>
-          </a:p>
-          <a:p>
-            <a:pPr marL="0" marR="0" lvl="0" indent="0" algn="l" defTabSz="914400" rtl="0" eaLnBrk="1" fontAlgn="auto" latinLnBrk="0" hangingPunct="1">
-              <a:lnSpc>
-                <a:spcPct val="100000"/>
-              </a:lnSpc>
-              <a:spcBef>
-                <a:spcPts val="0"/>
-              </a:spcBef>
-              <a:spcAft>
-                <a:spcPts val="0"/>
-              </a:spcAft>
-              <a:buClrTx/>
-              <a:buSzTx/>
-              <a:buFontTx/>
-              <a:buNone/>
-              <a:tabLst/>
-              <a:defRPr/>
-            </a:pPr>
-            <a:r>
-              <a:rPr lang="en-US" dirty="0"/>
-              <a:t>R is great at statistical analysis. </a:t>
-            </a:r>
-          </a:p>
-          <a:p>
-            <a:endParaRPr lang="en-US" dirty="0"/>
-          </a:p>
-          <a:p>
-            <a:r>
-              <a:rPr lang="en-US" dirty="0"/>
-              <a:t>-----</a:t>
-            </a:r>
-          </a:p>
-          <a:p>
-            <a:endParaRPr lang="en-US" dirty="0"/>
-          </a:p>
-          <a:p>
-            <a:r>
-              <a:rPr lang="en-US" dirty="0"/>
-              <a:t>As someone who lives in the Microsoft ecosystem, Python and R are intriguing to me because they’re supported in Visual Studio. </a:t>
-            </a:r>
-          </a:p>
-          <a:p>
-            <a:endParaRPr lang="en-US" dirty="0"/>
-          </a:p>
-          <a:p>
-            <a:r>
-              <a:rPr lang="en-US" dirty="0"/>
-              <a:t>-----</a:t>
-            </a:r>
-          </a:p>
-          <a:p>
-            <a:endParaRPr lang="en-US" dirty="0"/>
-          </a:p>
-          <a:p>
-            <a:r>
-              <a:rPr lang="en-US" dirty="0"/>
-              <a:t>I’m personally an advocate of the polyglot approach. Learn them all… </a:t>
-            </a:r>
-          </a:p>
-          <a:p>
-            <a:endParaRPr lang="en-US" dirty="0"/>
+              <a:t>http://www.metmuseum.org/art/collection/search/380487</a:t>
+            </a:r>
           </a:p>
         </p:txBody>
       </p:sp>
@@ -951,7 +899,7 @@
     </p:spTree>
     <p:extLst>
       <p:ext uri="{BB962C8B-B14F-4D97-AF65-F5344CB8AC3E}">
-        <p14:creationId xmlns:p14="http://schemas.microsoft.com/office/powerpoint/2010/main" val="432235032"/>
+        <p14:creationId xmlns:p14="http://schemas.microsoft.com/office/powerpoint/2010/main" val="410457494"/>
       </p:ext>
     </p:extLst>
   </p:cSld>
@@ -1007,28 +955,25 @@
           <a:p>
             <a:r>
               <a:rPr lang="en-US" dirty="0"/>
-              <a:t>Free as in speech and beer. </a:t>
-            </a:r>
-          </a:p>
-          <a:p>
-            <a:r>
-              <a:rPr lang="en-US" dirty="0"/>
-              <a:t>Unlike some commercial packages that cost tons of cash. </a:t>
+              <a:t>Made by statisticians, for statisticians. </a:t>
             </a:r>
           </a:p>
           <a:p>
             <a:endParaRPr lang="en-US" dirty="0"/>
           </a:p>
           <a:p>
+            <a:r>
+              <a:rPr lang="en-US" dirty="0"/>
+              <a:t>If there’s a statistical thing you want to do, there’s probably a package for that already. </a:t>
+            </a:r>
+          </a:p>
+          <a:p>
             <a:endParaRPr lang="en-US" dirty="0"/>
           </a:p>
           <a:p>
-            <a:endParaRPr lang="en-US" dirty="0"/>
-          </a:p>
-          <a:p>
-            <a:r>
-              <a:rPr lang="en-US" dirty="0"/>
-              <a:t>http://www.metmuseum.org/art/collection/search/380487</a:t>
+            <a:r>
+              <a:rPr lang="en-US" dirty="0"/>
+              <a:t>It smooths out any rough edges in the data exploration process. </a:t>
             </a:r>
           </a:p>
         </p:txBody>
@@ -1050,7 +995,7 @@
           <a:p>
             <a:fld id="{E5A097B1-DDF2-47DB-BEB4-A56B76E0BD07}" type="slidenum">
               <a:rPr lang="en-US" smtClean="0"/>
-              <a:t>15</a:t>
+              <a:t>14</a:t>
             </a:fld>
             <a:endParaRPr lang="en-US"/>
           </a:p>
@@ -1059,7 +1004,7 @@
     </p:spTree>
     <p:extLst>
       <p:ext uri="{BB962C8B-B14F-4D97-AF65-F5344CB8AC3E}">
-        <p14:creationId xmlns:p14="http://schemas.microsoft.com/office/powerpoint/2010/main" val="410457494"/>
+        <p14:creationId xmlns:p14="http://schemas.microsoft.com/office/powerpoint/2010/main" val="1093990607"/>
       </p:ext>
     </p:extLst>
   </p:cSld>
@@ -1115,16 +1060,34 @@
           <a:p>
             <a:r>
               <a:rPr lang="en-US" dirty="0"/>
-              <a:t>Made by statisticians, for statisticians. </a:t>
-            </a:r>
-          </a:p>
-          <a:p>
+              <a:t>Visual Studio or </a:t>
+            </a:r>
+            <a:r>
+              <a:rPr lang="en-US" dirty="0" err="1"/>
+              <a:t>rStudio</a:t>
+            </a:r>
             <a:endParaRPr lang="en-US" dirty="0"/>
           </a:p>
           <a:p>
             <a:r>
               <a:rPr lang="en-US" dirty="0"/>
-              <a:t>If there’s a statistical thing you want to do, there’s probably a package for that already. </a:t>
+              <a:t>SQL Server</a:t>
+            </a:r>
+          </a:p>
+          <a:p>
+            <a:r>
+              <a:rPr lang="en-US" dirty="0" err="1"/>
+              <a:t>Jupyter</a:t>
+            </a:r>
+            <a:r>
+              <a:rPr lang="en-US" dirty="0"/>
+              <a:t> Notebooks</a:t>
+            </a:r>
+          </a:p>
+          <a:p>
+            <a:r>
+              <a:rPr lang="en-US" dirty="0"/>
+              <a:t>Zeppelin Notebooks</a:t>
             </a:r>
           </a:p>
           <a:p>
@@ -1133,8 +1096,11 @@
           <a:p>
             <a:r>
               <a:rPr lang="en-US" dirty="0"/>
-              <a:t>It smooths out any rough edges in the data exploration process. </a:t>
-            </a:r>
+              <a:t>Low Ceremony</a:t>
+            </a:r>
+          </a:p>
+          <a:p>
+            <a:endParaRPr lang="en-US" dirty="0"/>
           </a:p>
         </p:txBody>
       </p:sp>
@@ -1155,7 +1121,7 @@
           <a:p>
             <a:fld id="{E5A097B1-DDF2-47DB-BEB4-A56B76E0BD07}" type="slidenum">
               <a:rPr lang="en-US" smtClean="0"/>
-              <a:t>16</a:t>
+              <a:t>15</a:t>
             </a:fld>
             <a:endParaRPr lang="en-US"/>
           </a:p>
@@ -1164,7 +1130,7 @@
     </p:spTree>
     <p:extLst>
       <p:ext uri="{BB962C8B-B14F-4D97-AF65-F5344CB8AC3E}">
-        <p14:creationId xmlns:p14="http://schemas.microsoft.com/office/powerpoint/2010/main" val="1093990607"/>
+        <p14:creationId xmlns:p14="http://schemas.microsoft.com/office/powerpoint/2010/main" val="2458084230"/>
       </p:ext>
     </p:extLst>
   </p:cSld>
@@ -1220,44 +1186,11 @@
           <a:p>
             <a:r>
               <a:rPr lang="en-US" dirty="0"/>
-              <a:t>Visual Studio or </a:t>
-            </a:r>
-            <a:r>
-              <a:rPr lang="en-US" dirty="0" err="1"/>
-              <a:t>rStudio</a:t>
-            </a:r>
+              <a:t>R really shines at ripping through datasets and building models. </a:t>
+            </a:r>
+          </a:p>
+          <a:p>
             <a:endParaRPr lang="en-US" dirty="0"/>
-          </a:p>
-          <a:p>
-            <a:r>
-              <a:rPr lang="en-US" dirty="0"/>
-              <a:t>SQL Server</a:t>
-            </a:r>
-          </a:p>
-          <a:p>
-            <a:r>
-              <a:rPr lang="en-US" dirty="0" err="1"/>
-              <a:t>Jupyter</a:t>
-            </a:r>
-            <a:r>
-              <a:rPr lang="en-US" dirty="0"/>
-              <a:t> Notebooks</a:t>
-            </a:r>
-          </a:p>
-          <a:p>
-            <a:r>
-              <a:rPr lang="en-US" dirty="0"/>
-              <a:t>Zeppelin Notebooks</a:t>
-            </a:r>
-          </a:p>
-          <a:p>
-            <a:endParaRPr lang="en-US" dirty="0"/>
-          </a:p>
-          <a:p>
-            <a:r>
-              <a:rPr lang="en-US" dirty="0"/>
-              <a:t>Low Ceremony</a:t>
-            </a:r>
           </a:p>
           <a:p>
             <a:endParaRPr lang="en-US" dirty="0"/>
@@ -1281,7 +1214,7 @@
           <a:p>
             <a:fld id="{E5A097B1-DDF2-47DB-BEB4-A56B76E0BD07}" type="slidenum">
               <a:rPr lang="en-US" smtClean="0"/>
-              <a:t>17</a:t>
+              <a:t>16</a:t>
             </a:fld>
             <a:endParaRPr lang="en-US"/>
           </a:p>
@@ -1290,7 +1223,7 @@
     </p:spTree>
     <p:extLst>
       <p:ext uri="{BB962C8B-B14F-4D97-AF65-F5344CB8AC3E}">
-        <p14:creationId xmlns:p14="http://schemas.microsoft.com/office/powerpoint/2010/main" val="2458084230"/>
+        <p14:creationId xmlns:p14="http://schemas.microsoft.com/office/powerpoint/2010/main" val="3500013465"/>
       </p:ext>
     </p:extLst>
   </p:cSld>
@@ -1346,11 +1279,35 @@
           <a:p>
             <a:r>
               <a:rPr lang="en-US" dirty="0"/>
-              <a:t>R really shines at ripping through datasets and building models. </a:t>
+              <a:t>R is not a general purpose language. </a:t>
             </a:r>
           </a:p>
           <a:p>
             <a:endParaRPr lang="en-US" dirty="0"/>
+          </a:p>
+          <a:p>
+            <a:r>
+              <a:rPr lang="en-US" dirty="0"/>
+              <a:t>It shouldn’t be used in situations with no data analysis</a:t>
+            </a:r>
+          </a:p>
+          <a:p>
+            <a:endParaRPr lang="en-US" dirty="0"/>
+          </a:p>
+          <a:p>
+            <a:r>
+              <a:rPr lang="en-US" dirty="0"/>
+              <a:t>While it can build web apps, you aren’t going to build the next Google or Facebook in R</a:t>
+            </a:r>
+          </a:p>
+          <a:p>
+            <a:endParaRPr lang="en-US" dirty="0"/>
+          </a:p>
+          <a:p>
+            <a:r>
+              <a:rPr lang="en-US" dirty="0"/>
+              <a:t>Some people also claim that R isn’t great at big data, but R can plug into lots of big data tools. </a:t>
+            </a:r>
           </a:p>
           <a:p>
             <a:endParaRPr lang="en-US" dirty="0"/>
@@ -1374,7 +1331,7 @@
           <a:p>
             <a:fld id="{E5A097B1-DDF2-47DB-BEB4-A56B76E0BD07}" type="slidenum">
               <a:rPr lang="en-US" smtClean="0"/>
-              <a:t>18</a:t>
+              <a:t>17</a:t>
             </a:fld>
             <a:endParaRPr lang="en-US"/>
           </a:p>
@@ -1383,7 +1340,7 @@
     </p:spTree>
     <p:extLst>
       <p:ext uri="{BB962C8B-B14F-4D97-AF65-F5344CB8AC3E}">
-        <p14:creationId xmlns:p14="http://schemas.microsoft.com/office/powerpoint/2010/main" val="3500013465"/>
+        <p14:creationId xmlns:p14="http://schemas.microsoft.com/office/powerpoint/2010/main" val="1328570390"/>
       </p:ext>
     </p:extLst>
   </p:cSld>
@@ -1439,7 +1396,7 @@
           <a:p>
             <a:r>
               <a:rPr lang="en-US" dirty="0"/>
-              <a:t>R is not a general purpose language. </a:t>
+              <a:t>Dynamically typed</a:t>
             </a:r>
           </a:p>
           <a:p>
@@ -1448,7 +1405,7 @@
           <a:p>
             <a:r>
               <a:rPr lang="en-US" dirty="0"/>
-              <a:t>It shouldn’t be used in situations with no data analysis</a:t>
+              <a:t>Interpreted – often run interactively</a:t>
             </a:r>
           </a:p>
           <a:p>
@@ -1457,7 +1414,7 @@
           <a:p>
             <a:r>
               <a:rPr lang="en-US" dirty="0"/>
-              <a:t>While it can build web apps, you aren’t going to build the next Google or Facebook in R</a:t>
+              <a:t>Multi paradigm, mostly functional</a:t>
             </a:r>
           </a:p>
           <a:p>
@@ -1466,8 +1423,20 @@
           <a:p>
             <a:r>
               <a:rPr lang="en-US" dirty="0"/>
-              <a:t>Some people also claim that R isn’t great at big data, but R can plug into lots of big data tools. </a:t>
-            </a:r>
+              <a:t>The primary R – IDE is R Studio, though Visual Studio has decent R support. </a:t>
+            </a:r>
+          </a:p>
+          <a:p>
+            <a:endParaRPr lang="en-US" dirty="0"/>
+          </a:p>
+          <a:p>
+            <a:r>
+              <a:rPr lang="en-US" dirty="0"/>
+              <a:t>-- Fire up some demos</a:t>
+            </a:r>
+          </a:p>
+          <a:p>
+            <a:endParaRPr lang="en-US" dirty="0"/>
           </a:p>
           <a:p>
             <a:endParaRPr lang="en-US" dirty="0"/>
@@ -1491,7 +1460,7 @@
           <a:p>
             <a:fld id="{E5A097B1-DDF2-47DB-BEB4-A56B76E0BD07}" type="slidenum">
               <a:rPr lang="en-US" smtClean="0"/>
-              <a:t>19</a:t>
+              <a:t>18</a:t>
             </a:fld>
             <a:endParaRPr lang="en-US"/>
           </a:p>
@@ -1500,7 +1469,7 @@
     </p:spTree>
     <p:extLst>
       <p:ext uri="{BB962C8B-B14F-4D97-AF65-F5344CB8AC3E}">
-        <p14:creationId xmlns:p14="http://schemas.microsoft.com/office/powerpoint/2010/main" val="1328570390"/>
+        <p14:creationId xmlns:p14="http://schemas.microsoft.com/office/powerpoint/2010/main" val="2774716566"/>
       </p:ext>
     </p:extLst>
   </p:cSld>
@@ -1556,7 +1525,7 @@
           <a:p>
             <a:r>
               <a:rPr lang="en-US" dirty="0"/>
-              <a:t>Dynamically typed</a:t>
+              <a:t>CRAN Version – Standard R | R development core team (CRAN stands for Comprehensive R Archive Network)</a:t>
             </a:r>
           </a:p>
           <a:p>
@@ -1565,7 +1534,13 @@
           <a:p>
             <a:r>
               <a:rPr lang="en-US" dirty="0"/>
-              <a:t>Interpreted – often run interactively</a:t>
+              <a:t>Microsoft Version  - MRAN | “Enhanced R”</a:t>
+            </a:r>
+          </a:p>
+          <a:p>
+            <a:r>
+              <a:rPr lang="en-US" dirty="0"/>
+              <a:t>https://mran.microsoft.com/open/</a:t>
             </a:r>
           </a:p>
           <a:p>
@@ -1574,7 +1549,7 @@
           <a:p>
             <a:r>
               <a:rPr lang="en-US" dirty="0"/>
-              <a:t>Multi paradigm, mostly functional</a:t>
+              <a:t>Tradeoff -  Microsoft is faster, CRAN is newer. </a:t>
             </a:r>
           </a:p>
           <a:p>
@@ -1583,23 +1558,41 @@
           <a:p>
             <a:r>
               <a:rPr lang="en-US" dirty="0"/>
-              <a:t>The primary R – IDE is R Studio, though Visual Studio has decent R support. </a:t>
+              <a:t>Others: </a:t>
+            </a:r>
+          </a:p>
+          <a:p>
+            <a:r>
+              <a:rPr lang="en-US" dirty="0"/>
+              <a:t>TIBCO – commercial R, costs money</a:t>
             </a:r>
           </a:p>
           <a:p>
             <a:endParaRPr lang="en-US" dirty="0"/>
           </a:p>
           <a:p>
-            <a:r>
-              <a:rPr lang="en-US" dirty="0"/>
-              <a:t>-- Fire up some demos</a:t>
-            </a:r>
-          </a:p>
-          <a:p>
             <a:endParaRPr lang="en-US" dirty="0"/>
           </a:p>
           <a:p>
             <a:endParaRPr lang="en-US" dirty="0"/>
+          </a:p>
+          <a:p>
+            <a:endParaRPr lang="en-US" dirty="0"/>
+          </a:p>
+          <a:p>
+            <a:endParaRPr lang="en-US" dirty="0"/>
+          </a:p>
+          <a:p>
+            <a:r>
+              <a:rPr lang="en-US" dirty="0"/>
+              <a:t>Photo: </a:t>
+            </a:r>
+          </a:p>
+          <a:p>
+            <a:r>
+              <a:rPr lang="en-US" dirty="0"/>
+              <a:t>https://www.pexels.com/photo/red-green-and-white-ice-cream-scoops-on-brown-cone-200909/</a:t>
+            </a:r>
           </a:p>
         </p:txBody>
       </p:sp>
@@ -1620,7 +1613,7 @@
           <a:p>
             <a:fld id="{E5A097B1-DDF2-47DB-BEB4-A56B76E0BD07}" type="slidenum">
               <a:rPr lang="en-US" smtClean="0"/>
-              <a:t>20</a:t>
+              <a:t>19</a:t>
             </a:fld>
             <a:endParaRPr lang="en-US"/>
           </a:p>
@@ -1629,7 +1622,7 @@
     </p:spTree>
     <p:extLst>
       <p:ext uri="{BB962C8B-B14F-4D97-AF65-F5344CB8AC3E}">
-        <p14:creationId xmlns:p14="http://schemas.microsoft.com/office/powerpoint/2010/main" val="2774716566"/>
+        <p14:creationId xmlns:p14="http://schemas.microsoft.com/office/powerpoint/2010/main" val="1854108322"/>
       </p:ext>
     </p:extLst>
   </p:cSld>
@@ -1683,76 +1676,7 @@
           <a:bodyPr/>
           <a:lstStyle/>
           <a:p>
-            <a:r>
-              <a:rPr lang="en-US" dirty="0"/>
-              <a:t>CRAN Version – Standard R | R development core team (CRAN stands for Comprehensive R Archive Network)</a:t>
-            </a:r>
-          </a:p>
-          <a:p>
             <a:endParaRPr lang="en-US" dirty="0"/>
-          </a:p>
-          <a:p>
-            <a:r>
-              <a:rPr lang="en-US" dirty="0"/>
-              <a:t>Microsoft Version  - MRAN | “Enhanced R”</a:t>
-            </a:r>
-          </a:p>
-          <a:p>
-            <a:r>
-              <a:rPr lang="en-US" dirty="0"/>
-              <a:t>https://mran.microsoft.com/open/</a:t>
-            </a:r>
-          </a:p>
-          <a:p>
-            <a:endParaRPr lang="en-US" dirty="0"/>
-          </a:p>
-          <a:p>
-            <a:r>
-              <a:rPr lang="en-US" dirty="0"/>
-              <a:t>Tradeoff -  Microsoft is faster, CRAN is newer. </a:t>
-            </a:r>
-          </a:p>
-          <a:p>
-            <a:endParaRPr lang="en-US" dirty="0"/>
-          </a:p>
-          <a:p>
-            <a:r>
-              <a:rPr lang="en-US" dirty="0"/>
-              <a:t>Others: </a:t>
-            </a:r>
-          </a:p>
-          <a:p>
-            <a:r>
-              <a:rPr lang="en-US" dirty="0"/>
-              <a:t>TIBCO – commercial R, costs money</a:t>
-            </a:r>
-          </a:p>
-          <a:p>
-            <a:endParaRPr lang="en-US" dirty="0"/>
-          </a:p>
-          <a:p>
-            <a:endParaRPr lang="en-US" dirty="0"/>
-          </a:p>
-          <a:p>
-            <a:endParaRPr lang="en-US" dirty="0"/>
-          </a:p>
-          <a:p>
-            <a:endParaRPr lang="en-US" dirty="0"/>
-          </a:p>
-          <a:p>
-            <a:endParaRPr lang="en-US" dirty="0"/>
-          </a:p>
-          <a:p>
-            <a:r>
-              <a:rPr lang="en-US" dirty="0"/>
-              <a:t>Photo: </a:t>
-            </a:r>
-          </a:p>
-          <a:p>
-            <a:r>
-              <a:rPr lang="en-US" dirty="0"/>
-              <a:t>https://www.pexels.com/photo/red-green-and-white-ice-cream-scoops-on-brown-cone-200909/</a:t>
-            </a:r>
           </a:p>
         </p:txBody>
       </p:sp>
@@ -1773,7 +1697,7 @@
           <a:p>
             <a:fld id="{E5A097B1-DDF2-47DB-BEB4-A56B76E0BD07}" type="slidenum">
               <a:rPr lang="en-US" smtClean="0"/>
-              <a:t>21</a:t>
+              <a:t>20</a:t>
             </a:fld>
             <a:endParaRPr lang="en-US"/>
           </a:p>
@@ -1782,7 +1706,7 @@
     </p:spTree>
     <p:extLst>
       <p:ext uri="{BB962C8B-B14F-4D97-AF65-F5344CB8AC3E}">
-        <p14:creationId xmlns:p14="http://schemas.microsoft.com/office/powerpoint/2010/main" val="1854108322"/>
+        <p14:creationId xmlns:p14="http://schemas.microsoft.com/office/powerpoint/2010/main" val="1525609868"/>
       </p:ext>
     </p:extLst>
   </p:cSld>
@@ -1836,123 +1760,19 @@
           <a:bodyPr/>
           <a:lstStyle/>
           <a:p>
+            <a:r>
+              <a:rPr lang="en-US" dirty="0"/>
+              <a:t>Pre-stats demo</a:t>
+            </a:r>
+          </a:p>
+          <a:p>
             <a:endParaRPr lang="en-US" dirty="0"/>
           </a:p>
           <a:p>
             <a:r>
               <a:rPr lang="en-US" dirty="0"/>
-              <a:t>Over 10k packages</a:t>
-            </a:r>
-          </a:p>
-          <a:p>
-            <a:r>
-              <a:rPr lang="en-US" dirty="0"/>
-              <a:t>https://cran.r-project.org/web/packages/</a:t>
-            </a:r>
-          </a:p>
-          <a:p>
-            <a:endParaRPr lang="en-US" dirty="0"/>
-          </a:p>
-          <a:p>
-            <a:endParaRPr lang="en-US" dirty="0"/>
-          </a:p>
-          <a:p>
-            <a:r>
-              <a:rPr lang="en-US" dirty="0"/>
-              <a:t>https://support.rstudio.com/hc/en-us/articles/201057987-Quick-list-of-useful-R-packages</a:t>
-            </a:r>
-          </a:p>
-          <a:p>
-            <a:endParaRPr lang="en-US" dirty="0"/>
-          </a:p>
-          <a:p>
-            <a:endParaRPr lang="en-US" dirty="0"/>
-          </a:p>
-          <a:p>
-            <a:pPr marL="0" indent="0">
-              <a:buNone/>
-            </a:pPr>
-            <a:r>
-              <a:rPr lang="en-US" sz="1200" dirty="0" err="1"/>
-              <a:t>dplyr</a:t>
-            </a:r>
-            <a:r>
-              <a:rPr lang="en-US" sz="1200" dirty="0"/>
-              <a:t> -  data selection and cleanup </a:t>
-            </a:r>
-          </a:p>
-          <a:p>
-            <a:pPr marL="0" indent="0">
-              <a:buNone/>
-            </a:pPr>
-            <a:r>
-              <a:rPr lang="en-US" sz="1200" dirty="0"/>
-              <a:t>ggplot2 – popular data viz library</a:t>
-            </a:r>
-          </a:p>
-          <a:p>
-            <a:pPr marL="0" indent="0">
-              <a:buNone/>
-            </a:pPr>
-            <a:r>
-              <a:rPr lang="en-US" sz="1200" dirty="0" err="1"/>
-              <a:t>xlsx</a:t>
-            </a:r>
-            <a:r>
-              <a:rPr lang="en-US" sz="1200" dirty="0"/>
-              <a:t> – </a:t>
-            </a:r>
-            <a:r>
-              <a:rPr lang="en-US" sz="1200" dirty="0" err="1"/>
-              <a:t>workwith</a:t>
-            </a:r>
-            <a:r>
-              <a:rPr lang="en-US" sz="1200" dirty="0"/>
-              <a:t> Excel files</a:t>
-            </a:r>
-          </a:p>
-          <a:p>
-            <a:pPr marL="0" indent="0">
-              <a:buNone/>
-            </a:pPr>
-            <a:r>
-              <a:rPr lang="en-US" sz="1200" dirty="0" err="1"/>
-              <a:t>quantmod</a:t>
-            </a:r>
-            <a:r>
-              <a:rPr lang="en-US" sz="1200" dirty="0"/>
-              <a:t> – financial data</a:t>
-            </a:r>
-          </a:p>
-          <a:p>
-            <a:pPr marL="0" indent="0">
-              <a:buNone/>
-            </a:pPr>
-            <a:r>
-              <a:rPr lang="en-US" sz="1200" dirty="0"/>
-              <a:t>Shiny – web framework</a:t>
-            </a:r>
-          </a:p>
-          <a:p>
-            <a:endParaRPr lang="en-US" dirty="0"/>
-          </a:p>
-          <a:p>
-            <a:endParaRPr lang="en-US" dirty="0"/>
-          </a:p>
-          <a:p>
-            <a:endParaRPr lang="en-US" dirty="0"/>
-          </a:p>
-          <a:p>
-            <a:endParaRPr lang="en-US" dirty="0"/>
-          </a:p>
-          <a:p>
-            <a:endParaRPr lang="en-US" dirty="0"/>
-          </a:p>
-          <a:p>
-            <a:endParaRPr lang="en-US" dirty="0"/>
-          </a:p>
-          <a:p>
-            <a:endParaRPr lang="en-US" dirty="0"/>
+              <a:t>https://xkcd.com/1725/</a:t>
+            </a:r>
           </a:p>
         </p:txBody>
       </p:sp>
@@ -1973,7 +1793,7 @@
           <a:p>
             <a:fld id="{E5A097B1-DDF2-47DB-BEB4-A56B76E0BD07}" type="slidenum">
               <a:rPr lang="en-US" smtClean="0"/>
-              <a:t>22</a:t>
+              <a:t>21</a:t>
             </a:fld>
             <a:endParaRPr lang="en-US"/>
           </a:p>
@@ -1982,7 +1802,7 @@
     </p:spTree>
     <p:extLst>
       <p:ext uri="{BB962C8B-B14F-4D97-AF65-F5344CB8AC3E}">
-        <p14:creationId xmlns:p14="http://schemas.microsoft.com/office/powerpoint/2010/main" val="3815729161"/>
+        <p14:creationId xmlns:p14="http://schemas.microsoft.com/office/powerpoint/2010/main" val="2941644832"/>
       </p:ext>
     </p:extLst>
   </p:cSld>
@@ -2198,7 +2018,19 @@
           <a:bodyPr/>
           <a:lstStyle/>
           <a:p>
+            <a:r>
+              <a:rPr lang="en-US" dirty="0"/>
+              <a:t>Pre machine learning demo 1</a:t>
+            </a:r>
+          </a:p>
+          <a:p>
             <a:endParaRPr lang="en-US" dirty="0"/>
+          </a:p>
+          <a:p>
+            <a:r>
+              <a:rPr lang="en-US" dirty="0"/>
+              <a:t>https://xkcd.com/1838/</a:t>
+            </a:r>
           </a:p>
         </p:txBody>
       </p:sp>
@@ -2219,7 +2051,7 @@
           <a:p>
             <a:fld id="{E5A097B1-DDF2-47DB-BEB4-A56B76E0BD07}" type="slidenum">
               <a:rPr lang="en-US" smtClean="0"/>
-              <a:t>23</a:t>
+              <a:t>22</a:t>
             </a:fld>
             <a:endParaRPr lang="en-US"/>
           </a:p>
@@ -2228,7 +2060,7 @@
     </p:spTree>
     <p:extLst>
       <p:ext uri="{BB962C8B-B14F-4D97-AF65-F5344CB8AC3E}">
-        <p14:creationId xmlns:p14="http://schemas.microsoft.com/office/powerpoint/2010/main" val="1525609868"/>
+        <p14:creationId xmlns:p14="http://schemas.microsoft.com/office/powerpoint/2010/main" val="3658383172"/>
       </p:ext>
     </p:extLst>
   </p:cSld>
@@ -2284,7 +2116,7 @@
           <a:p>
             <a:r>
               <a:rPr lang="en-US" dirty="0"/>
-              <a:t>Pre-stats demo</a:t>
+              <a:t>Let’s talk about flowers… our dataset uses these three species of flowers. </a:t>
             </a:r>
           </a:p>
           <a:p>
@@ -2292,9 +2124,10 @@
           </a:p>
           <a:p>
             <a:r>
-              <a:rPr lang="en-US" dirty="0"/>
-              <a:t>https://xkcd.com/1725/</a:t>
-            </a:r>
+              <a:rPr lang="en-US"/>
+              <a:t>Pre machine learning 2</a:t>
+            </a:r>
+            <a:endParaRPr lang="en-US" dirty="0"/>
           </a:p>
         </p:txBody>
       </p:sp>
@@ -2315,7 +2148,7 @@
           <a:p>
             <a:fld id="{E5A097B1-DDF2-47DB-BEB4-A56B76E0BD07}" type="slidenum">
               <a:rPr lang="en-US" smtClean="0"/>
-              <a:t>24</a:t>
+              <a:t>23</a:t>
             </a:fld>
             <a:endParaRPr lang="en-US"/>
           </a:p>
@@ -2324,7 +2157,7 @@
     </p:spTree>
     <p:extLst>
       <p:ext uri="{BB962C8B-B14F-4D97-AF65-F5344CB8AC3E}">
-        <p14:creationId xmlns:p14="http://schemas.microsoft.com/office/powerpoint/2010/main" val="2941644832"/>
+        <p14:creationId xmlns:p14="http://schemas.microsoft.com/office/powerpoint/2010/main" val="2029081766"/>
       </p:ext>
     </p:extLst>
   </p:cSld>
@@ -2378,19 +2211,123 @@
           <a:bodyPr/>
           <a:lstStyle/>
           <a:p>
-            <a:r>
-              <a:rPr lang="en-US" dirty="0"/>
-              <a:t>Pre machine learning demo 1</a:t>
-            </a:r>
-          </a:p>
-          <a:p>
             <a:endParaRPr lang="en-US" dirty="0"/>
           </a:p>
           <a:p>
             <a:r>
               <a:rPr lang="en-US" dirty="0"/>
-              <a:t>https://xkcd.com/1838/</a:t>
-            </a:r>
+              <a:t>Over 10k packages</a:t>
+            </a:r>
+          </a:p>
+          <a:p>
+            <a:r>
+              <a:rPr lang="en-US" dirty="0"/>
+              <a:t>https://cran.r-project.org/web/packages/</a:t>
+            </a:r>
+          </a:p>
+          <a:p>
+            <a:endParaRPr lang="en-US" dirty="0"/>
+          </a:p>
+          <a:p>
+            <a:endParaRPr lang="en-US" dirty="0"/>
+          </a:p>
+          <a:p>
+            <a:r>
+              <a:rPr lang="en-US" dirty="0"/>
+              <a:t>https://support.rstudio.com/hc/en-us/articles/201057987-Quick-list-of-useful-R-packages</a:t>
+            </a:r>
+          </a:p>
+          <a:p>
+            <a:endParaRPr lang="en-US" dirty="0"/>
+          </a:p>
+          <a:p>
+            <a:endParaRPr lang="en-US" dirty="0"/>
+          </a:p>
+          <a:p>
+            <a:pPr marL="0" indent="0">
+              <a:buNone/>
+            </a:pPr>
+            <a:r>
+              <a:rPr lang="en-US" sz="1200" dirty="0" err="1"/>
+              <a:t>dplyr</a:t>
+            </a:r>
+            <a:r>
+              <a:rPr lang="en-US" sz="1200" dirty="0"/>
+              <a:t> -  data selection and cleanup </a:t>
+            </a:r>
+          </a:p>
+          <a:p>
+            <a:pPr marL="0" indent="0">
+              <a:buNone/>
+            </a:pPr>
+            <a:r>
+              <a:rPr lang="en-US" sz="1200" dirty="0"/>
+              <a:t>ggplot2 – popular data viz library</a:t>
+            </a:r>
+          </a:p>
+          <a:p>
+            <a:pPr marL="0" indent="0">
+              <a:buNone/>
+            </a:pPr>
+            <a:r>
+              <a:rPr lang="en-US" sz="1200" dirty="0" err="1"/>
+              <a:t>xlsx</a:t>
+            </a:r>
+            <a:r>
+              <a:rPr lang="en-US" sz="1200" dirty="0"/>
+              <a:t> – </a:t>
+            </a:r>
+            <a:r>
+              <a:rPr lang="en-US" sz="1200" dirty="0" err="1"/>
+              <a:t>workwith</a:t>
+            </a:r>
+            <a:r>
+              <a:rPr lang="en-US" sz="1200" dirty="0"/>
+              <a:t> Excel files</a:t>
+            </a:r>
+          </a:p>
+          <a:p>
+            <a:pPr marL="0" indent="0">
+              <a:buNone/>
+            </a:pPr>
+            <a:r>
+              <a:rPr lang="en-US" sz="1200" dirty="0" err="1"/>
+              <a:t>quantmod</a:t>
+            </a:r>
+            <a:r>
+              <a:rPr lang="en-US" sz="1200" dirty="0"/>
+              <a:t> – financial data</a:t>
+            </a:r>
+          </a:p>
+          <a:p>
+            <a:pPr marL="0" indent="0">
+              <a:buNone/>
+            </a:pPr>
+            <a:r>
+              <a:rPr lang="en-US" sz="1200" dirty="0"/>
+              <a:t>Shiny – web framework</a:t>
+            </a:r>
+          </a:p>
+          <a:p>
+            <a:endParaRPr lang="en-US" dirty="0"/>
+          </a:p>
+          <a:p>
+            <a:endParaRPr lang="en-US" dirty="0"/>
+          </a:p>
+          <a:p>
+            <a:endParaRPr lang="en-US" dirty="0"/>
+          </a:p>
+          <a:p>
+            <a:endParaRPr lang="en-US" dirty="0"/>
+          </a:p>
+          <a:p>
+            <a:endParaRPr lang="en-US" dirty="0"/>
+          </a:p>
+          <a:p>
+            <a:endParaRPr lang="en-US" dirty="0"/>
+          </a:p>
+          <a:p>
+            <a:endParaRPr lang="en-US" dirty="0"/>
           </a:p>
         </p:txBody>
       </p:sp>
@@ -2411,7 +2348,7 @@
           <a:p>
             <a:fld id="{E5A097B1-DDF2-47DB-BEB4-A56B76E0BD07}" type="slidenum">
               <a:rPr lang="en-US" smtClean="0"/>
-              <a:t>25</a:t>
+              <a:t>24</a:t>
             </a:fld>
             <a:endParaRPr lang="en-US"/>
           </a:p>
@@ -2420,7 +2357,7 @@
     </p:spTree>
     <p:extLst>
       <p:ext uri="{BB962C8B-B14F-4D97-AF65-F5344CB8AC3E}">
-        <p14:creationId xmlns:p14="http://schemas.microsoft.com/office/powerpoint/2010/main" val="3658383172"/>
+        <p14:creationId xmlns:p14="http://schemas.microsoft.com/office/powerpoint/2010/main" val="3815729161"/>
       </p:ext>
     </p:extLst>
   </p:cSld>
@@ -2474,103 +2411,6 @@
           <a:bodyPr/>
           <a:lstStyle/>
           <a:p>
-            <a:r>
-              <a:rPr lang="en-US" dirty="0"/>
-              <a:t>Let’s talk about flowers… our dataset uses these three species of flowers. </a:t>
-            </a:r>
-          </a:p>
-          <a:p>
-            <a:endParaRPr lang="en-US" dirty="0"/>
-          </a:p>
-          <a:p>
-            <a:r>
-              <a:rPr lang="en-US"/>
-              <a:t>Pre machine learning 2</a:t>
-            </a:r>
-            <a:endParaRPr lang="en-US" dirty="0"/>
-          </a:p>
-        </p:txBody>
-      </p:sp>
-      <p:sp>
-        <p:nvSpPr>
-          <p:cNvPr id="4" name="Slide Number Placeholder 3"/>
-          <p:cNvSpPr>
-            <a:spLocks noGrp="1"/>
-          </p:cNvSpPr>
-          <p:nvPr>
-            <p:ph type="sldNum" sz="quarter" idx="10"/>
-          </p:nvPr>
-        </p:nvSpPr>
-        <p:spPr/>
-        <p:txBody>
-          <a:bodyPr/>
-          <a:lstStyle/>
-          <a:p>
-            <a:fld id="{E5A097B1-DDF2-47DB-BEB4-A56B76E0BD07}" type="slidenum">
-              <a:rPr lang="en-US" smtClean="0"/>
-              <a:t>26</a:t>
-            </a:fld>
-            <a:endParaRPr lang="en-US"/>
-          </a:p>
-        </p:txBody>
-      </p:sp>
-    </p:spTree>
-    <p:extLst>
-      <p:ext uri="{BB962C8B-B14F-4D97-AF65-F5344CB8AC3E}">
-        <p14:creationId xmlns:p14="http://schemas.microsoft.com/office/powerpoint/2010/main" val="2029081766"/>
-      </p:ext>
-    </p:extLst>
-  </p:cSld>
-  <p:clrMapOvr>
-    <a:masterClrMapping/>
-  </p:clrMapOvr>
-</p:notes>
-</file>
-
-<file path=ppt/notesSlides/notesSlide24.xml><?xml version="1.0" encoding="utf-8"?>
-<p:notes xmlns:a="http://schemas.openxmlformats.org/drawingml/2006/main" xmlns:r="http://schemas.openxmlformats.org/officeDocument/2006/relationships" xmlns:p="http://schemas.openxmlformats.org/presentationml/2006/main">
-  <p:cSld>
-    <p:spTree>
-      <p:nvGrpSpPr>
-        <p:cNvPr id="1" name=""/>
-        <p:cNvGrpSpPr/>
-        <p:nvPr/>
-      </p:nvGrpSpPr>
-      <p:grpSpPr>
-        <a:xfrm>
-          <a:off x="0" y="0"/>
-          <a:ext cx="0" cy="0"/>
-          <a:chOff x="0" y="0"/>
-          <a:chExt cx="0" cy="0"/>
-        </a:xfrm>
-      </p:grpSpPr>
-      <p:sp>
-        <p:nvSpPr>
-          <p:cNvPr id="2" name="Slide Image Placeholder 1"/>
-          <p:cNvSpPr>
-            <a:spLocks noGrp="1" noRot="1" noChangeAspect="1"/>
-          </p:cNvSpPr>
-          <p:nvPr>
-            <p:ph type="sldImg"/>
-          </p:nvPr>
-        </p:nvSpPr>
-        <p:spPr/>
-      </p:sp>
-      <p:sp>
-        <p:nvSpPr>
-          <p:cNvPr id="3" name="Notes Placeholder 2"/>
-          <p:cNvSpPr>
-            <a:spLocks noGrp="1"/>
-          </p:cNvSpPr>
-          <p:nvPr>
-            <p:ph type="body" idx="1"/>
-          </p:nvPr>
-        </p:nvSpPr>
-        <p:spPr/>
-        <p:txBody>
-          <a:bodyPr/>
-          <a:lstStyle/>
-          <a:p>
             <a:pPr marL="0" indent="0">
               <a:buNone/>
             </a:pPr>
@@ -2732,7 +2572,7 @@
           <a:p>
             <a:fld id="{E5A097B1-DDF2-47DB-BEB4-A56B76E0BD07}" type="slidenum">
               <a:rPr lang="en-US" smtClean="0"/>
-              <a:t>27</a:t>
+              <a:t>25</a:t>
             </a:fld>
             <a:endParaRPr lang="en-US"/>
           </a:p>
@@ -2795,306 +2635,10 @@
           <a:bodyPr/>
           <a:lstStyle/>
           <a:p>
-            <a:pPr marL="0" marR="0" lvl="0" indent="0" algn="l" defTabSz="914400" rtl="0" eaLnBrk="1" fontAlgn="auto" latinLnBrk="0" hangingPunct="1">
-              <a:lnSpc>
-                <a:spcPct val="100000"/>
-              </a:lnSpc>
-              <a:spcBef>
-                <a:spcPts val="0"/>
-              </a:spcBef>
-              <a:spcAft>
-                <a:spcPts val="0"/>
-              </a:spcAft>
-              <a:buClrTx/>
-              <a:buSzTx/>
-              <a:buFontTx/>
-              <a:buNone/>
-              <a:tabLst/>
-              <a:defRPr/>
-            </a:pPr>
-            <a:r>
-              <a:rPr lang="en-US" dirty="0"/>
-              <a:t>Volume- </a:t>
-            </a:r>
-          </a:p>
-          <a:p>
-            <a:pPr marL="0" marR="0" lvl="0" indent="0" algn="l" defTabSz="914400" rtl="0" eaLnBrk="1" fontAlgn="auto" latinLnBrk="0" hangingPunct="1">
-              <a:lnSpc>
-                <a:spcPct val="100000"/>
-              </a:lnSpc>
-              <a:spcBef>
-                <a:spcPts val="0"/>
-              </a:spcBef>
-              <a:spcAft>
-                <a:spcPts val="0"/>
-              </a:spcAft>
-              <a:buClrTx/>
-              <a:buSzTx/>
-              <a:buFontTx/>
-              <a:buNone/>
-              <a:tabLst/>
-              <a:defRPr/>
-            </a:pPr>
-            <a:endParaRPr lang="en-US" dirty="0"/>
-          </a:p>
-          <a:p>
-            <a:pPr marL="0" marR="0" lvl="0" indent="0" algn="l" defTabSz="914400" rtl="0" eaLnBrk="1" fontAlgn="auto" latinLnBrk="0" hangingPunct="1">
-              <a:lnSpc>
-                <a:spcPct val="100000"/>
-              </a:lnSpc>
-              <a:spcBef>
-                <a:spcPts val="0"/>
-              </a:spcBef>
-              <a:spcAft>
-                <a:spcPts val="0"/>
-              </a:spcAft>
-              <a:buClrTx/>
-              <a:buSzTx/>
-              <a:buFontTx/>
-              <a:buNone/>
-              <a:tabLst/>
-              <a:defRPr/>
-            </a:pPr>
-            <a:r>
-              <a:rPr lang="en-US" dirty="0"/>
-              <a:t>Data users intentionally generate</a:t>
-            </a:r>
-          </a:p>
-          <a:p>
-            <a:pPr marL="171450" marR="0" lvl="0" indent="-171450" algn="l" defTabSz="914400" rtl="0" eaLnBrk="1" fontAlgn="auto" latinLnBrk="0" hangingPunct="1">
-              <a:lnSpc>
-                <a:spcPct val="100000"/>
-              </a:lnSpc>
-              <a:spcBef>
-                <a:spcPts val="0"/>
-              </a:spcBef>
-              <a:spcAft>
-                <a:spcPts val="0"/>
-              </a:spcAft>
-              <a:buClrTx/>
-              <a:buSzTx/>
-              <a:buFontTx/>
-              <a:buChar char="-"/>
-              <a:tabLst/>
-              <a:defRPr/>
-            </a:pPr>
-            <a:r>
-              <a:rPr lang="en-US" dirty="0"/>
-              <a:t>6000+ Tweets send per second (http://www.internetlivestats.com/twitter-statistics/  --   http://www.internetlivestats.com/one-second/)</a:t>
-            </a:r>
-          </a:p>
-          <a:p>
-            <a:pPr marL="171450" marR="0" lvl="0" indent="-171450" algn="l" defTabSz="914400" rtl="0" eaLnBrk="1" fontAlgn="auto" latinLnBrk="0" hangingPunct="1">
-              <a:lnSpc>
-                <a:spcPct val="100000"/>
-              </a:lnSpc>
-              <a:spcBef>
-                <a:spcPts val="0"/>
-              </a:spcBef>
-              <a:spcAft>
-                <a:spcPts val="0"/>
-              </a:spcAft>
-              <a:buClrTx/>
-              <a:buSzTx/>
-              <a:buFontTx/>
-              <a:buChar char="-"/>
-              <a:tabLst/>
-              <a:defRPr/>
-            </a:pPr>
-            <a:r>
-              <a:rPr lang="en-US" dirty="0"/>
-              <a:t>40,000+ google searches / second (http://www.internetlivestats.com/google-search-statistics/)</a:t>
-            </a:r>
-          </a:p>
-          <a:p>
-            <a:pPr marL="171450" marR="0" lvl="0" indent="-171450" algn="l" defTabSz="914400" rtl="0" eaLnBrk="1" fontAlgn="auto" latinLnBrk="0" hangingPunct="1">
-              <a:lnSpc>
-                <a:spcPct val="100000"/>
-              </a:lnSpc>
-              <a:spcBef>
-                <a:spcPts val="0"/>
-              </a:spcBef>
-              <a:spcAft>
-                <a:spcPts val="0"/>
-              </a:spcAft>
-              <a:buClrTx/>
-              <a:buSzTx/>
-              <a:buFontTx/>
-              <a:buChar char="-"/>
-              <a:tabLst/>
-              <a:defRPr/>
-            </a:pPr>
-            <a:endParaRPr lang="en-US" dirty="0"/>
-          </a:p>
-          <a:p>
-            <a:pPr marL="0" marR="0" lvl="0" indent="0" algn="l" defTabSz="914400" rtl="0" eaLnBrk="1" fontAlgn="auto" latinLnBrk="0" hangingPunct="1">
-              <a:lnSpc>
-                <a:spcPct val="100000"/>
-              </a:lnSpc>
-              <a:spcBef>
-                <a:spcPts val="0"/>
-              </a:spcBef>
-              <a:spcAft>
-                <a:spcPts val="0"/>
-              </a:spcAft>
-              <a:buClrTx/>
-              <a:buSzTx/>
-              <a:buFontTx/>
-              <a:buNone/>
-              <a:tabLst/>
-              <a:defRPr/>
-            </a:pPr>
-            <a:r>
-              <a:rPr lang="en-US" dirty="0"/>
-              <a:t>Data users unintentionally generate</a:t>
-            </a:r>
-          </a:p>
-          <a:p>
-            <a:pPr marL="0" marR="0" lvl="0" indent="0" algn="l" defTabSz="914400" rtl="0" eaLnBrk="1" fontAlgn="auto" latinLnBrk="0" hangingPunct="1">
-              <a:lnSpc>
-                <a:spcPct val="100000"/>
-              </a:lnSpc>
-              <a:spcBef>
-                <a:spcPts val="0"/>
-              </a:spcBef>
-              <a:spcAft>
-                <a:spcPts val="0"/>
-              </a:spcAft>
-              <a:buClrTx/>
-              <a:buSzTx/>
-              <a:buFontTx/>
-              <a:buNone/>
-              <a:tabLst/>
-              <a:defRPr/>
-            </a:pPr>
-            <a:r>
-              <a:rPr lang="en-US" dirty="0"/>
-              <a:t>- Logs, usage stats, creepy tracking stuff (that makes you want to put on a tinfoil hat and live in the woods) </a:t>
-            </a:r>
-          </a:p>
-          <a:p>
-            <a:pPr marL="0" marR="0" lvl="0" indent="0" algn="l" defTabSz="914400" rtl="0" eaLnBrk="1" fontAlgn="auto" latinLnBrk="0" hangingPunct="1">
-              <a:lnSpc>
-                <a:spcPct val="100000"/>
-              </a:lnSpc>
-              <a:spcBef>
-                <a:spcPts val="0"/>
-              </a:spcBef>
-              <a:spcAft>
-                <a:spcPts val="0"/>
-              </a:spcAft>
-              <a:buClrTx/>
-              <a:buSzTx/>
-              <a:buFontTx/>
-              <a:buNone/>
-              <a:tabLst/>
-              <a:defRPr/>
-            </a:pPr>
-            <a:endParaRPr lang="en-US" dirty="0"/>
-          </a:p>
-          <a:p>
-            <a:pPr marL="0" marR="0" lvl="0" indent="0" algn="l" defTabSz="914400" rtl="0" eaLnBrk="1" fontAlgn="auto" latinLnBrk="0" hangingPunct="1">
-              <a:lnSpc>
-                <a:spcPct val="100000"/>
-              </a:lnSpc>
-              <a:spcBef>
-                <a:spcPts val="0"/>
-              </a:spcBef>
-              <a:spcAft>
-                <a:spcPts val="0"/>
-              </a:spcAft>
-              <a:buClrTx/>
-              <a:buSzTx/>
-              <a:buFontTx/>
-              <a:buNone/>
-              <a:tabLst/>
-              <a:defRPr/>
-            </a:pPr>
-            <a:r>
-              <a:rPr lang="en-US" dirty="0"/>
-              <a:t>Collected Data</a:t>
-            </a:r>
-          </a:p>
-          <a:p>
-            <a:pPr marL="171450" marR="0" lvl="0" indent="-171450" algn="l" defTabSz="914400" rtl="0" eaLnBrk="1" fontAlgn="auto" latinLnBrk="0" hangingPunct="1">
-              <a:lnSpc>
-                <a:spcPct val="100000"/>
-              </a:lnSpc>
-              <a:spcBef>
-                <a:spcPts val="0"/>
-              </a:spcBef>
-              <a:spcAft>
-                <a:spcPts val="0"/>
-              </a:spcAft>
-              <a:buClrTx/>
-              <a:buSzTx/>
-              <a:buFontTx/>
-              <a:buChar char="-"/>
-              <a:tabLst/>
-              <a:defRPr/>
-            </a:pPr>
-            <a:r>
-              <a:rPr lang="en-US" dirty="0"/>
-              <a:t>IOT</a:t>
-            </a:r>
-          </a:p>
-          <a:p>
-            <a:pPr marL="171450" marR="0" lvl="0" indent="-171450" algn="l" defTabSz="914400" rtl="0" eaLnBrk="1" fontAlgn="auto" latinLnBrk="0" hangingPunct="1">
-              <a:lnSpc>
-                <a:spcPct val="100000"/>
-              </a:lnSpc>
-              <a:spcBef>
-                <a:spcPts val="0"/>
-              </a:spcBef>
-              <a:spcAft>
-                <a:spcPts val="0"/>
-              </a:spcAft>
-              <a:buClrTx/>
-              <a:buSzTx/>
-              <a:buFontTx/>
-              <a:buChar char="-"/>
-              <a:tabLst/>
-              <a:defRPr/>
-            </a:pPr>
-            <a:r>
-              <a:rPr lang="en-US" dirty="0"/>
-              <a:t>Government statistics</a:t>
-            </a:r>
-          </a:p>
-          <a:p>
-            <a:pPr marL="171450" marR="0" lvl="0" indent="-171450" algn="l" defTabSz="914400" rtl="0" eaLnBrk="1" fontAlgn="auto" latinLnBrk="0" hangingPunct="1">
-              <a:lnSpc>
-                <a:spcPct val="100000"/>
-              </a:lnSpc>
-              <a:spcBef>
-                <a:spcPts val="0"/>
-              </a:spcBef>
-              <a:spcAft>
-                <a:spcPts val="0"/>
-              </a:spcAft>
-              <a:buClrTx/>
-              <a:buSzTx/>
-              <a:buFontTx/>
-              <a:buChar char="-"/>
-              <a:tabLst/>
-              <a:defRPr/>
-            </a:pPr>
-            <a:endParaRPr lang="en-US" dirty="0"/>
-          </a:p>
-          <a:p>
-            <a:endParaRPr lang="en-US" dirty="0"/>
-          </a:p>
-          <a:p>
-            <a:r>
-              <a:rPr lang="en-US" dirty="0"/>
-              <a:t>Volume Statistics - http://www.internetlivestats.com/</a:t>
-            </a:r>
-          </a:p>
-          <a:p>
-            <a:endParaRPr lang="en-US" dirty="0"/>
-          </a:p>
-          <a:p>
-            <a:endParaRPr lang="en-US" dirty="0"/>
+            <a:r>
+              <a:rPr lang="en-US" dirty="0"/>
+              <a:t>Why care about data topics?</a:t>
+            </a:r>
           </a:p>
           <a:p>
             <a:endParaRPr lang="en-US" dirty="0"/>
@@ -3118,7 +2662,7 @@
           <a:p>
             <a:fld id="{E5A097B1-DDF2-47DB-BEB4-A56B76E0BD07}" type="slidenum">
               <a:rPr lang="en-US" smtClean="0"/>
-              <a:t>5</a:t>
+              <a:t>4</a:t>
             </a:fld>
             <a:endParaRPr lang="en-US"/>
           </a:p>
@@ -3127,7 +2671,7 @@
     </p:spTree>
     <p:extLst>
       <p:ext uri="{BB962C8B-B14F-4D97-AF65-F5344CB8AC3E}">
-        <p14:creationId xmlns:p14="http://schemas.microsoft.com/office/powerpoint/2010/main" val="4082914788"/>
+        <p14:creationId xmlns:p14="http://schemas.microsoft.com/office/powerpoint/2010/main" val="667524430"/>
       </p:ext>
     </p:extLst>
   </p:cSld>
@@ -3181,33 +2725,309 @@
           <a:bodyPr/>
           <a:lstStyle/>
           <a:p>
-            <a:r>
-              <a:rPr lang="en-US" dirty="0"/>
-              <a:t>Increasing amounts of residual data</a:t>
-            </a:r>
-          </a:p>
-          <a:p>
+            <a:pPr marL="0" marR="0" lvl="0" indent="0" algn="l" defTabSz="914400" rtl="0" eaLnBrk="1" fontAlgn="auto" latinLnBrk="0" hangingPunct="1">
+              <a:lnSpc>
+                <a:spcPct val="100000"/>
+              </a:lnSpc>
+              <a:spcBef>
+                <a:spcPts val="0"/>
+              </a:spcBef>
+              <a:spcAft>
+                <a:spcPts val="0"/>
+              </a:spcAft>
+              <a:buClrTx/>
+              <a:buSzTx/>
+              <a:buFontTx/>
+              <a:buNone/>
+              <a:tabLst/>
+              <a:defRPr/>
+            </a:pPr>
+            <a:r>
+              <a:rPr lang="en-US" dirty="0"/>
+              <a:t>Volume- </a:t>
+            </a:r>
+          </a:p>
+          <a:p>
+            <a:pPr marL="0" marR="0" lvl="0" indent="0" algn="l" defTabSz="914400" rtl="0" eaLnBrk="1" fontAlgn="auto" latinLnBrk="0" hangingPunct="1">
+              <a:lnSpc>
+                <a:spcPct val="100000"/>
+              </a:lnSpc>
+              <a:spcBef>
+                <a:spcPts val="0"/>
+              </a:spcBef>
+              <a:spcAft>
+                <a:spcPts val="0"/>
+              </a:spcAft>
+              <a:buClrTx/>
+              <a:buSzTx/>
+              <a:buFontTx/>
+              <a:buNone/>
+              <a:tabLst/>
+              <a:defRPr/>
+            </a:pPr>
             <a:endParaRPr lang="en-US" dirty="0"/>
           </a:p>
           <a:p>
-            <a:r>
-              <a:rPr lang="en-US" dirty="0"/>
-              <a:t>-- mention the </a:t>
-            </a:r>
-            <a:r>
-              <a:rPr lang="en-US" dirty="0" err="1"/>
-              <a:t>Geocities</a:t>
-            </a:r>
-            <a:r>
-              <a:rPr lang="en-US" dirty="0"/>
-              <a:t> data dump</a:t>
-            </a:r>
-          </a:p>
-          <a:p>
-            <a:r>
-              <a:rPr lang="en-US" dirty="0"/>
-              <a:t>-- </a:t>
-            </a:r>
+            <a:pPr marL="0" marR="0" lvl="0" indent="0" algn="l" defTabSz="914400" rtl="0" eaLnBrk="1" fontAlgn="auto" latinLnBrk="0" hangingPunct="1">
+              <a:lnSpc>
+                <a:spcPct val="100000"/>
+              </a:lnSpc>
+              <a:spcBef>
+                <a:spcPts val="0"/>
+              </a:spcBef>
+              <a:spcAft>
+                <a:spcPts val="0"/>
+              </a:spcAft>
+              <a:buClrTx/>
+              <a:buSzTx/>
+              <a:buFontTx/>
+              <a:buNone/>
+              <a:tabLst/>
+              <a:defRPr/>
+            </a:pPr>
+            <a:r>
+              <a:rPr lang="en-US" dirty="0"/>
+              <a:t>Data users intentionally generate</a:t>
+            </a:r>
+          </a:p>
+          <a:p>
+            <a:pPr marL="171450" marR="0" lvl="0" indent="-171450" algn="l" defTabSz="914400" rtl="0" eaLnBrk="1" fontAlgn="auto" latinLnBrk="0" hangingPunct="1">
+              <a:lnSpc>
+                <a:spcPct val="100000"/>
+              </a:lnSpc>
+              <a:spcBef>
+                <a:spcPts val="0"/>
+              </a:spcBef>
+              <a:spcAft>
+                <a:spcPts val="0"/>
+              </a:spcAft>
+              <a:buClrTx/>
+              <a:buSzTx/>
+              <a:buFontTx/>
+              <a:buChar char="-"/>
+              <a:tabLst/>
+              <a:defRPr/>
+            </a:pPr>
+            <a:r>
+              <a:rPr lang="en-US" dirty="0"/>
+              <a:t>6000+ Tweets send per second (http://www.internetlivestats.com/twitter-statistics/  --   http://www.internetlivestats.com/one-second/)</a:t>
+            </a:r>
+          </a:p>
+          <a:p>
+            <a:pPr marL="171450" marR="0" lvl="0" indent="-171450" algn="l" defTabSz="914400" rtl="0" eaLnBrk="1" fontAlgn="auto" latinLnBrk="0" hangingPunct="1">
+              <a:lnSpc>
+                <a:spcPct val="100000"/>
+              </a:lnSpc>
+              <a:spcBef>
+                <a:spcPts val="0"/>
+              </a:spcBef>
+              <a:spcAft>
+                <a:spcPts val="0"/>
+              </a:spcAft>
+              <a:buClrTx/>
+              <a:buSzTx/>
+              <a:buFontTx/>
+              <a:buChar char="-"/>
+              <a:tabLst/>
+              <a:defRPr/>
+            </a:pPr>
+            <a:r>
+              <a:rPr lang="en-US" dirty="0"/>
+              <a:t>40,000+ google searches / second (http://www.internetlivestats.com/google-search-statistics/)</a:t>
+            </a:r>
+          </a:p>
+          <a:p>
+            <a:pPr marL="171450" marR="0" lvl="0" indent="-171450" algn="l" defTabSz="914400" rtl="0" eaLnBrk="1" fontAlgn="auto" latinLnBrk="0" hangingPunct="1">
+              <a:lnSpc>
+                <a:spcPct val="100000"/>
+              </a:lnSpc>
+              <a:spcBef>
+                <a:spcPts val="0"/>
+              </a:spcBef>
+              <a:spcAft>
+                <a:spcPts val="0"/>
+              </a:spcAft>
+              <a:buClrTx/>
+              <a:buSzTx/>
+              <a:buFontTx/>
+              <a:buChar char="-"/>
+              <a:tabLst/>
+              <a:defRPr/>
+            </a:pPr>
+            <a:endParaRPr lang="en-US" dirty="0"/>
+          </a:p>
+          <a:p>
+            <a:pPr marL="0" marR="0" lvl="0" indent="0" algn="l" defTabSz="914400" rtl="0" eaLnBrk="1" fontAlgn="auto" latinLnBrk="0" hangingPunct="1">
+              <a:lnSpc>
+                <a:spcPct val="100000"/>
+              </a:lnSpc>
+              <a:spcBef>
+                <a:spcPts val="0"/>
+              </a:spcBef>
+              <a:spcAft>
+                <a:spcPts val="0"/>
+              </a:spcAft>
+              <a:buClrTx/>
+              <a:buSzTx/>
+              <a:buFontTx/>
+              <a:buNone/>
+              <a:tabLst/>
+              <a:defRPr/>
+            </a:pPr>
+            <a:r>
+              <a:rPr lang="en-US" dirty="0"/>
+              <a:t>Data users unintentionally generate</a:t>
+            </a:r>
+          </a:p>
+          <a:p>
+            <a:pPr marL="0" marR="0" lvl="0" indent="0" algn="l" defTabSz="914400" rtl="0" eaLnBrk="1" fontAlgn="auto" latinLnBrk="0" hangingPunct="1">
+              <a:lnSpc>
+                <a:spcPct val="100000"/>
+              </a:lnSpc>
+              <a:spcBef>
+                <a:spcPts val="0"/>
+              </a:spcBef>
+              <a:spcAft>
+                <a:spcPts val="0"/>
+              </a:spcAft>
+              <a:buClrTx/>
+              <a:buSzTx/>
+              <a:buFontTx/>
+              <a:buNone/>
+              <a:tabLst/>
+              <a:defRPr/>
+            </a:pPr>
+            <a:r>
+              <a:rPr lang="en-US" dirty="0"/>
+              <a:t>- Logs, usage stats, creepy tracking stuff (that makes you want to put on a tinfoil hat and live in the woods) </a:t>
+            </a:r>
+          </a:p>
+          <a:p>
+            <a:pPr marL="0" marR="0" lvl="0" indent="0" algn="l" defTabSz="914400" rtl="0" eaLnBrk="1" fontAlgn="auto" latinLnBrk="0" hangingPunct="1">
+              <a:lnSpc>
+                <a:spcPct val="100000"/>
+              </a:lnSpc>
+              <a:spcBef>
+                <a:spcPts val="0"/>
+              </a:spcBef>
+              <a:spcAft>
+                <a:spcPts val="0"/>
+              </a:spcAft>
+              <a:buClrTx/>
+              <a:buSzTx/>
+              <a:buFontTx/>
+              <a:buNone/>
+              <a:tabLst/>
+              <a:defRPr/>
+            </a:pPr>
+            <a:endParaRPr lang="en-US" dirty="0"/>
+          </a:p>
+          <a:p>
+            <a:pPr marL="0" marR="0" lvl="0" indent="0" algn="l" defTabSz="914400" rtl="0" eaLnBrk="1" fontAlgn="auto" latinLnBrk="0" hangingPunct="1">
+              <a:lnSpc>
+                <a:spcPct val="100000"/>
+              </a:lnSpc>
+              <a:spcBef>
+                <a:spcPts val="0"/>
+              </a:spcBef>
+              <a:spcAft>
+                <a:spcPts val="0"/>
+              </a:spcAft>
+              <a:buClrTx/>
+              <a:buSzTx/>
+              <a:buFontTx/>
+              <a:buNone/>
+              <a:tabLst/>
+              <a:defRPr/>
+            </a:pPr>
+            <a:r>
+              <a:rPr lang="en-US" dirty="0"/>
+              <a:t>Collected Data</a:t>
+            </a:r>
+          </a:p>
+          <a:p>
+            <a:pPr marL="171450" marR="0" lvl="0" indent="-171450" algn="l" defTabSz="914400" rtl="0" eaLnBrk="1" fontAlgn="auto" latinLnBrk="0" hangingPunct="1">
+              <a:lnSpc>
+                <a:spcPct val="100000"/>
+              </a:lnSpc>
+              <a:spcBef>
+                <a:spcPts val="0"/>
+              </a:spcBef>
+              <a:spcAft>
+                <a:spcPts val="0"/>
+              </a:spcAft>
+              <a:buClrTx/>
+              <a:buSzTx/>
+              <a:buFontTx/>
+              <a:buChar char="-"/>
+              <a:tabLst/>
+              <a:defRPr/>
+            </a:pPr>
+            <a:r>
+              <a:rPr lang="en-US" dirty="0"/>
+              <a:t>IOT</a:t>
+            </a:r>
+          </a:p>
+          <a:p>
+            <a:pPr marL="171450" marR="0" lvl="0" indent="-171450" algn="l" defTabSz="914400" rtl="0" eaLnBrk="1" fontAlgn="auto" latinLnBrk="0" hangingPunct="1">
+              <a:lnSpc>
+                <a:spcPct val="100000"/>
+              </a:lnSpc>
+              <a:spcBef>
+                <a:spcPts val="0"/>
+              </a:spcBef>
+              <a:spcAft>
+                <a:spcPts val="0"/>
+              </a:spcAft>
+              <a:buClrTx/>
+              <a:buSzTx/>
+              <a:buFontTx/>
+              <a:buChar char="-"/>
+              <a:tabLst/>
+              <a:defRPr/>
+            </a:pPr>
+            <a:r>
+              <a:rPr lang="en-US" dirty="0"/>
+              <a:t>Government statistics</a:t>
+            </a:r>
+          </a:p>
+          <a:p>
+            <a:pPr marL="171450" marR="0" lvl="0" indent="-171450" algn="l" defTabSz="914400" rtl="0" eaLnBrk="1" fontAlgn="auto" latinLnBrk="0" hangingPunct="1">
+              <a:lnSpc>
+                <a:spcPct val="100000"/>
+              </a:lnSpc>
+              <a:spcBef>
+                <a:spcPts val="0"/>
+              </a:spcBef>
+              <a:spcAft>
+                <a:spcPts val="0"/>
+              </a:spcAft>
+              <a:buClrTx/>
+              <a:buSzTx/>
+              <a:buFontTx/>
+              <a:buChar char="-"/>
+              <a:tabLst/>
+              <a:defRPr/>
+            </a:pPr>
+            <a:endParaRPr lang="en-US" dirty="0"/>
+          </a:p>
+          <a:p>
+            <a:endParaRPr lang="en-US" dirty="0"/>
+          </a:p>
+          <a:p>
+            <a:r>
+              <a:rPr lang="en-US" dirty="0"/>
+              <a:t>Volume Statistics - http://www.internetlivestats.com/</a:t>
+            </a:r>
+          </a:p>
+          <a:p>
+            <a:endParaRPr lang="en-US" dirty="0"/>
+          </a:p>
+          <a:p>
+            <a:endParaRPr lang="en-US" dirty="0"/>
+          </a:p>
+          <a:p>
+            <a:endParaRPr lang="en-US" dirty="0"/>
           </a:p>
         </p:txBody>
       </p:sp>
@@ -3228,7 +3048,7 @@
           <a:p>
             <a:fld id="{E5A097B1-DDF2-47DB-BEB4-A56B76E0BD07}" type="slidenum">
               <a:rPr lang="en-US" smtClean="0"/>
-              <a:t>6</a:t>
+              <a:t>5</a:t>
             </a:fld>
             <a:endParaRPr lang="en-US"/>
           </a:p>
@@ -3237,7 +3057,7 @@
     </p:spTree>
     <p:extLst>
       <p:ext uri="{BB962C8B-B14F-4D97-AF65-F5344CB8AC3E}">
-        <p14:creationId xmlns:p14="http://schemas.microsoft.com/office/powerpoint/2010/main" val="499129992"/>
+        <p14:creationId xmlns:p14="http://schemas.microsoft.com/office/powerpoint/2010/main" val="4082914788"/>
       </p:ext>
     </p:extLst>
   </p:cSld>
@@ -3336,7 +3156,7 @@
           <a:p>
             <a:fld id="{E5A097B1-DDF2-47DB-BEB4-A56B76E0BD07}" type="slidenum">
               <a:rPr lang="en-US" smtClean="0"/>
-              <a:t>7</a:t>
+              <a:t>6</a:t>
             </a:fld>
             <a:endParaRPr lang="en-US"/>
           </a:p>
@@ -3471,7 +3291,7 @@
           <a:p>
             <a:fld id="{E5A097B1-DDF2-47DB-BEB4-A56B76E0BD07}" type="slidenum">
               <a:rPr lang="en-US" smtClean="0"/>
-              <a:t>8</a:t>
+              <a:t>7</a:t>
             </a:fld>
             <a:endParaRPr lang="en-US"/>
           </a:p>
@@ -3536,25 +3356,13 @@
           <a:p>
             <a:r>
               <a:rPr lang="en-US" dirty="0"/>
-              <a:t>With data visualization, you can use your datasets to change mindsets. </a:t>
-            </a:r>
-          </a:p>
-          <a:p>
-            <a:endParaRPr lang="en-US" dirty="0"/>
-          </a:p>
-          <a:p>
-            <a:endParaRPr lang="en-US" dirty="0"/>
-          </a:p>
-          <a:p>
-            <a:r>
-              <a:rPr lang="en-US" dirty="0"/>
-              <a:t>https://www.ted.com/talks/hans_rosling_at_state</a:t>
-            </a:r>
-          </a:p>
-          <a:p>
-            <a:r>
-              <a:rPr lang="en-US" dirty="0"/>
-              <a:t>https://www.ted.com/talks/hans_rosling_shows_the_best_stats_you_ve_ever_seen</a:t>
+              <a:t>… there’s good guys and bad guys. </a:t>
+            </a:r>
+          </a:p>
+          <a:p>
+            <a:r>
+              <a:rPr lang="en-US" dirty="0"/>
+              <a:t>People are trying to manipulate you with numbers</a:t>
             </a:r>
           </a:p>
           <a:p>
@@ -3579,7 +3387,7 @@
           <a:p>
             <a:fld id="{E5A097B1-DDF2-47DB-BEB4-A56B76E0BD07}" type="slidenum">
               <a:rPr lang="en-US" smtClean="0"/>
-              <a:t>9</a:t>
+              <a:t>8</a:t>
             </a:fld>
             <a:endParaRPr lang="en-US"/>
           </a:p>
@@ -3588,7 +3396,7 @@
     </p:spTree>
     <p:extLst>
       <p:ext uri="{BB962C8B-B14F-4D97-AF65-F5344CB8AC3E}">
-        <p14:creationId xmlns:p14="http://schemas.microsoft.com/office/powerpoint/2010/main" val="1775753573"/>
+        <p14:creationId xmlns:p14="http://schemas.microsoft.com/office/powerpoint/2010/main" val="3884404693"/>
       </p:ext>
     </p:extLst>
   </p:cSld>
@@ -3644,17 +3452,38 @@
           <a:p>
             <a:r>
               <a:rPr lang="en-US" dirty="0"/>
-              <a:t>… there’s good guys and bad guys. </a:t>
-            </a:r>
-          </a:p>
-          <a:p>
-            <a:r>
-              <a:rPr lang="en-US" dirty="0"/>
-              <a:t>People are trying to manipulate you with numbers</a:t>
+              <a:t>http://www.kdnuggets.com/2014/04/cartoon-data-scientist-salary-negotiation.html</a:t>
             </a:r>
           </a:p>
           <a:p>
             <a:endParaRPr lang="en-US" dirty="0"/>
+          </a:p>
+          <a:p>
+            <a:r>
+              <a:rPr lang="en-US" dirty="0"/>
+              <a:t>You may have to work with a data scientist… </a:t>
+            </a:r>
+          </a:p>
+          <a:p>
+            <a:r>
+              <a:rPr lang="en-US" dirty="0"/>
+              <a:t>Even if you don’t do the analysis, you might have to implement the product. </a:t>
+            </a:r>
+          </a:p>
+          <a:p>
+            <a:endParaRPr lang="en-US" dirty="0"/>
+          </a:p>
+          <a:p>
+            <a:r>
+              <a:rPr lang="en-US" dirty="0"/>
+              <a:t>Netflix example. </a:t>
+            </a:r>
+          </a:p>
+          <a:p>
+            <a:r>
+              <a:rPr lang="en-US" dirty="0"/>
+              <a:t>R is often translated into other languages for inclusion in software products. </a:t>
+            </a:r>
           </a:p>
         </p:txBody>
       </p:sp>
@@ -3675,7 +3504,7 @@
           <a:p>
             <a:fld id="{E5A097B1-DDF2-47DB-BEB4-A56B76E0BD07}" type="slidenum">
               <a:rPr lang="en-US" smtClean="0"/>
-              <a:t>10</a:t>
+              <a:t>9</a:t>
             </a:fld>
             <a:endParaRPr lang="en-US"/>
           </a:p>
@@ -3684,7 +3513,7 @@
     </p:spTree>
     <p:extLst>
       <p:ext uri="{BB962C8B-B14F-4D97-AF65-F5344CB8AC3E}">
-        <p14:creationId xmlns:p14="http://schemas.microsoft.com/office/powerpoint/2010/main" val="3884404693"/>
+        <p14:creationId xmlns:p14="http://schemas.microsoft.com/office/powerpoint/2010/main" val="158129695"/>
       </p:ext>
     </p:extLst>
   </p:cSld>
@@ -3738,26 +3567,72 @@
           <a:bodyPr/>
           <a:lstStyle/>
           <a:p>
-            <a:r>
-              <a:rPr lang="en-US" dirty="0"/>
-              <a:t>Data literacy is an important skill in the 21</a:t>
-            </a:r>
-            <a:r>
-              <a:rPr lang="en-US" baseline="30000" dirty="0"/>
-              <a:t>st</a:t>
-            </a:r>
-            <a:r>
-              <a:rPr lang="en-US" dirty="0"/>
-              <a:t> century</a:t>
-            </a:r>
-          </a:p>
-          <a:p>
             <a:endParaRPr lang="en-US" dirty="0"/>
           </a:p>
           <a:p>
             <a:r>
               <a:rPr lang="en-US" dirty="0"/>
-              <a:t>And… </a:t>
+              <a:t>Python and R are the two heavy hitters in this space. </a:t>
+            </a:r>
+          </a:p>
+          <a:p>
+            <a:r>
+              <a:rPr lang="en-US" dirty="0"/>
+              <a:t>Python – Easy to learn OOP Scripting Language. The default choice for academics</a:t>
+            </a:r>
+          </a:p>
+          <a:p>
+            <a:pPr marL="0" marR="0" lvl="0" indent="0" algn="l" defTabSz="914400" rtl="0" eaLnBrk="1" fontAlgn="auto" latinLnBrk="0" hangingPunct="1">
+              <a:lnSpc>
+                <a:spcPct val="100000"/>
+              </a:lnSpc>
+              <a:spcBef>
+                <a:spcPts val="0"/>
+              </a:spcBef>
+              <a:spcAft>
+                <a:spcPts val="0"/>
+              </a:spcAft>
+              <a:buClrTx/>
+              <a:buSzTx/>
+              <a:buFontTx/>
+              <a:buNone/>
+              <a:tabLst/>
+              <a:defRPr/>
+            </a:pPr>
+            <a:r>
+              <a:rPr lang="en-US" dirty="0"/>
+              <a:t>Scala – JVM based language. Like a more functional version of C#</a:t>
+            </a:r>
+          </a:p>
+          <a:p>
+            <a:pPr marL="0" marR="0" lvl="0" indent="0" algn="l" defTabSz="914400" rtl="0" eaLnBrk="1" fontAlgn="auto" latinLnBrk="0" hangingPunct="1">
+              <a:lnSpc>
+                <a:spcPct val="100000"/>
+              </a:lnSpc>
+              <a:spcBef>
+                <a:spcPts val="0"/>
+              </a:spcBef>
+              <a:spcAft>
+                <a:spcPts val="0"/>
+              </a:spcAft>
+              <a:buClrTx/>
+              <a:buSzTx/>
+              <a:buFontTx/>
+              <a:buNone/>
+              <a:tabLst/>
+              <a:defRPr/>
+            </a:pPr>
+            <a:r>
+              <a:rPr lang="en-US" dirty="0"/>
+              <a:t>There are other languages: Julia, Go, </a:t>
+            </a:r>
+            <a:r>
+              <a:rPr lang="en-US" dirty="0" err="1"/>
+              <a:t>etc</a:t>
+            </a:r>
+            <a:r>
+              <a:rPr lang="en-US" dirty="0"/>
+              <a:t>…</a:t>
             </a:r>
           </a:p>
           <a:p>
@@ -3766,7 +3641,7 @@
           <a:p>
             <a:r>
               <a:rPr lang="en-US" dirty="0"/>
-              <a:t>R is one tool for that</a:t>
+              <a:t>R – “built by statisticians, for statisticians” | Based on the S programming language, it came in 2000 and has been steadily gaining in popularity with data scientists. </a:t>
             </a:r>
           </a:p>
           <a:p>
@@ -3774,6 +3649,36 @@
           </a:p>
           <a:p>
             <a:endParaRPr lang="en-US" dirty="0"/>
+          </a:p>
+          <a:p>
+            <a:r>
+              <a:rPr lang="en-US" dirty="0"/>
+              <a:t>http://www.infoworld.com/article/3049672/application-development/which-freaking-big-data-programming-language-should-i-use.html</a:t>
+            </a:r>
+          </a:p>
+          <a:p>
+            <a:r>
+              <a:rPr lang="en-US" dirty="0"/>
+              <a:t>https://en.wikipedia.org/wiki/R_(programming_language)</a:t>
+            </a:r>
+          </a:p>
+          <a:p>
+            <a:r>
+              <a:rPr lang="en-US" dirty="0"/>
+              <a:t>https://en.wikipedia.org/wiki/S_(programming_language)</a:t>
+            </a:r>
+          </a:p>
+          <a:p>
+            <a:r>
+              <a:rPr lang="en-US" dirty="0"/>
+              <a:t>https://en.wikipedia.org/wiki/Python_(programming_language)</a:t>
+            </a:r>
+          </a:p>
+          <a:p>
+            <a:r>
+              <a:rPr lang="en-US" dirty="0"/>
+              <a:t>https://en.wikipedia.org/wiki/Scala_(programming_language)</a:t>
+            </a:r>
           </a:p>
         </p:txBody>
       </p:sp>
@@ -3794,7 +3699,7 @@
           <a:p>
             <a:fld id="{E5A097B1-DDF2-47DB-BEB4-A56B76E0BD07}" type="slidenum">
               <a:rPr lang="en-US" smtClean="0"/>
-              <a:t>11</a:t>
+              <a:t>10</a:t>
             </a:fld>
             <a:endParaRPr lang="en-US"/>
           </a:p>
@@ -3803,7 +3708,7 @@
     </p:spTree>
     <p:extLst>
       <p:ext uri="{BB962C8B-B14F-4D97-AF65-F5344CB8AC3E}">
-        <p14:creationId xmlns:p14="http://schemas.microsoft.com/office/powerpoint/2010/main" val="734240620"/>
+        <p14:creationId xmlns:p14="http://schemas.microsoft.com/office/powerpoint/2010/main" val="458254567"/>
       </p:ext>
     </p:extLst>
   </p:cSld>
@@ -3942,7 +3847,7 @@
           <a:p>
             <a:fld id="{0E462D58-24D5-460E-A073-5F56B9E1F7E7}" type="datetimeFigureOut">
               <a:rPr lang="en-US" smtClean="0"/>
-              <a:t>5/31/2017</a:t>
+              <a:t>6/2/2017</a:t>
             </a:fld>
             <a:endParaRPr lang="en-US"/>
           </a:p>
@@ -4110,7 +4015,7 @@
           <a:p>
             <a:fld id="{0E462D58-24D5-460E-A073-5F56B9E1F7E7}" type="datetimeFigureOut">
               <a:rPr lang="en-US" smtClean="0"/>
-              <a:t>5/31/2017</a:t>
+              <a:t>6/2/2017</a:t>
             </a:fld>
             <a:endParaRPr lang="en-US"/>
           </a:p>
@@ -4288,7 +4193,7 @@
           <a:p>
             <a:fld id="{0E462D58-24D5-460E-A073-5F56B9E1F7E7}" type="datetimeFigureOut">
               <a:rPr lang="en-US" smtClean="0"/>
-              <a:t>5/31/2017</a:t>
+              <a:t>6/2/2017</a:t>
             </a:fld>
             <a:endParaRPr lang="en-US"/>
           </a:p>
@@ -4456,7 +4361,7 @@
           <a:p>
             <a:fld id="{0E462D58-24D5-460E-A073-5F56B9E1F7E7}" type="datetimeFigureOut">
               <a:rPr lang="en-US" smtClean="0"/>
-              <a:t>5/31/2017</a:t>
+              <a:t>6/2/2017</a:t>
             </a:fld>
             <a:endParaRPr lang="en-US"/>
           </a:p>
@@ -4701,7 +4606,7 @@
           <a:p>
             <a:fld id="{0E462D58-24D5-460E-A073-5F56B9E1F7E7}" type="datetimeFigureOut">
               <a:rPr lang="en-US" smtClean="0"/>
-              <a:t>5/31/2017</a:t>
+              <a:t>6/2/2017</a:t>
             </a:fld>
             <a:endParaRPr lang="en-US"/>
           </a:p>
@@ -4930,7 +4835,7 @@
           <a:p>
             <a:fld id="{0E462D58-24D5-460E-A073-5F56B9E1F7E7}" type="datetimeFigureOut">
               <a:rPr lang="en-US" smtClean="0"/>
-              <a:t>5/31/2017</a:t>
+              <a:t>6/2/2017</a:t>
             </a:fld>
             <a:endParaRPr lang="en-US"/>
           </a:p>
@@ -5294,7 +5199,7 @@
           <a:p>
             <a:fld id="{0E462D58-24D5-460E-A073-5F56B9E1F7E7}" type="datetimeFigureOut">
               <a:rPr lang="en-US" smtClean="0"/>
-              <a:t>5/31/2017</a:t>
+              <a:t>6/2/2017</a:t>
             </a:fld>
             <a:endParaRPr lang="en-US"/>
           </a:p>
@@ -5411,7 +5316,7 @@
           <a:p>
             <a:fld id="{0E462D58-24D5-460E-A073-5F56B9E1F7E7}" type="datetimeFigureOut">
               <a:rPr lang="en-US" smtClean="0"/>
-              <a:t>5/31/2017</a:t>
+              <a:t>6/2/2017</a:t>
             </a:fld>
             <a:endParaRPr lang="en-US"/>
           </a:p>
@@ -5506,7 +5411,7 @@
           <a:p>
             <a:fld id="{0E462D58-24D5-460E-A073-5F56B9E1F7E7}" type="datetimeFigureOut">
               <a:rPr lang="en-US" smtClean="0"/>
-              <a:t>5/31/2017</a:t>
+              <a:t>6/2/2017</a:t>
             </a:fld>
             <a:endParaRPr lang="en-US"/>
           </a:p>
@@ -5781,7 +5686,7 @@
           <a:p>
             <a:fld id="{0E462D58-24D5-460E-A073-5F56B9E1F7E7}" type="datetimeFigureOut">
               <a:rPr lang="en-US" smtClean="0"/>
-              <a:t>5/31/2017</a:t>
+              <a:t>6/2/2017</a:t>
             </a:fld>
             <a:endParaRPr lang="en-US"/>
           </a:p>
@@ -6033,7 +5938,7 @@
           <a:p>
             <a:fld id="{0E462D58-24D5-460E-A073-5F56B9E1F7E7}" type="datetimeFigureOut">
               <a:rPr lang="en-US" smtClean="0"/>
-              <a:t>5/31/2017</a:t>
+              <a:t>6/2/2017</a:t>
             </a:fld>
             <a:endParaRPr lang="en-US"/>
           </a:p>
@@ -6251,7 +6156,7 @@
           <a:p>
             <a:fld id="{0E462D58-24D5-460E-A073-5F56B9E1F7E7}" type="datetimeFigureOut">
               <a:rPr lang="en-US" smtClean="0"/>
-              <a:t>5/31/2017</a:t>
+              <a:t>6/2/2017</a:t>
             </a:fld>
             <a:endParaRPr lang="en-US" dirty="0"/>
           </a:p>
@@ -6829,189 +6734,6 @@
           <a:chExt cx="0" cy="0"/>
         </a:xfrm>
       </p:grpSpPr>
-      <p:pic>
-        <p:nvPicPr>
-          <p:cNvPr id="4098" name="Picture 2" descr="Image result for hans rosling"/>
-          <p:cNvPicPr>
-            <a:picLocks noChangeAspect="1" noChangeArrowheads="1"/>
-          </p:cNvPicPr>
-          <p:nvPr/>
-        </p:nvPicPr>
-        <p:blipFill>
-          <a:blip r:embed="rId3">
-            <a:extLst>
-              <a:ext uri="{28A0092B-C50C-407E-A947-70E740481C1C}">
-                <a14:useLocalDpi xmlns:a14="http://schemas.microsoft.com/office/drawing/2010/main" val="0"/>
-              </a:ext>
-            </a:extLst>
-          </a:blip>
-          <a:srcRect/>
-          <a:stretch>
-            <a:fillRect/>
-          </a:stretch>
-        </p:blipFill>
-        <p:spPr bwMode="auto">
-          <a:xfrm>
-            <a:off x="613721" y="1447802"/>
-            <a:ext cx="5696464" cy="4272348"/>
-          </a:xfrm>
-          <a:prstGeom prst="rect">
-            <a:avLst/>
-          </a:prstGeom>
-          <a:noFill/>
-          <a:extLst>
-            <a:ext uri="{909E8E84-426E-40DD-AFC4-6F175D3DCCD1}">
-              <a14:hiddenFill xmlns:a14="http://schemas.microsoft.com/office/drawing/2010/main">
-                <a:solidFill>
-                  <a:srgbClr val="FFFFFF"/>
-                </a:solidFill>
-              </a14:hiddenFill>
-            </a:ext>
-          </a:extLst>
-        </p:spPr>
-      </p:pic>
-      <p:pic>
-        <p:nvPicPr>
-          <p:cNvPr id="4100" name="Picture 4" descr="Image result for how to lie with statistics"/>
-          <p:cNvPicPr>
-            <a:picLocks noChangeAspect="1" noChangeArrowheads="1"/>
-          </p:cNvPicPr>
-          <p:nvPr/>
-        </p:nvPicPr>
-        <p:blipFill>
-          <a:blip r:embed="rId4">
-            <a:extLst>
-              <a:ext uri="{28A0092B-C50C-407E-A947-70E740481C1C}">
-                <a14:useLocalDpi xmlns:a14="http://schemas.microsoft.com/office/drawing/2010/main" val="0"/>
-              </a:ext>
-            </a:extLst>
-          </a:blip>
-          <a:srcRect/>
-          <a:stretch>
-            <a:fillRect/>
-          </a:stretch>
-        </p:blipFill>
-        <p:spPr bwMode="auto">
-          <a:xfrm>
-            <a:off x="7092779" y="1447802"/>
-            <a:ext cx="4261020" cy="4261020"/>
-          </a:xfrm>
-          <a:prstGeom prst="rect">
-            <a:avLst/>
-          </a:prstGeom>
-          <a:noFill/>
-          <a:extLst>
-            <a:ext uri="{909E8E84-426E-40DD-AFC4-6F175D3DCCD1}">
-              <a14:hiddenFill xmlns:a14="http://schemas.microsoft.com/office/drawing/2010/main">
-                <a:solidFill>
-                  <a:srgbClr val="FFFFFF"/>
-                </a:solidFill>
-              </a14:hiddenFill>
-            </a:ext>
-          </a:extLst>
-        </p:spPr>
-      </p:pic>
-    </p:spTree>
-    <p:extLst>
-      <p:ext uri="{BB962C8B-B14F-4D97-AF65-F5344CB8AC3E}">
-        <p14:creationId xmlns:p14="http://schemas.microsoft.com/office/powerpoint/2010/main" val="412592758"/>
-      </p:ext>
-    </p:extLst>
-  </p:cSld>
-  <p:clrMapOvr>
-    <a:masterClrMapping/>
-  </p:clrMapOvr>
-</p:sld>
-</file>
-
-<file path=ppt/slides/slide11.xml><?xml version="1.0" encoding="utf-8"?>
-<p:sld xmlns:a="http://schemas.openxmlformats.org/drawingml/2006/main" xmlns:r="http://schemas.openxmlformats.org/officeDocument/2006/relationships" xmlns:p="http://schemas.openxmlformats.org/presentationml/2006/main">
-  <p:cSld>
-    <p:spTree>
-      <p:nvGrpSpPr>
-        <p:cNvPr id="1" name=""/>
-        <p:cNvGrpSpPr/>
-        <p:nvPr/>
-      </p:nvGrpSpPr>
-      <p:grpSpPr>
-        <a:xfrm>
-          <a:off x="0" y="0"/>
-          <a:ext cx="0" cy="0"/>
-          <a:chOff x="0" y="0"/>
-          <a:chExt cx="0" cy="0"/>
-        </a:xfrm>
-      </p:grpSpPr>
-      <p:sp>
-        <p:nvSpPr>
-          <p:cNvPr id="3" name="Content Placeholder 2"/>
-          <p:cNvSpPr>
-            <a:spLocks noGrp="1"/>
-          </p:cNvSpPr>
-          <p:nvPr>
-            <p:ph idx="1"/>
-          </p:nvPr>
-        </p:nvSpPr>
-        <p:spPr>
-          <a:xfrm>
-            <a:off x="611606" y="2561139"/>
-            <a:ext cx="10968789" cy="1735722"/>
-          </a:xfrm>
-        </p:spPr>
-        <p:txBody>
-          <a:bodyPr>
-            <a:normAutofit fontScale="92500"/>
-          </a:bodyPr>
-          <a:lstStyle/>
-          <a:p>
-            <a:pPr marL="0" indent="0">
-              <a:buNone/>
-            </a:pPr>
-            <a:r>
-              <a:rPr lang="en-US" sz="4800" dirty="0"/>
-              <a:t>“In God we trust, all others must bring data”</a:t>
-            </a:r>
-          </a:p>
-          <a:p>
-            <a:pPr marL="0" indent="0">
-              <a:buNone/>
-            </a:pPr>
-            <a:r>
-              <a:rPr lang="en-US" sz="4800" dirty="0"/>
-              <a:t>- W. Edwards Deming</a:t>
-            </a:r>
-          </a:p>
-        </p:txBody>
-      </p:sp>
-    </p:spTree>
-    <p:extLst>
-      <p:ext uri="{BB962C8B-B14F-4D97-AF65-F5344CB8AC3E}">
-        <p14:creationId xmlns:p14="http://schemas.microsoft.com/office/powerpoint/2010/main" val="484091321"/>
-      </p:ext>
-    </p:extLst>
-  </p:cSld>
-  <p:clrMapOvr>
-    <a:masterClrMapping/>
-  </p:clrMapOvr>
-</p:sld>
-</file>
-
-<file path=ppt/slides/slide12.xml><?xml version="1.0" encoding="utf-8"?>
-<p:sld xmlns:a="http://schemas.openxmlformats.org/drawingml/2006/main" xmlns:r="http://schemas.openxmlformats.org/officeDocument/2006/relationships" xmlns:p="http://schemas.openxmlformats.org/presentationml/2006/main">
-  <p:cSld>
-    <p:spTree>
-      <p:nvGrpSpPr>
-        <p:cNvPr id="1" name=""/>
-        <p:cNvGrpSpPr/>
-        <p:nvPr/>
-      </p:nvGrpSpPr>
-      <p:grpSpPr>
-        <a:xfrm>
-          <a:off x="0" y="0"/>
-          <a:ext cx="0" cy="0"/>
-          <a:chOff x="0" y="0"/>
-          <a:chExt cx="0" cy="0"/>
-        </a:xfrm>
-      </p:grpSpPr>
       <p:sp>
         <p:nvSpPr>
           <p:cNvPr id="2" name="Title 1"/>
@@ -7175,7 +6897,7 @@
 </p:sld>
 </file>
 
-<file path=ppt/slides/slide13.xml><?xml version="1.0" encoding="utf-8"?>
+<file path=ppt/slides/slide11.xml><?xml version="1.0" encoding="utf-8"?>
 <p:sld xmlns:a="http://schemas.openxmlformats.org/drawingml/2006/main" xmlns:r="http://schemas.openxmlformats.org/officeDocument/2006/relationships" xmlns:p="http://schemas.openxmlformats.org/presentationml/2006/main">
   <p:cSld>
     <p:spTree>
@@ -7232,7 +6954,7 @@
 </p:sld>
 </file>
 
-<file path=ppt/slides/slide14.xml><?xml version="1.0" encoding="utf-8"?>
+<file path=ppt/slides/slide12.xml><?xml version="1.0" encoding="utf-8"?>
 <p:sld xmlns:a="http://schemas.openxmlformats.org/drawingml/2006/main" xmlns:r="http://schemas.openxmlformats.org/officeDocument/2006/relationships" xmlns:p="http://schemas.openxmlformats.org/presentationml/2006/main">
   <p:cSld>
     <p:spTree>
@@ -7289,7 +7011,7 @@
 </p:sld>
 </file>
 
-<file path=ppt/slides/slide15.xml><?xml version="1.0" encoding="utf-8"?>
+<file path=ppt/slides/slide13.xml><?xml version="1.0" encoding="utf-8"?>
 <p:sld xmlns:a="http://schemas.openxmlformats.org/drawingml/2006/main" xmlns:r="http://schemas.openxmlformats.org/officeDocument/2006/relationships" xmlns:p="http://schemas.openxmlformats.org/presentationml/2006/main">
   <p:cSld>
     <p:spTree>
@@ -7428,7 +7150,7 @@
 </p:sld>
 </file>
 
-<file path=ppt/slides/slide16.xml><?xml version="1.0" encoding="utf-8"?>
+<file path=ppt/slides/slide14.xml><?xml version="1.0" encoding="utf-8"?>
 <p:sld xmlns:a="http://schemas.openxmlformats.org/drawingml/2006/main" xmlns:r="http://schemas.openxmlformats.org/officeDocument/2006/relationships" xmlns:p="http://schemas.openxmlformats.org/presentationml/2006/main">
   <p:cSld>
     <p:spTree>
@@ -7526,7 +7248,7 @@
 </p:sld>
 </file>
 
-<file path=ppt/slides/slide17.xml><?xml version="1.0" encoding="utf-8"?>
+<file path=ppt/slides/slide15.xml><?xml version="1.0" encoding="utf-8"?>
 <p:sld xmlns:a="http://schemas.openxmlformats.org/drawingml/2006/main" xmlns:r="http://schemas.openxmlformats.org/officeDocument/2006/relationships" xmlns:p="http://schemas.openxmlformats.org/presentationml/2006/main">
   <p:cSld>
     <p:spTree>
@@ -7597,6 +7319,230 @@
 </p:sld>
 </file>
 
+<file path=ppt/slides/slide16.xml><?xml version="1.0" encoding="utf-8"?>
+<p:sld xmlns:a="http://schemas.openxmlformats.org/drawingml/2006/main" xmlns:r="http://schemas.openxmlformats.org/officeDocument/2006/relationships" xmlns:p="http://schemas.openxmlformats.org/presentationml/2006/main">
+  <p:cSld>
+    <p:spTree>
+      <p:nvGrpSpPr>
+        <p:cNvPr id="1" name=""/>
+        <p:cNvGrpSpPr/>
+        <p:nvPr/>
+      </p:nvGrpSpPr>
+      <p:grpSpPr>
+        <a:xfrm>
+          <a:off x="0" y="0"/>
+          <a:ext cx="0" cy="0"/>
+          <a:chOff x="0" y="0"/>
+          <a:chExt cx="0" cy="0"/>
+        </a:xfrm>
+      </p:grpSpPr>
+      <p:sp>
+        <p:nvSpPr>
+          <p:cNvPr id="2" name="Title 1"/>
+          <p:cNvSpPr>
+            <a:spLocks noGrp="1"/>
+          </p:cNvSpPr>
+          <p:nvPr>
+            <p:ph type="title"/>
+          </p:nvPr>
+        </p:nvSpPr>
+        <p:spPr/>
+        <p:txBody>
+          <a:bodyPr>
+            <a:normAutofit/>
+          </a:bodyPr>
+          <a:lstStyle/>
+          <a:p>
+            <a:r>
+              <a:rPr lang="en-US" sz="6600" dirty="0"/>
+              <a:t>When to use it?</a:t>
+            </a:r>
+          </a:p>
+        </p:txBody>
+      </p:sp>
+      <p:sp>
+        <p:nvSpPr>
+          <p:cNvPr id="3" name="Content Placeholder 2"/>
+          <p:cNvSpPr>
+            <a:spLocks noGrp="1"/>
+          </p:cNvSpPr>
+          <p:nvPr>
+            <p:ph idx="1"/>
+          </p:nvPr>
+        </p:nvSpPr>
+        <p:spPr/>
+        <p:txBody>
+          <a:bodyPr>
+            <a:normAutofit/>
+          </a:bodyPr>
+          <a:lstStyle/>
+          <a:p>
+            <a:pPr marL="0" indent="0">
+              <a:buNone/>
+            </a:pPr>
+            <a:r>
+              <a:rPr lang="en-US" sz="4400" dirty="0"/>
+              <a:t>Data Exploration</a:t>
+            </a:r>
+          </a:p>
+          <a:p>
+            <a:pPr marL="0" indent="0">
+              <a:buNone/>
+            </a:pPr>
+            <a:endParaRPr lang="en-US" sz="4400" dirty="0"/>
+          </a:p>
+          <a:p>
+            <a:pPr marL="0" indent="0">
+              <a:buNone/>
+            </a:pPr>
+            <a:r>
+              <a:rPr lang="en-US" sz="4400" dirty="0"/>
+              <a:t>Statistical Analysis</a:t>
+            </a:r>
+          </a:p>
+          <a:p>
+            <a:pPr marL="0" indent="0">
+              <a:buNone/>
+            </a:pPr>
+            <a:endParaRPr lang="en-US" sz="4400" dirty="0"/>
+          </a:p>
+          <a:p>
+            <a:pPr marL="0" indent="0">
+              <a:buNone/>
+            </a:pPr>
+            <a:r>
+              <a:rPr lang="en-US" sz="4400" dirty="0"/>
+              <a:t>Data Visualization</a:t>
+            </a:r>
+          </a:p>
+        </p:txBody>
+      </p:sp>
+    </p:spTree>
+    <p:extLst>
+      <p:ext uri="{BB962C8B-B14F-4D97-AF65-F5344CB8AC3E}">
+        <p14:creationId xmlns:p14="http://schemas.microsoft.com/office/powerpoint/2010/main" val="3163846291"/>
+      </p:ext>
+    </p:extLst>
+  </p:cSld>
+  <p:clrMapOvr>
+    <a:masterClrMapping/>
+  </p:clrMapOvr>
+</p:sld>
+</file>
+
+<file path=ppt/slides/slide17.xml><?xml version="1.0" encoding="utf-8"?>
+<p:sld xmlns:a="http://schemas.openxmlformats.org/drawingml/2006/main" xmlns:r="http://schemas.openxmlformats.org/officeDocument/2006/relationships" xmlns:p="http://schemas.openxmlformats.org/presentationml/2006/main">
+  <p:cSld>
+    <p:spTree>
+      <p:nvGrpSpPr>
+        <p:cNvPr id="1" name=""/>
+        <p:cNvGrpSpPr/>
+        <p:nvPr/>
+      </p:nvGrpSpPr>
+      <p:grpSpPr>
+        <a:xfrm>
+          <a:off x="0" y="0"/>
+          <a:ext cx="0" cy="0"/>
+          <a:chOff x="0" y="0"/>
+          <a:chExt cx="0" cy="0"/>
+        </a:xfrm>
+      </p:grpSpPr>
+      <p:sp>
+        <p:nvSpPr>
+          <p:cNvPr id="2" name="Title 1"/>
+          <p:cNvSpPr>
+            <a:spLocks noGrp="1"/>
+          </p:cNvSpPr>
+          <p:nvPr>
+            <p:ph type="title"/>
+          </p:nvPr>
+        </p:nvSpPr>
+        <p:spPr/>
+        <p:txBody>
+          <a:bodyPr>
+            <a:normAutofit/>
+          </a:bodyPr>
+          <a:lstStyle/>
+          <a:p>
+            <a:r>
+              <a:rPr lang="en-US" sz="6600" dirty="0"/>
+              <a:t>When to not use it?</a:t>
+            </a:r>
+          </a:p>
+        </p:txBody>
+      </p:sp>
+      <p:sp>
+        <p:nvSpPr>
+          <p:cNvPr id="3" name="Content Placeholder 2"/>
+          <p:cNvSpPr>
+            <a:spLocks noGrp="1"/>
+          </p:cNvSpPr>
+          <p:nvPr>
+            <p:ph idx="1"/>
+          </p:nvPr>
+        </p:nvSpPr>
+        <p:spPr>
+          <a:xfrm>
+            <a:off x="838200" y="1690688"/>
+            <a:ext cx="10515600" cy="3386679"/>
+          </a:xfrm>
+        </p:spPr>
+        <p:txBody>
+          <a:bodyPr>
+            <a:normAutofit/>
+          </a:bodyPr>
+          <a:lstStyle/>
+          <a:p>
+            <a:pPr marL="0" indent="0">
+              <a:buNone/>
+            </a:pPr>
+            <a:r>
+              <a:rPr lang="en-US" sz="4400" dirty="0"/>
+              <a:t>Anything Non-statistical</a:t>
+            </a:r>
+          </a:p>
+          <a:p>
+            <a:pPr marL="0" indent="0">
+              <a:buNone/>
+            </a:pPr>
+            <a:endParaRPr lang="en-US" sz="4400" dirty="0"/>
+          </a:p>
+          <a:p>
+            <a:pPr marL="0" indent="0">
+              <a:buNone/>
+            </a:pPr>
+            <a:r>
+              <a:rPr lang="en-US" sz="4400" dirty="0"/>
+              <a:t>Complex applications</a:t>
+            </a:r>
+          </a:p>
+          <a:p>
+            <a:pPr marL="0" indent="0">
+              <a:buNone/>
+            </a:pPr>
+            <a:endParaRPr lang="en-US" sz="4400" dirty="0"/>
+          </a:p>
+          <a:p>
+            <a:pPr marL="0" indent="0">
+              <a:buNone/>
+            </a:pPr>
+            <a:endParaRPr lang="en-US" sz="4400" dirty="0"/>
+          </a:p>
+        </p:txBody>
+      </p:sp>
+    </p:spTree>
+    <p:extLst>
+      <p:ext uri="{BB962C8B-B14F-4D97-AF65-F5344CB8AC3E}">
+        <p14:creationId xmlns:p14="http://schemas.microsoft.com/office/powerpoint/2010/main" val="2981051004"/>
+      </p:ext>
+    </p:extLst>
+  </p:cSld>
+  <p:clrMapOvr>
+    <a:masterClrMapping/>
+  </p:clrMapOvr>
+</p:sld>
+</file>
+
 <file path=ppt/slides/slide18.xml><?xml version="1.0" encoding="utf-8"?>
 <p:sld xmlns:a="http://schemas.openxmlformats.org/drawingml/2006/main" xmlns:r="http://schemas.openxmlformats.org/officeDocument/2006/relationships" xmlns:p="http://schemas.openxmlformats.org/presentationml/2006/main">
   <p:cSld>
@@ -7624,73 +7570,19 @@
             <p:ph type="title"/>
           </p:nvPr>
         </p:nvSpPr>
-        <p:spPr/>
-        <p:txBody>
-          <a:bodyPr>
-            <a:normAutofit/>
-          </a:bodyPr>
-          <a:lstStyle/>
-          <a:p>
-            <a:r>
-              <a:rPr lang="en-US" sz="6600" dirty="0"/>
-              <a:t>When to use it?</a:t>
-            </a:r>
-          </a:p>
-        </p:txBody>
-      </p:sp>
-      <p:sp>
-        <p:nvSpPr>
-          <p:cNvPr id="3" name="Content Placeholder 2"/>
-          <p:cNvSpPr>
-            <a:spLocks noGrp="1"/>
-          </p:cNvSpPr>
-          <p:nvPr>
-            <p:ph idx="1"/>
-          </p:nvPr>
-        </p:nvSpPr>
-        <p:spPr/>
-        <p:txBody>
-          <a:bodyPr>
-            <a:normAutofit/>
-          </a:bodyPr>
-          <a:lstStyle/>
-          <a:p>
-            <a:pPr marL="0" indent="0">
-              <a:buNone/>
-            </a:pPr>
-            <a:r>
-              <a:rPr lang="en-US" sz="4400" dirty="0"/>
-              <a:t>Data Exploration</a:t>
-            </a:r>
-          </a:p>
-          <a:p>
-            <a:pPr marL="0" indent="0">
-              <a:buNone/>
-            </a:pPr>
-            <a:endParaRPr lang="en-US" sz="4400" dirty="0"/>
-          </a:p>
-          <a:p>
-            <a:pPr marL="0" indent="0">
-              <a:buNone/>
-            </a:pPr>
-            <a:r>
-              <a:rPr lang="en-US" sz="4400" dirty="0"/>
-              <a:t>Statistical Analysis</a:t>
-            </a:r>
-          </a:p>
-          <a:p>
-            <a:pPr marL="0" indent="0">
-              <a:buNone/>
-            </a:pPr>
-            <a:endParaRPr lang="en-US" sz="4400" dirty="0"/>
-          </a:p>
-          <a:p>
-            <a:pPr marL="0" indent="0">
-              <a:buNone/>
-            </a:pPr>
-            <a:r>
-              <a:rPr lang="en-US" sz="4400" dirty="0"/>
-              <a:t>Data Visualization</a:t>
+        <p:spPr>
+          <a:xfrm>
+            <a:off x="398362" y="2610613"/>
+            <a:ext cx="10515600" cy="1325563"/>
+          </a:xfrm>
+        </p:spPr>
+        <p:txBody>
+          <a:bodyPr/>
+          <a:lstStyle/>
+          <a:p>
+            <a:r>
+              <a:rPr lang="en-US" dirty="0"/>
+              <a:t>R Basics – Demo</a:t>
             </a:r>
           </a:p>
         </p:txBody>
@@ -7698,7 +7590,7 @@
     </p:spTree>
     <p:extLst>
       <p:ext uri="{BB962C8B-B14F-4D97-AF65-F5344CB8AC3E}">
-        <p14:creationId xmlns:p14="http://schemas.microsoft.com/office/powerpoint/2010/main" val="3163846291"/>
+        <p14:creationId xmlns:p14="http://schemas.microsoft.com/office/powerpoint/2010/main" val="3521706402"/>
       </p:ext>
     </p:extLst>
   </p:cSld>
@@ -7735,83 +7627,69 @@
             <p:ph type="title"/>
           </p:nvPr>
         </p:nvSpPr>
-        <p:spPr/>
-        <p:txBody>
-          <a:bodyPr>
-            <a:normAutofit/>
-          </a:bodyPr>
-          <a:lstStyle/>
-          <a:p>
-            <a:r>
-              <a:rPr lang="en-US" sz="6600" dirty="0"/>
-              <a:t>When to not use it?</a:t>
-            </a:r>
-          </a:p>
-        </p:txBody>
-      </p:sp>
-      <p:sp>
-        <p:nvSpPr>
-          <p:cNvPr id="3" name="Content Placeholder 2"/>
-          <p:cNvSpPr>
-            <a:spLocks noGrp="1"/>
-          </p:cNvSpPr>
-          <p:nvPr>
-            <p:ph idx="1"/>
-          </p:nvPr>
-        </p:nvSpPr>
         <p:spPr>
           <a:xfrm>
-            <a:off x="838200" y="1690688"/>
-            <a:ext cx="10515600" cy="3386679"/>
+            <a:off x="0" y="0"/>
+            <a:ext cx="12191999" cy="915535"/>
           </a:xfrm>
         </p:spPr>
         <p:txBody>
-          <a:bodyPr>
-            <a:normAutofit/>
-          </a:bodyPr>
-          <a:lstStyle/>
-          <a:p>
-            <a:pPr marL="0" indent="0">
-              <a:buNone/>
-            </a:pPr>
-            <a:r>
-              <a:rPr lang="en-US" sz="4400" dirty="0"/>
-              <a:t>Anything Non-statistical</a:t>
-            </a:r>
-          </a:p>
-          <a:p>
-            <a:pPr marL="0" indent="0">
-              <a:buNone/>
-            </a:pPr>
-            <a:endParaRPr lang="en-US" sz="4400" dirty="0"/>
-          </a:p>
-          <a:p>
-            <a:pPr marL="0" indent="0">
-              <a:buNone/>
-            </a:pPr>
-            <a:r>
-              <a:rPr lang="en-US" sz="4400" dirty="0"/>
-              <a:t>Complex applications</a:t>
-            </a:r>
-          </a:p>
-          <a:p>
-            <a:pPr marL="0" indent="0">
-              <a:buNone/>
-            </a:pPr>
-            <a:endParaRPr lang="en-US" sz="4400" dirty="0"/>
-          </a:p>
-          <a:p>
-            <a:pPr marL="0" indent="0">
-              <a:buNone/>
-            </a:pPr>
-            <a:endParaRPr lang="en-US" sz="4400" dirty="0"/>
-          </a:p>
-        </p:txBody>
-      </p:sp>
+          <a:bodyPr/>
+          <a:lstStyle/>
+          <a:p>
+            <a:pPr algn="ctr"/>
+            <a:r>
+              <a:rPr lang="en-US" dirty="0"/>
+              <a:t>Different Flavors of R</a:t>
+            </a:r>
+          </a:p>
+        </p:txBody>
+      </p:sp>
+      <p:pic>
+        <p:nvPicPr>
+          <p:cNvPr id="9218" name="Picture 2" descr="Red Green and White Ice Cream Scoops on Brown Cone"/>
+          <p:cNvPicPr>
+            <a:picLocks noChangeAspect="1" noChangeArrowheads="1"/>
+          </p:cNvPicPr>
+          <p:nvPr/>
+        </p:nvPicPr>
+        <p:blipFill>
+          <a:blip r:embed="rId3">
+            <a:extLst>
+              <a:ext uri="{28A0092B-C50C-407E-A947-70E740481C1C}">
+                <a14:useLocalDpi xmlns:a14="http://schemas.microsoft.com/office/drawing/2010/main" val="0"/>
+              </a:ext>
+            </a:extLst>
+          </a:blip>
+          <a:srcRect/>
+          <a:stretch>
+            <a:fillRect/>
+          </a:stretch>
+        </p:blipFill>
+        <p:spPr bwMode="auto">
+          <a:xfrm>
+            <a:off x="1979518" y="915535"/>
+            <a:ext cx="8232962" cy="5509078"/>
+          </a:xfrm>
+          <a:prstGeom prst="rect">
+            <a:avLst/>
+          </a:prstGeom>
+          <a:noFill/>
+          <a:extLst>
+            <a:ext uri="{909E8E84-426E-40DD-AFC4-6F175D3DCCD1}">
+              <a14:hiddenFill xmlns:a14="http://schemas.microsoft.com/office/drawing/2010/main">
+                <a:solidFill>
+                  <a:srgbClr val="FFFFFF"/>
+                </a:solidFill>
+              </a14:hiddenFill>
+            </a:ext>
+          </a:extLst>
+        </p:spPr>
+      </p:pic>
     </p:spTree>
     <p:extLst>
       <p:ext uri="{BB962C8B-B14F-4D97-AF65-F5344CB8AC3E}">
-        <p14:creationId xmlns:p14="http://schemas.microsoft.com/office/powerpoint/2010/main" val="2981051004"/>
+        <p14:creationId xmlns:p14="http://schemas.microsoft.com/office/powerpoint/2010/main" val="4260869535"/>
       </p:ext>
     </p:extLst>
   </p:cSld>
@@ -7991,331 +7869,6 @@
         </p:nvSpPr>
         <p:spPr>
           <a:xfrm>
-            <a:off x="398362" y="2610613"/>
-            <a:ext cx="10515600" cy="1325563"/>
-          </a:xfrm>
-        </p:spPr>
-        <p:txBody>
-          <a:bodyPr/>
-          <a:lstStyle/>
-          <a:p>
-            <a:r>
-              <a:rPr lang="en-US" dirty="0"/>
-              <a:t>R Basics – Demo</a:t>
-            </a:r>
-          </a:p>
-        </p:txBody>
-      </p:sp>
-    </p:spTree>
-    <p:extLst>
-      <p:ext uri="{BB962C8B-B14F-4D97-AF65-F5344CB8AC3E}">
-        <p14:creationId xmlns:p14="http://schemas.microsoft.com/office/powerpoint/2010/main" val="3521706402"/>
-      </p:ext>
-    </p:extLst>
-  </p:cSld>
-  <p:clrMapOvr>
-    <a:masterClrMapping/>
-  </p:clrMapOvr>
-</p:sld>
-</file>
-
-<file path=ppt/slides/slide21.xml><?xml version="1.0" encoding="utf-8"?>
-<p:sld xmlns:a="http://schemas.openxmlformats.org/drawingml/2006/main" xmlns:r="http://schemas.openxmlformats.org/officeDocument/2006/relationships" xmlns:p="http://schemas.openxmlformats.org/presentationml/2006/main">
-  <p:cSld>
-    <p:spTree>
-      <p:nvGrpSpPr>
-        <p:cNvPr id="1" name=""/>
-        <p:cNvGrpSpPr/>
-        <p:nvPr/>
-      </p:nvGrpSpPr>
-      <p:grpSpPr>
-        <a:xfrm>
-          <a:off x="0" y="0"/>
-          <a:ext cx="0" cy="0"/>
-          <a:chOff x="0" y="0"/>
-          <a:chExt cx="0" cy="0"/>
-        </a:xfrm>
-      </p:grpSpPr>
-      <p:sp>
-        <p:nvSpPr>
-          <p:cNvPr id="2" name="Title 1"/>
-          <p:cNvSpPr>
-            <a:spLocks noGrp="1"/>
-          </p:cNvSpPr>
-          <p:nvPr>
-            <p:ph type="title"/>
-          </p:nvPr>
-        </p:nvSpPr>
-        <p:spPr>
-          <a:xfrm>
-            <a:off x="0" y="0"/>
-            <a:ext cx="12191999" cy="915535"/>
-          </a:xfrm>
-        </p:spPr>
-        <p:txBody>
-          <a:bodyPr/>
-          <a:lstStyle/>
-          <a:p>
-            <a:pPr algn="ctr"/>
-            <a:r>
-              <a:rPr lang="en-US" dirty="0"/>
-              <a:t>Different Flavors of R</a:t>
-            </a:r>
-          </a:p>
-        </p:txBody>
-      </p:sp>
-      <p:pic>
-        <p:nvPicPr>
-          <p:cNvPr id="9218" name="Picture 2" descr="Red Green and White Ice Cream Scoops on Brown Cone"/>
-          <p:cNvPicPr>
-            <a:picLocks noChangeAspect="1" noChangeArrowheads="1"/>
-          </p:cNvPicPr>
-          <p:nvPr/>
-        </p:nvPicPr>
-        <p:blipFill>
-          <a:blip r:embed="rId3">
-            <a:extLst>
-              <a:ext uri="{28A0092B-C50C-407E-A947-70E740481C1C}">
-                <a14:useLocalDpi xmlns:a14="http://schemas.microsoft.com/office/drawing/2010/main" val="0"/>
-              </a:ext>
-            </a:extLst>
-          </a:blip>
-          <a:srcRect/>
-          <a:stretch>
-            <a:fillRect/>
-          </a:stretch>
-        </p:blipFill>
-        <p:spPr bwMode="auto">
-          <a:xfrm>
-            <a:off x="1979518" y="915535"/>
-            <a:ext cx="8232962" cy="5509078"/>
-          </a:xfrm>
-          <a:prstGeom prst="rect">
-            <a:avLst/>
-          </a:prstGeom>
-          <a:noFill/>
-          <a:extLst>
-            <a:ext uri="{909E8E84-426E-40DD-AFC4-6F175D3DCCD1}">
-              <a14:hiddenFill xmlns:a14="http://schemas.microsoft.com/office/drawing/2010/main">
-                <a:solidFill>
-                  <a:srgbClr val="FFFFFF"/>
-                </a:solidFill>
-              </a14:hiddenFill>
-            </a:ext>
-          </a:extLst>
-        </p:spPr>
-      </p:pic>
-    </p:spTree>
-    <p:extLst>
-      <p:ext uri="{BB962C8B-B14F-4D97-AF65-F5344CB8AC3E}">
-        <p14:creationId xmlns:p14="http://schemas.microsoft.com/office/powerpoint/2010/main" val="4260869535"/>
-      </p:ext>
-    </p:extLst>
-  </p:cSld>
-  <p:clrMapOvr>
-    <a:masterClrMapping/>
-  </p:clrMapOvr>
-</p:sld>
-</file>
-
-<file path=ppt/slides/slide22.xml><?xml version="1.0" encoding="utf-8"?>
-<p:sld xmlns:a="http://schemas.openxmlformats.org/drawingml/2006/main" xmlns:r="http://schemas.openxmlformats.org/officeDocument/2006/relationships" xmlns:p="http://schemas.openxmlformats.org/presentationml/2006/main">
-  <p:cSld>
-    <p:spTree>
-      <p:nvGrpSpPr>
-        <p:cNvPr id="1" name=""/>
-        <p:cNvGrpSpPr/>
-        <p:nvPr/>
-      </p:nvGrpSpPr>
-      <p:grpSpPr>
-        <a:xfrm>
-          <a:off x="0" y="0"/>
-          <a:ext cx="0" cy="0"/>
-          <a:chOff x="0" y="0"/>
-          <a:chExt cx="0" cy="0"/>
-        </a:xfrm>
-      </p:grpSpPr>
-      <p:sp>
-        <p:nvSpPr>
-          <p:cNvPr id="3" name="Content Placeholder 2"/>
-          <p:cNvSpPr>
-            <a:spLocks noGrp="1"/>
-          </p:cNvSpPr>
-          <p:nvPr>
-            <p:ph idx="1"/>
-          </p:nvPr>
-        </p:nvSpPr>
-        <p:spPr>
-          <a:xfrm>
-            <a:off x="4797267" y="1551008"/>
-            <a:ext cx="6521245" cy="4490962"/>
-          </a:xfrm>
-        </p:spPr>
-        <p:txBody>
-          <a:bodyPr>
-            <a:normAutofit/>
-          </a:bodyPr>
-          <a:lstStyle/>
-          <a:p>
-            <a:pPr marL="0" indent="0">
-              <a:buNone/>
-            </a:pPr>
-            <a:r>
-              <a:rPr lang="en-US" sz="3200" dirty="0" err="1"/>
-              <a:t>dplyr</a:t>
-            </a:r>
-            <a:endParaRPr lang="en-US" sz="3200" dirty="0"/>
-          </a:p>
-          <a:p>
-            <a:pPr marL="0" indent="0">
-              <a:buNone/>
-            </a:pPr>
-            <a:r>
-              <a:rPr lang="en-US" sz="3200" dirty="0"/>
-              <a:t>ggplot2</a:t>
-            </a:r>
-          </a:p>
-          <a:p>
-            <a:pPr marL="0" indent="0">
-              <a:buNone/>
-            </a:pPr>
-            <a:r>
-              <a:rPr lang="en-US" sz="3200" dirty="0" err="1"/>
-              <a:t>xlsx</a:t>
-            </a:r>
-            <a:endParaRPr lang="en-US" sz="3200" dirty="0"/>
-          </a:p>
-          <a:p>
-            <a:pPr marL="0" indent="0">
-              <a:buNone/>
-            </a:pPr>
-            <a:r>
-              <a:rPr lang="en-US" sz="3200" dirty="0" err="1"/>
-              <a:t>quantmod</a:t>
-            </a:r>
-            <a:endParaRPr lang="en-US" sz="3200" dirty="0"/>
-          </a:p>
-          <a:p>
-            <a:pPr marL="0" indent="0">
-              <a:buNone/>
-            </a:pPr>
-            <a:r>
-              <a:rPr lang="en-US" sz="3200" dirty="0"/>
-              <a:t>Shiny</a:t>
-            </a:r>
-          </a:p>
-        </p:txBody>
-      </p:sp>
-      <p:pic>
-        <p:nvPicPr>
-          <p:cNvPr id="6146" name="Picture 2" descr="But wait There's more - But wait There's more  Billy Mays"/>
-          <p:cNvPicPr>
-            <a:picLocks noChangeAspect="1" noChangeArrowheads="1"/>
-          </p:cNvPicPr>
-          <p:nvPr/>
-        </p:nvPicPr>
-        <p:blipFill>
-          <a:blip r:embed="rId3">
-            <a:extLst>
-              <a:ext uri="{28A0092B-C50C-407E-A947-70E740481C1C}">
-                <a14:useLocalDpi xmlns:a14="http://schemas.microsoft.com/office/drawing/2010/main" val="0"/>
-              </a:ext>
-            </a:extLst>
-          </a:blip>
-          <a:srcRect/>
-          <a:stretch>
-            <a:fillRect/>
-          </a:stretch>
-        </p:blipFill>
-        <p:spPr bwMode="auto">
-          <a:xfrm>
-            <a:off x="256263" y="602016"/>
-            <a:ext cx="4284739" cy="5495178"/>
-          </a:xfrm>
-          <a:prstGeom prst="rect">
-            <a:avLst/>
-          </a:prstGeom>
-          <a:noFill/>
-          <a:extLst>
-            <a:ext uri="{909E8E84-426E-40DD-AFC4-6F175D3DCCD1}">
-              <a14:hiddenFill xmlns:a14="http://schemas.microsoft.com/office/drawing/2010/main">
-                <a:solidFill>
-                  <a:srgbClr val="FFFFFF"/>
-                </a:solidFill>
-              </a14:hiddenFill>
-            </a:ext>
-          </a:extLst>
-        </p:spPr>
-      </p:pic>
-      <p:sp>
-        <p:nvSpPr>
-          <p:cNvPr id="4" name="Title 1"/>
-          <p:cNvSpPr>
-            <a:spLocks noGrp="1"/>
-          </p:cNvSpPr>
-          <p:nvPr>
-            <p:ph type="title"/>
-          </p:nvPr>
-        </p:nvSpPr>
-        <p:spPr>
-          <a:xfrm>
-            <a:off x="4797266" y="602016"/>
-            <a:ext cx="6556533" cy="786946"/>
-          </a:xfrm>
-        </p:spPr>
-        <p:txBody>
-          <a:bodyPr/>
-          <a:lstStyle/>
-          <a:p>
-            <a:r>
-              <a:rPr lang="en-US" dirty="0"/>
-              <a:t>Common Packages</a:t>
-            </a:r>
-          </a:p>
-        </p:txBody>
-      </p:sp>
-    </p:spTree>
-    <p:extLst>
-      <p:ext uri="{BB962C8B-B14F-4D97-AF65-F5344CB8AC3E}">
-        <p14:creationId xmlns:p14="http://schemas.microsoft.com/office/powerpoint/2010/main" val="2204730907"/>
-      </p:ext>
-    </p:extLst>
-  </p:cSld>
-  <p:clrMapOvr>
-    <a:masterClrMapping/>
-  </p:clrMapOvr>
-</p:sld>
-</file>
-
-<file path=ppt/slides/slide23.xml><?xml version="1.0" encoding="utf-8"?>
-<p:sld xmlns:a="http://schemas.openxmlformats.org/drawingml/2006/main" xmlns:r="http://schemas.openxmlformats.org/officeDocument/2006/relationships" xmlns:p="http://schemas.openxmlformats.org/presentationml/2006/main">
-  <p:cSld>
-    <p:spTree>
-      <p:nvGrpSpPr>
-        <p:cNvPr id="1" name=""/>
-        <p:cNvGrpSpPr/>
-        <p:nvPr/>
-      </p:nvGrpSpPr>
-      <p:grpSpPr>
-        <a:xfrm>
-          <a:off x="0" y="0"/>
-          <a:ext cx="0" cy="0"/>
-          <a:chOff x="0" y="0"/>
-          <a:chExt cx="0" cy="0"/>
-        </a:xfrm>
-      </p:grpSpPr>
-      <p:sp>
-        <p:nvSpPr>
-          <p:cNvPr id="2" name="Title 1"/>
-          <p:cNvSpPr>
-            <a:spLocks noGrp="1"/>
-          </p:cNvSpPr>
-          <p:nvPr>
-            <p:ph type="title"/>
-          </p:nvPr>
-        </p:nvSpPr>
-        <p:spPr>
-          <a:xfrm>
             <a:off x="838200" y="2602242"/>
             <a:ext cx="10515600" cy="1325563"/>
           </a:xfrm>
@@ -8346,7 +7899,7 @@
 </p:sld>
 </file>
 
-<file path=ppt/slides/slide24.xml><?xml version="1.0" encoding="utf-8"?>
+<file path=ppt/slides/slide21.xml><?xml version="1.0" encoding="utf-8"?>
 <p:sld xmlns:a="http://schemas.openxmlformats.org/drawingml/2006/main" xmlns:r="http://schemas.openxmlformats.org/officeDocument/2006/relationships" xmlns:p="http://schemas.openxmlformats.org/presentationml/2006/main">
   <p:cSld>
     <p:spTree>
@@ -8417,7 +7970,7 @@
 </p:sld>
 </file>
 
-<file path=ppt/slides/slide25.xml><?xml version="1.0" encoding="utf-8"?>
+<file path=ppt/slides/slide22.xml><?xml version="1.0" encoding="utf-8"?>
 <p:sld xmlns:a="http://schemas.openxmlformats.org/drawingml/2006/main" xmlns:r="http://schemas.openxmlformats.org/officeDocument/2006/relationships" xmlns:p="http://schemas.openxmlformats.org/presentationml/2006/main">
   <p:cSld>
     <p:spTree>
@@ -8488,7 +8041,7 @@
 </p:sld>
 </file>
 
-<file path=ppt/slides/slide26.xml><?xml version="1.0" encoding="utf-8"?>
+<file path=ppt/slides/slide23.xml><?xml version="1.0" encoding="utf-8"?>
 <p:sld xmlns:a="http://schemas.openxmlformats.org/drawingml/2006/main" xmlns:r="http://schemas.openxmlformats.org/officeDocument/2006/relationships" xmlns:p="http://schemas.openxmlformats.org/presentationml/2006/main">
   <p:cSld>
     <p:spTree>
@@ -8780,7 +8333,176 @@
 </p:sld>
 </file>
 
-<file path=ppt/slides/slide27.xml><?xml version="1.0" encoding="utf-8"?>
+<file path=ppt/slides/slide24.xml><?xml version="1.0" encoding="utf-8"?>
+<p:sld xmlns:a="http://schemas.openxmlformats.org/drawingml/2006/main" xmlns:r="http://schemas.openxmlformats.org/officeDocument/2006/relationships" xmlns:p="http://schemas.openxmlformats.org/presentationml/2006/main">
+  <p:cSld>
+    <p:spTree>
+      <p:nvGrpSpPr>
+        <p:cNvPr id="1" name=""/>
+        <p:cNvGrpSpPr/>
+        <p:nvPr/>
+      </p:nvGrpSpPr>
+      <p:grpSpPr>
+        <a:xfrm>
+          <a:off x="0" y="0"/>
+          <a:ext cx="0" cy="0"/>
+          <a:chOff x="0" y="0"/>
+          <a:chExt cx="0" cy="0"/>
+        </a:xfrm>
+      </p:grpSpPr>
+      <p:sp>
+        <p:nvSpPr>
+          <p:cNvPr id="3" name="Content Placeholder 2"/>
+          <p:cNvSpPr>
+            <a:spLocks noGrp="1"/>
+          </p:cNvSpPr>
+          <p:nvPr>
+            <p:ph idx="1"/>
+          </p:nvPr>
+        </p:nvSpPr>
+        <p:spPr>
+          <a:xfrm>
+            <a:off x="4797267" y="1551008"/>
+            <a:ext cx="6521245" cy="4490962"/>
+          </a:xfrm>
+        </p:spPr>
+        <p:txBody>
+          <a:bodyPr>
+            <a:normAutofit/>
+          </a:bodyPr>
+          <a:lstStyle/>
+          <a:p>
+            <a:pPr marL="0" indent="0">
+              <a:buNone/>
+            </a:pPr>
+            <a:r>
+              <a:rPr lang="en-US" sz="3200" dirty="0" err="1"/>
+              <a:t>dplyr</a:t>
+            </a:r>
+            <a:endParaRPr lang="en-US" sz="3200" dirty="0"/>
+          </a:p>
+          <a:p>
+            <a:pPr marL="0" indent="0">
+              <a:buNone/>
+            </a:pPr>
+            <a:r>
+              <a:rPr lang="en-US" sz="3200" dirty="0"/>
+              <a:t>ggplot2</a:t>
+            </a:r>
+          </a:p>
+          <a:p>
+            <a:pPr marL="0" indent="0">
+              <a:buNone/>
+            </a:pPr>
+            <a:r>
+              <a:rPr lang="en-US" sz="3200" dirty="0" err="1"/>
+              <a:t>xlsx</a:t>
+            </a:r>
+            <a:endParaRPr lang="en-US" sz="3200" dirty="0"/>
+          </a:p>
+          <a:p>
+            <a:pPr marL="0" indent="0">
+              <a:buNone/>
+            </a:pPr>
+            <a:r>
+              <a:rPr lang="en-US" sz="3200" dirty="0" err="1"/>
+              <a:t>quantmod</a:t>
+            </a:r>
+            <a:endParaRPr lang="en-US" sz="3200" dirty="0"/>
+          </a:p>
+          <a:p>
+            <a:pPr marL="0" indent="0">
+              <a:buNone/>
+            </a:pPr>
+            <a:r>
+              <a:rPr lang="en-US" sz="3200" dirty="0"/>
+              <a:t>Shiny</a:t>
+            </a:r>
+          </a:p>
+        </p:txBody>
+      </p:sp>
+      <p:pic>
+        <p:nvPicPr>
+          <p:cNvPr id="6146" name="Picture 2" descr="But wait There's more - But wait There's more  Billy Mays"/>
+          <p:cNvPicPr>
+            <a:picLocks noChangeAspect="1" noChangeArrowheads="1"/>
+          </p:cNvPicPr>
+          <p:nvPr/>
+        </p:nvPicPr>
+        <p:blipFill>
+          <a:blip r:embed="rId3">
+            <a:extLst>
+              <a:ext uri="{28A0092B-C50C-407E-A947-70E740481C1C}">
+                <a14:useLocalDpi xmlns:a14="http://schemas.microsoft.com/office/drawing/2010/main" val="0"/>
+              </a:ext>
+            </a:extLst>
+          </a:blip>
+          <a:srcRect/>
+          <a:stretch>
+            <a:fillRect/>
+          </a:stretch>
+        </p:blipFill>
+        <p:spPr bwMode="auto">
+          <a:xfrm>
+            <a:off x="256263" y="602016"/>
+            <a:ext cx="4284739" cy="5495178"/>
+          </a:xfrm>
+          <a:prstGeom prst="rect">
+            <a:avLst/>
+          </a:prstGeom>
+          <a:noFill/>
+          <a:extLst>
+            <a:ext uri="{909E8E84-426E-40DD-AFC4-6F175D3DCCD1}">
+              <a14:hiddenFill xmlns:a14="http://schemas.microsoft.com/office/drawing/2010/main">
+                <a:solidFill>
+                  <a:srgbClr val="FFFFFF"/>
+                </a:solidFill>
+              </a14:hiddenFill>
+            </a:ext>
+          </a:extLst>
+        </p:spPr>
+      </p:pic>
+      <p:sp>
+        <p:nvSpPr>
+          <p:cNvPr id="4" name="Title 1"/>
+          <p:cNvSpPr>
+            <a:spLocks noGrp="1"/>
+          </p:cNvSpPr>
+          <p:nvPr>
+            <p:ph type="title"/>
+          </p:nvPr>
+        </p:nvSpPr>
+        <p:spPr>
+          <a:xfrm>
+            <a:off x="4797266" y="602016"/>
+            <a:ext cx="6556533" cy="786946"/>
+          </a:xfrm>
+        </p:spPr>
+        <p:txBody>
+          <a:bodyPr/>
+          <a:lstStyle/>
+          <a:p>
+            <a:r>
+              <a:rPr lang="en-US" dirty="0"/>
+              <a:t>Common Packages</a:t>
+            </a:r>
+          </a:p>
+        </p:txBody>
+      </p:sp>
+    </p:spTree>
+    <p:extLst>
+      <p:ext uri="{BB962C8B-B14F-4D97-AF65-F5344CB8AC3E}">
+        <p14:creationId xmlns:p14="http://schemas.microsoft.com/office/powerpoint/2010/main" val="2204730907"/>
+      </p:ext>
+    </p:extLst>
+  </p:cSld>
+  <p:clrMapOvr>
+    <a:masterClrMapping/>
+  </p:clrMapOvr>
+</p:sld>
+</file>
+
+<file path=ppt/slides/slide25.xml><?xml version="1.0" encoding="utf-8"?>
 <p:sld xmlns:a="http://schemas.openxmlformats.org/drawingml/2006/main" xmlns:r="http://schemas.openxmlformats.org/officeDocument/2006/relationships" xmlns:p="http://schemas.openxmlformats.org/presentationml/2006/main">
   <p:cSld>
     <p:spTree>
@@ -9154,77 +8876,6 @@
       </p:grpSpPr>
       <p:sp>
         <p:nvSpPr>
-          <p:cNvPr id="3" name="Content Placeholder 2"/>
-          <p:cNvSpPr>
-            <a:spLocks noGrp="1"/>
-          </p:cNvSpPr>
-          <p:nvPr>
-            <p:ph idx="1"/>
-          </p:nvPr>
-        </p:nvSpPr>
-        <p:spPr>
-          <a:xfrm>
-            <a:off x="611606" y="2561139"/>
-            <a:ext cx="10968789" cy="1735722"/>
-          </a:xfrm>
-        </p:spPr>
-        <p:txBody>
-          <a:bodyPr>
-            <a:normAutofit fontScale="92500" lnSpcReduction="20000"/>
-          </a:bodyPr>
-          <a:lstStyle/>
-          <a:p>
-            <a:pPr marL="0" indent="0">
-              <a:buNone/>
-            </a:pPr>
-            <a:r>
-              <a:rPr lang="en-US" sz="4800" dirty="0"/>
-              <a:t>“Data is a precious thing and will last longer than the systems themselves.”</a:t>
-            </a:r>
-          </a:p>
-          <a:p>
-            <a:pPr marL="0" indent="0">
-              <a:buNone/>
-            </a:pPr>
-            <a:r>
-              <a:rPr lang="en-US" sz="4800" dirty="0"/>
-              <a:t>- Tim Berners-Lee</a:t>
-            </a:r>
-          </a:p>
-        </p:txBody>
-      </p:sp>
-    </p:spTree>
-    <p:extLst>
-      <p:ext uri="{BB962C8B-B14F-4D97-AF65-F5344CB8AC3E}">
-        <p14:creationId xmlns:p14="http://schemas.microsoft.com/office/powerpoint/2010/main" val="2548078346"/>
-      </p:ext>
-    </p:extLst>
-  </p:cSld>
-  <p:clrMapOvr>
-    <a:masterClrMapping/>
-  </p:clrMapOvr>
-</p:sld>
-</file>
-
-<file path=ppt/slides/slide7.xml><?xml version="1.0" encoding="utf-8"?>
-<p:sld xmlns:a="http://schemas.openxmlformats.org/drawingml/2006/main" xmlns:r="http://schemas.openxmlformats.org/officeDocument/2006/relationships" xmlns:p="http://schemas.openxmlformats.org/presentationml/2006/main">
-  <p:cSld>
-    <p:spTree>
-      <p:nvGrpSpPr>
-        <p:cNvPr id="1" name=""/>
-        <p:cNvGrpSpPr/>
-        <p:nvPr/>
-      </p:nvGrpSpPr>
-      <p:grpSpPr>
-        <a:xfrm>
-          <a:off x="0" y="0"/>
-          <a:ext cx="0" cy="0"/>
-          <a:chOff x="0" y="0"/>
-          <a:chExt cx="0" cy="0"/>
-        </a:xfrm>
-      </p:grpSpPr>
-      <p:sp>
-        <p:nvSpPr>
           <p:cNvPr id="2" name="Title 1"/>
           <p:cNvSpPr>
             <a:spLocks noGrp="1"/>
@@ -9305,7 +8956,7 @@
 </p:sld>
 </file>
 
-<file path=ppt/slides/slide8.xml><?xml version="1.0" encoding="utf-8"?>
+<file path=ppt/slides/slide7.xml><?xml version="1.0" encoding="utf-8"?>
 <p:sld xmlns:a="http://schemas.openxmlformats.org/drawingml/2006/main" xmlns:r="http://schemas.openxmlformats.org/officeDocument/2006/relationships" xmlns:p="http://schemas.openxmlformats.org/presentationml/2006/main">
   <p:cSld>
     <p:spTree>
@@ -9417,6 +9068,118 @@
 </p:sld>
 </file>
 
+<file path=ppt/slides/slide8.xml><?xml version="1.0" encoding="utf-8"?>
+<p:sld xmlns:a="http://schemas.openxmlformats.org/drawingml/2006/main" xmlns:r="http://schemas.openxmlformats.org/officeDocument/2006/relationships" xmlns:p="http://schemas.openxmlformats.org/presentationml/2006/main">
+  <p:cSld>
+    <p:spTree>
+      <p:nvGrpSpPr>
+        <p:cNvPr id="1" name=""/>
+        <p:cNvGrpSpPr/>
+        <p:nvPr/>
+      </p:nvGrpSpPr>
+      <p:grpSpPr>
+        <a:xfrm>
+          <a:off x="0" y="0"/>
+          <a:ext cx="0" cy="0"/>
+          <a:chOff x="0" y="0"/>
+          <a:chExt cx="0" cy="0"/>
+        </a:xfrm>
+      </p:grpSpPr>
+      <p:pic>
+        <p:nvPicPr>
+          <p:cNvPr id="4098" name="Picture 2" descr="Image result for hans rosling"/>
+          <p:cNvPicPr>
+            <a:picLocks noChangeAspect="1" noChangeArrowheads="1"/>
+          </p:cNvPicPr>
+          <p:nvPr/>
+        </p:nvPicPr>
+        <p:blipFill>
+          <a:blip r:embed="rId3">
+            <a:extLst>
+              <a:ext uri="{28A0092B-C50C-407E-A947-70E740481C1C}">
+                <a14:useLocalDpi xmlns:a14="http://schemas.microsoft.com/office/drawing/2010/main" val="0"/>
+              </a:ext>
+            </a:extLst>
+          </a:blip>
+          <a:srcRect/>
+          <a:stretch>
+            <a:fillRect/>
+          </a:stretch>
+        </p:blipFill>
+        <p:spPr bwMode="auto">
+          <a:xfrm>
+            <a:off x="613721" y="1447802"/>
+            <a:ext cx="5696464" cy="4272348"/>
+          </a:xfrm>
+          <a:prstGeom prst="rect">
+            <a:avLst/>
+          </a:prstGeom>
+          <a:noFill/>
+          <a:extLst>
+            <a:ext uri="{909E8E84-426E-40DD-AFC4-6F175D3DCCD1}">
+              <a14:hiddenFill xmlns:a14="http://schemas.microsoft.com/office/drawing/2010/main">
+                <a:solidFill>
+                  <a:srgbClr val="FFFFFF"/>
+                </a:solidFill>
+              </a14:hiddenFill>
+            </a:ext>
+          </a:extLst>
+        </p:spPr>
+      </p:pic>
+      <p:pic>
+        <p:nvPicPr>
+          <p:cNvPr id="4100" name="Picture 4" descr="Image result for how to lie with statistics"/>
+          <p:cNvPicPr>
+            <a:picLocks noChangeAspect="1" noChangeArrowheads="1"/>
+          </p:cNvPicPr>
+          <p:nvPr/>
+        </p:nvPicPr>
+        <p:blipFill>
+          <a:blip r:embed="rId4">
+            <a:extLst>
+              <a:ext uri="{28A0092B-C50C-407E-A947-70E740481C1C}">
+                <a14:useLocalDpi xmlns:a14="http://schemas.microsoft.com/office/drawing/2010/main" val="0"/>
+              </a:ext>
+            </a:extLst>
+          </a:blip>
+          <a:srcRect/>
+          <a:stretch>
+            <a:fillRect/>
+          </a:stretch>
+        </p:blipFill>
+        <p:spPr bwMode="auto">
+          <a:xfrm>
+            <a:off x="7092779" y="1447802"/>
+            <a:ext cx="4261020" cy="4261020"/>
+          </a:xfrm>
+          <a:prstGeom prst="rect">
+            <a:avLst/>
+          </a:prstGeom>
+          <a:noFill/>
+          <a:extLst>
+            <a:ext uri="{909E8E84-426E-40DD-AFC4-6F175D3DCCD1}">
+              <a14:hiddenFill xmlns:a14="http://schemas.microsoft.com/office/drawing/2010/main">
+                <a:solidFill>
+                  <a:srgbClr val="FFFFFF"/>
+                </a:solidFill>
+              </a14:hiddenFill>
+            </a:ext>
+          </a:extLst>
+        </p:spPr>
+      </p:pic>
+    </p:spTree>
+    <p:extLst>
+      <p:ext uri="{BB962C8B-B14F-4D97-AF65-F5344CB8AC3E}">
+        <p14:creationId xmlns:p14="http://schemas.microsoft.com/office/powerpoint/2010/main" val="412592758"/>
+      </p:ext>
+    </p:extLst>
+  </p:cSld>
+  <p:clrMapOvr>
+    <a:masterClrMapping/>
+  </p:clrMapOvr>
+</p:sld>
+</file>
+
 <file path=ppt/slides/slide9.xml><?xml version="1.0" encoding="utf-8"?>
 <p:sld xmlns:a="http://schemas.openxmlformats.org/drawingml/2006/main" xmlns:r="http://schemas.openxmlformats.org/officeDocument/2006/relationships" xmlns:p="http://schemas.openxmlformats.org/presentationml/2006/main">
   <p:cSld>
@@ -9434,56 +9197,51 @@
           <a:chExt cx="0" cy="0"/>
         </a:xfrm>
       </p:grpSpPr>
-      <p:sp>
-        <p:nvSpPr>
-          <p:cNvPr id="3" name="Content Placeholder 2"/>
-          <p:cNvSpPr>
-            <a:spLocks noGrp="1"/>
-          </p:cNvSpPr>
-          <p:nvPr>
-            <p:ph idx="1"/>
-          </p:nvPr>
-        </p:nvSpPr>
-        <p:spPr>
+      <p:pic>
+        <p:nvPicPr>
+          <p:cNvPr id="1026" name="Picture 2" descr="Data Scientist Salary Negotiation"/>
+          <p:cNvPicPr>
+            <a:picLocks noChangeAspect="1" noChangeArrowheads="1"/>
+          </p:cNvPicPr>
+          <p:nvPr/>
+        </p:nvPicPr>
+        <p:blipFill>
+          <a:blip r:embed="rId3">
+            <a:extLst>
+              <a:ext uri="{28A0092B-C50C-407E-A947-70E740481C1C}">
+                <a14:useLocalDpi xmlns:a14="http://schemas.microsoft.com/office/drawing/2010/main" val="0"/>
+              </a:ext>
+            </a:extLst>
+          </a:blip>
+          <a:srcRect/>
+          <a:stretch>
+            <a:fillRect/>
+          </a:stretch>
+        </p:blipFill>
+        <p:spPr bwMode="auto">
           <a:xfrm>
-            <a:off x="611606" y="2561139"/>
-            <a:ext cx="10968789" cy="1735722"/>
+            <a:off x="2815771" y="148771"/>
+            <a:ext cx="6462486" cy="6462486"/>
           </a:xfrm>
+          <a:prstGeom prst="rect">
+            <a:avLst/>
+          </a:prstGeom>
+          <a:noFill/>
+          <a:extLst>
+            <a:ext uri="{909E8E84-426E-40DD-AFC4-6F175D3DCCD1}">
+              <a14:hiddenFill xmlns:a14="http://schemas.microsoft.com/office/drawing/2010/main">
+                <a:solidFill>
+                  <a:srgbClr val="FFFFFF"/>
+                </a:solidFill>
+              </a14:hiddenFill>
+            </a:ext>
+          </a:extLst>
         </p:spPr>
-        <p:txBody>
-          <a:bodyPr>
-            <a:normAutofit/>
-          </a:bodyPr>
-          <a:lstStyle/>
-          <a:p>
-            <a:pPr marL="0" indent="0">
-              <a:buNone/>
-            </a:pPr>
-            <a:r>
-              <a:rPr lang="en-US" sz="4800" dirty="0"/>
-              <a:t>“Let the dataset change your mindset.”</a:t>
-            </a:r>
-          </a:p>
-          <a:p>
-            <a:pPr marL="0" indent="0">
-              <a:buNone/>
-            </a:pPr>
-            <a:r>
-              <a:rPr lang="en-US" sz="4800" dirty="0"/>
-              <a:t>- Hans </a:t>
-            </a:r>
-            <a:r>
-              <a:rPr lang="en-US" sz="4800" dirty="0" err="1"/>
-              <a:t>Rosling</a:t>
-            </a:r>
-            <a:endParaRPr lang="en-US" sz="4800" dirty="0"/>
-          </a:p>
-        </p:txBody>
-      </p:sp>
+      </p:pic>
     </p:spTree>
     <p:extLst>
       <p:ext uri="{BB962C8B-B14F-4D97-AF65-F5344CB8AC3E}">
-        <p14:creationId xmlns:p14="http://schemas.microsoft.com/office/powerpoint/2010/main" val="2504119030"/>
+        <p14:creationId xmlns:p14="http://schemas.microsoft.com/office/powerpoint/2010/main" val="3748025329"/>
       </p:ext>
     </p:extLst>
   </p:cSld>

</xml_diff>

<commit_message>
Slide updates. Updates to the visualization portion
</commit_message>
<xml_diff>
--- a/slides/r_slides.pptx
+++ b/slides/r_slides.pptx
@@ -5,7 +5,7 @@
     <p:sldMasterId id="2147483648" r:id="rId1"/>
   </p:sldMasterIdLst>
   <p:notesMasterIdLst>
-    <p:notesMasterId r:id="rId28"/>
+    <p:notesMasterId r:id="rId29"/>
   </p:notesMasterIdLst>
   <p:sldIdLst>
     <p:sldId id="256" r:id="rId2"/>
@@ -20,20 +20,21 @@
     <p:sldId id="319" r:id="rId11"/>
     <p:sldId id="334" r:id="rId12"/>
     <p:sldId id="340" r:id="rId13"/>
-    <p:sldId id="326" r:id="rId14"/>
-    <p:sldId id="321" r:id="rId15"/>
-    <p:sldId id="324" r:id="rId16"/>
-    <p:sldId id="325" r:id="rId17"/>
-    <p:sldId id="323" r:id="rId18"/>
-    <p:sldId id="332" r:id="rId19"/>
-    <p:sldId id="330" r:id="rId20"/>
-    <p:sldId id="331" r:id="rId21"/>
-    <p:sldId id="280" r:id="rId22"/>
-    <p:sldId id="337" r:id="rId23"/>
-    <p:sldId id="336" r:id="rId24"/>
-    <p:sldId id="335" r:id="rId25"/>
-    <p:sldId id="298" r:id="rId26"/>
-    <p:sldId id="281" r:id="rId27"/>
+    <p:sldId id="341" r:id="rId14"/>
+    <p:sldId id="326" r:id="rId15"/>
+    <p:sldId id="321" r:id="rId16"/>
+    <p:sldId id="324" r:id="rId17"/>
+    <p:sldId id="325" r:id="rId18"/>
+    <p:sldId id="323" r:id="rId19"/>
+    <p:sldId id="332" r:id="rId20"/>
+    <p:sldId id="330" r:id="rId21"/>
+    <p:sldId id="331" r:id="rId22"/>
+    <p:sldId id="280" r:id="rId23"/>
+    <p:sldId id="337" r:id="rId24"/>
+    <p:sldId id="336" r:id="rId25"/>
+    <p:sldId id="335" r:id="rId26"/>
+    <p:sldId id="298" r:id="rId27"/>
+    <p:sldId id="281" r:id="rId28"/>
   </p:sldIdLst>
   <p:sldSz cx="12192000" cy="6858000"/>
   <p:notesSz cx="6858000" cy="9144000"/>
@@ -226,7 +227,7 @@
           <a:p>
             <a:fld id="{2EF9E3F5-87A8-46BA-A07D-41DEE1AB9BCE}" type="datetimeFigureOut">
               <a:rPr lang="en-US" smtClean="0"/>
-              <a:t>6/15/2017</a:t>
+              <a:t>6/22/2017</a:t>
             </a:fld>
             <a:endParaRPr lang="en-US"/>
           </a:p>
@@ -848,13 +849,7 @@
           <a:p>
             <a:r>
               <a:rPr lang="en-US" dirty="0"/>
-              <a:t>Free as in speech and beer. </a:t>
-            </a:r>
-          </a:p>
-          <a:p>
-            <a:r>
-              <a:rPr lang="en-US" dirty="0"/>
-              <a:t>Unlike some commercial packages that cost tons of cash. </a:t>
+              <a:t>I’m going to be honest, I don’t know much about other stats tools, but someone sent me this. </a:t>
             </a:r>
           </a:p>
           <a:p>
@@ -862,15 +857,6 @@
           </a:p>
           <a:p>
             <a:endParaRPr lang="en-US" dirty="0"/>
-          </a:p>
-          <a:p>
-            <a:endParaRPr lang="en-US" dirty="0"/>
-          </a:p>
-          <a:p>
-            <a:r>
-              <a:rPr lang="en-US" dirty="0"/>
-              <a:t>http://www.metmuseum.org/art/collection/search/380487</a:t>
-            </a:r>
           </a:p>
         </p:txBody>
       </p:sp>
@@ -891,7 +877,7 @@
           <a:p>
             <a:fld id="{E5A097B1-DDF2-47DB-BEB4-A56B76E0BD07}" type="slidenum">
               <a:rPr lang="en-US" smtClean="0"/>
-              <a:t>14</a:t>
+              <a:t>13</a:t>
             </a:fld>
             <a:endParaRPr lang="en-US"/>
           </a:p>
@@ -900,7 +886,7 @@
     </p:spTree>
     <p:extLst>
       <p:ext uri="{BB962C8B-B14F-4D97-AF65-F5344CB8AC3E}">
-        <p14:creationId xmlns:p14="http://schemas.microsoft.com/office/powerpoint/2010/main" val="410457494"/>
+        <p14:creationId xmlns:p14="http://schemas.microsoft.com/office/powerpoint/2010/main" val="3593964094"/>
       </p:ext>
     </p:extLst>
   </p:cSld>
@@ -956,25 +942,28 @@
           <a:p>
             <a:r>
               <a:rPr lang="en-US" dirty="0"/>
-              <a:t>Made by statisticians, for statisticians. </a:t>
+              <a:t>Free as in speech and beer. </a:t>
+            </a:r>
+          </a:p>
+          <a:p>
+            <a:r>
+              <a:rPr lang="en-US" dirty="0"/>
+              <a:t>Unlike some commercial packages that cost tons of cash. </a:t>
             </a:r>
           </a:p>
           <a:p>
             <a:endParaRPr lang="en-US" dirty="0"/>
           </a:p>
           <a:p>
-            <a:r>
-              <a:rPr lang="en-US" dirty="0"/>
-              <a:t>If there’s a statistical thing you want to do, there’s probably a package for that already. </a:t>
-            </a:r>
-          </a:p>
-          <a:p>
             <a:endParaRPr lang="en-US" dirty="0"/>
           </a:p>
           <a:p>
-            <a:r>
-              <a:rPr lang="en-US" dirty="0"/>
-              <a:t>It smooths out any rough edges in the data exploration process. </a:t>
+            <a:endParaRPr lang="en-US" dirty="0"/>
+          </a:p>
+          <a:p>
+            <a:r>
+              <a:rPr lang="en-US" dirty="0"/>
+              <a:t>http://www.metmuseum.org/art/collection/search/380487</a:t>
             </a:r>
           </a:p>
         </p:txBody>
@@ -1005,7 +994,7 @@
     </p:spTree>
     <p:extLst>
       <p:ext uri="{BB962C8B-B14F-4D97-AF65-F5344CB8AC3E}">
-        <p14:creationId xmlns:p14="http://schemas.microsoft.com/office/powerpoint/2010/main" val="1093990607"/>
+        <p14:creationId xmlns:p14="http://schemas.microsoft.com/office/powerpoint/2010/main" val="410457494"/>
       </p:ext>
     </p:extLst>
   </p:cSld>
@@ -1061,34 +1050,16 @@
           <a:p>
             <a:r>
               <a:rPr lang="en-US" dirty="0"/>
-              <a:t>Visual Studio or </a:t>
-            </a:r>
-            <a:r>
-              <a:rPr lang="en-US" dirty="0" err="1"/>
-              <a:t>rStudio</a:t>
-            </a:r>
+              <a:t>Made by statisticians, for statisticians. </a:t>
+            </a:r>
+          </a:p>
+          <a:p>
             <a:endParaRPr lang="en-US" dirty="0"/>
           </a:p>
           <a:p>
             <a:r>
               <a:rPr lang="en-US" dirty="0"/>
-              <a:t>SQL Server</a:t>
-            </a:r>
-          </a:p>
-          <a:p>
-            <a:r>
-              <a:rPr lang="en-US" dirty="0" err="1"/>
-              <a:t>Jupyter</a:t>
-            </a:r>
-            <a:r>
-              <a:rPr lang="en-US" dirty="0"/>
-              <a:t> Notebooks</a:t>
-            </a:r>
-          </a:p>
-          <a:p>
-            <a:r>
-              <a:rPr lang="en-US" dirty="0"/>
-              <a:t>Zeppelin Notebooks</a:t>
+              <a:t>If there’s a statistical thing you want to do, there’s probably a package for that already. </a:t>
             </a:r>
           </a:p>
           <a:p>
@@ -1097,11 +1068,8 @@
           <a:p>
             <a:r>
               <a:rPr lang="en-US" dirty="0"/>
-              <a:t>Low Ceremony</a:t>
-            </a:r>
-          </a:p>
-          <a:p>
-            <a:endParaRPr lang="en-US" dirty="0"/>
+              <a:t>It smooths out any rough edges in the data exploration process. </a:t>
+            </a:r>
           </a:p>
         </p:txBody>
       </p:sp>
@@ -1131,7 +1099,7 @@
     </p:spTree>
     <p:extLst>
       <p:ext uri="{BB962C8B-B14F-4D97-AF65-F5344CB8AC3E}">
-        <p14:creationId xmlns:p14="http://schemas.microsoft.com/office/powerpoint/2010/main" val="2458084230"/>
+        <p14:creationId xmlns:p14="http://schemas.microsoft.com/office/powerpoint/2010/main" val="1093990607"/>
       </p:ext>
     </p:extLst>
   </p:cSld>
@@ -1187,11 +1155,44 @@
           <a:p>
             <a:r>
               <a:rPr lang="en-US" dirty="0"/>
-              <a:t>R really shines at ripping through datasets and building models. </a:t>
-            </a:r>
-          </a:p>
-          <a:p>
+              <a:t>Visual Studio or </a:t>
+            </a:r>
+            <a:r>
+              <a:rPr lang="en-US" dirty="0" err="1"/>
+              <a:t>rStudio</a:t>
+            </a:r>
             <a:endParaRPr lang="en-US" dirty="0"/>
+          </a:p>
+          <a:p>
+            <a:r>
+              <a:rPr lang="en-US" dirty="0"/>
+              <a:t>SQL Server</a:t>
+            </a:r>
+          </a:p>
+          <a:p>
+            <a:r>
+              <a:rPr lang="en-US" dirty="0" err="1"/>
+              <a:t>Jupyter</a:t>
+            </a:r>
+            <a:r>
+              <a:rPr lang="en-US" dirty="0"/>
+              <a:t> Notebooks</a:t>
+            </a:r>
+          </a:p>
+          <a:p>
+            <a:r>
+              <a:rPr lang="en-US" dirty="0"/>
+              <a:t>Zeppelin Notebooks</a:t>
+            </a:r>
+          </a:p>
+          <a:p>
+            <a:endParaRPr lang="en-US" dirty="0"/>
+          </a:p>
+          <a:p>
+            <a:r>
+              <a:rPr lang="en-US" dirty="0"/>
+              <a:t>Low Ceremony</a:t>
+            </a:r>
           </a:p>
           <a:p>
             <a:endParaRPr lang="en-US" dirty="0"/>
@@ -1224,7 +1225,7 @@
     </p:spTree>
     <p:extLst>
       <p:ext uri="{BB962C8B-B14F-4D97-AF65-F5344CB8AC3E}">
-        <p14:creationId xmlns:p14="http://schemas.microsoft.com/office/powerpoint/2010/main" val="3500013465"/>
+        <p14:creationId xmlns:p14="http://schemas.microsoft.com/office/powerpoint/2010/main" val="2458084230"/>
       </p:ext>
     </p:extLst>
   </p:cSld>
@@ -1280,35 +1281,11 @@
           <a:p>
             <a:r>
               <a:rPr lang="en-US" dirty="0"/>
-              <a:t>R is not a general purpose language. </a:t>
+              <a:t>R really shines at ripping through datasets and building models. </a:t>
             </a:r>
           </a:p>
           <a:p>
             <a:endParaRPr lang="en-US" dirty="0"/>
-          </a:p>
-          <a:p>
-            <a:r>
-              <a:rPr lang="en-US" dirty="0"/>
-              <a:t>It shouldn’t be used in situations with no data analysis</a:t>
-            </a:r>
-          </a:p>
-          <a:p>
-            <a:endParaRPr lang="en-US" dirty="0"/>
-          </a:p>
-          <a:p>
-            <a:r>
-              <a:rPr lang="en-US" dirty="0"/>
-              <a:t>While it can build web apps, you aren’t going to build the next Google or Facebook in R</a:t>
-            </a:r>
-          </a:p>
-          <a:p>
-            <a:endParaRPr lang="en-US" dirty="0"/>
-          </a:p>
-          <a:p>
-            <a:r>
-              <a:rPr lang="en-US" dirty="0"/>
-              <a:t>Some people also claim that R isn’t great at big data, but R can plug into lots of big data tools. </a:t>
-            </a:r>
           </a:p>
           <a:p>
             <a:endParaRPr lang="en-US" dirty="0"/>
@@ -1341,7 +1318,7 @@
     </p:spTree>
     <p:extLst>
       <p:ext uri="{BB962C8B-B14F-4D97-AF65-F5344CB8AC3E}">
-        <p14:creationId xmlns:p14="http://schemas.microsoft.com/office/powerpoint/2010/main" val="1328570390"/>
+        <p14:creationId xmlns:p14="http://schemas.microsoft.com/office/powerpoint/2010/main" val="3500013465"/>
       </p:ext>
     </p:extLst>
   </p:cSld>
@@ -1397,7 +1374,7 @@
           <a:p>
             <a:r>
               <a:rPr lang="en-US" dirty="0"/>
-              <a:t>Dynamically typed</a:t>
+              <a:t>R is not a general purpose language. </a:t>
             </a:r>
           </a:p>
           <a:p>
@@ -1406,7 +1383,7 @@
           <a:p>
             <a:r>
               <a:rPr lang="en-US" dirty="0"/>
-              <a:t>Interpreted – often run interactively</a:t>
+              <a:t>It shouldn’t be used in situations with no data analysis</a:t>
             </a:r>
           </a:p>
           <a:p>
@@ -1415,7 +1392,7 @@
           <a:p>
             <a:r>
               <a:rPr lang="en-US" dirty="0"/>
-              <a:t>Multi paradigm, mostly functional</a:t>
+              <a:t>While it can build web apps, you aren’t going to build the next Google or Facebook in R</a:t>
             </a:r>
           </a:p>
           <a:p>
@@ -1424,20 +1401,8 @@
           <a:p>
             <a:r>
               <a:rPr lang="en-US" dirty="0"/>
-              <a:t>The primary R – IDE is R Studio, though Visual Studio has decent R support. </a:t>
-            </a:r>
-          </a:p>
-          <a:p>
-            <a:endParaRPr lang="en-US" dirty="0"/>
-          </a:p>
-          <a:p>
-            <a:r>
-              <a:rPr lang="en-US" dirty="0"/>
-              <a:t>-- Fire up some demos</a:t>
-            </a:r>
-          </a:p>
-          <a:p>
-            <a:endParaRPr lang="en-US" dirty="0"/>
+              <a:t>Some people also claim that R isn’t great at big data, but R can plug into lots of big data tools. </a:t>
+            </a:r>
           </a:p>
           <a:p>
             <a:endParaRPr lang="en-US" dirty="0"/>
@@ -1470,7 +1435,7 @@
     </p:spTree>
     <p:extLst>
       <p:ext uri="{BB962C8B-B14F-4D97-AF65-F5344CB8AC3E}">
-        <p14:creationId xmlns:p14="http://schemas.microsoft.com/office/powerpoint/2010/main" val="2774716566"/>
+        <p14:creationId xmlns:p14="http://schemas.microsoft.com/office/powerpoint/2010/main" val="1328570390"/>
       </p:ext>
     </p:extLst>
   </p:cSld>
@@ -1526,7 +1491,7 @@
           <a:p>
             <a:r>
               <a:rPr lang="en-US" dirty="0"/>
-              <a:t>CRAN Version – Standard R | R development core team (CRAN stands for Comprehensive R Archive Network)</a:t>
+              <a:t>Dynamically typed</a:t>
             </a:r>
           </a:p>
           <a:p>
@@ -1535,13 +1500,7 @@
           <a:p>
             <a:r>
               <a:rPr lang="en-US" dirty="0"/>
-              <a:t>Microsoft Version  - MRAN | “Enhanced R”</a:t>
-            </a:r>
-          </a:p>
-          <a:p>
-            <a:r>
-              <a:rPr lang="en-US" dirty="0"/>
-              <a:t>https://mran.microsoft.com/open/</a:t>
+              <a:t>Interpreted – often run interactively</a:t>
             </a:r>
           </a:p>
           <a:p>
@@ -1550,7 +1509,7 @@
           <a:p>
             <a:r>
               <a:rPr lang="en-US" dirty="0"/>
-              <a:t>Tradeoff -  Microsoft is faster, CRAN is newer. </a:t>
+              <a:t>Multi paradigm, mostly functional</a:t>
             </a:r>
           </a:p>
           <a:p>
@@ -1559,41 +1518,23 @@
           <a:p>
             <a:r>
               <a:rPr lang="en-US" dirty="0"/>
-              <a:t>Others: </a:t>
-            </a:r>
-          </a:p>
-          <a:p>
-            <a:r>
-              <a:rPr lang="en-US" dirty="0"/>
-              <a:t>TIBCO – commercial R, costs money</a:t>
+              <a:t>The primary R – IDE is R Studio, though Visual Studio has decent R support. </a:t>
             </a:r>
           </a:p>
           <a:p>
             <a:endParaRPr lang="en-US" dirty="0"/>
           </a:p>
           <a:p>
+            <a:r>
+              <a:rPr lang="en-US" dirty="0"/>
+              <a:t>-- Fire up some demos</a:t>
+            </a:r>
+          </a:p>
+          <a:p>
             <a:endParaRPr lang="en-US" dirty="0"/>
           </a:p>
           <a:p>
             <a:endParaRPr lang="en-US" dirty="0"/>
-          </a:p>
-          <a:p>
-            <a:endParaRPr lang="en-US" dirty="0"/>
-          </a:p>
-          <a:p>
-            <a:endParaRPr lang="en-US" dirty="0"/>
-          </a:p>
-          <a:p>
-            <a:r>
-              <a:rPr lang="en-US" dirty="0"/>
-              <a:t>Photo: </a:t>
-            </a:r>
-          </a:p>
-          <a:p>
-            <a:r>
-              <a:rPr lang="en-US" dirty="0"/>
-              <a:t>https://www.pexels.com/photo/red-green-and-white-ice-cream-scoops-on-brown-cone-200909/</a:t>
-            </a:r>
           </a:p>
         </p:txBody>
       </p:sp>
@@ -1623,7 +1564,7 @@
     </p:spTree>
     <p:extLst>
       <p:ext uri="{BB962C8B-B14F-4D97-AF65-F5344CB8AC3E}">
-        <p14:creationId xmlns:p14="http://schemas.microsoft.com/office/powerpoint/2010/main" val="1854108322"/>
+        <p14:creationId xmlns:p14="http://schemas.microsoft.com/office/powerpoint/2010/main" val="2774716566"/>
       </p:ext>
     </p:extLst>
   </p:cSld>
@@ -1677,7 +1618,76 @@
           <a:bodyPr/>
           <a:lstStyle/>
           <a:p>
+            <a:r>
+              <a:rPr lang="en-US" dirty="0"/>
+              <a:t>CRAN Version – Standard R | R development core team (CRAN stands for Comprehensive R Archive Network)</a:t>
+            </a:r>
+          </a:p>
+          <a:p>
             <a:endParaRPr lang="en-US" dirty="0"/>
+          </a:p>
+          <a:p>
+            <a:r>
+              <a:rPr lang="en-US" dirty="0"/>
+              <a:t>Microsoft Version  - MRAN | “Enhanced R”</a:t>
+            </a:r>
+          </a:p>
+          <a:p>
+            <a:r>
+              <a:rPr lang="en-US" dirty="0"/>
+              <a:t>https://mran.microsoft.com/open/</a:t>
+            </a:r>
+          </a:p>
+          <a:p>
+            <a:endParaRPr lang="en-US" dirty="0"/>
+          </a:p>
+          <a:p>
+            <a:r>
+              <a:rPr lang="en-US" dirty="0"/>
+              <a:t>Tradeoff -  Microsoft is faster, CRAN is newer. </a:t>
+            </a:r>
+          </a:p>
+          <a:p>
+            <a:endParaRPr lang="en-US" dirty="0"/>
+          </a:p>
+          <a:p>
+            <a:r>
+              <a:rPr lang="en-US" dirty="0"/>
+              <a:t>Others: </a:t>
+            </a:r>
+          </a:p>
+          <a:p>
+            <a:r>
+              <a:rPr lang="en-US" dirty="0"/>
+              <a:t>TIBCO – commercial R, costs money</a:t>
+            </a:r>
+          </a:p>
+          <a:p>
+            <a:endParaRPr lang="en-US" dirty="0"/>
+          </a:p>
+          <a:p>
+            <a:endParaRPr lang="en-US" dirty="0"/>
+          </a:p>
+          <a:p>
+            <a:endParaRPr lang="en-US" dirty="0"/>
+          </a:p>
+          <a:p>
+            <a:endParaRPr lang="en-US" dirty="0"/>
+          </a:p>
+          <a:p>
+            <a:endParaRPr lang="en-US" dirty="0"/>
+          </a:p>
+          <a:p>
+            <a:r>
+              <a:rPr lang="en-US" dirty="0"/>
+              <a:t>Photo: </a:t>
+            </a:r>
+          </a:p>
+          <a:p>
+            <a:r>
+              <a:rPr lang="en-US" dirty="0"/>
+              <a:t>https://www.pexels.com/photo/red-green-and-white-ice-cream-scoops-on-brown-cone-200909/</a:t>
+            </a:r>
           </a:p>
         </p:txBody>
       </p:sp>
@@ -1707,7 +1717,7 @@
     </p:spTree>
     <p:extLst>
       <p:ext uri="{BB962C8B-B14F-4D97-AF65-F5344CB8AC3E}">
-        <p14:creationId xmlns:p14="http://schemas.microsoft.com/office/powerpoint/2010/main" val="1525609868"/>
+        <p14:creationId xmlns:p14="http://schemas.microsoft.com/office/powerpoint/2010/main" val="1854108322"/>
       </p:ext>
     </p:extLst>
   </p:cSld>
@@ -1761,19 +1771,7 @@
           <a:bodyPr/>
           <a:lstStyle/>
           <a:p>
-            <a:r>
-              <a:rPr lang="en-US" dirty="0"/>
-              <a:t>Pre-stats demo</a:t>
-            </a:r>
-          </a:p>
-          <a:p>
             <a:endParaRPr lang="en-US" dirty="0"/>
-          </a:p>
-          <a:p>
-            <a:r>
-              <a:rPr lang="en-US" dirty="0"/>
-              <a:t>https://xkcd.com/1725/</a:t>
-            </a:r>
           </a:p>
         </p:txBody>
       </p:sp>
@@ -1803,7 +1801,7 @@
     </p:spTree>
     <p:extLst>
       <p:ext uri="{BB962C8B-B14F-4D97-AF65-F5344CB8AC3E}">
-        <p14:creationId xmlns:p14="http://schemas.microsoft.com/office/powerpoint/2010/main" val="2941644832"/>
+        <p14:creationId xmlns:p14="http://schemas.microsoft.com/office/powerpoint/2010/main" val="1525609868"/>
       </p:ext>
     </p:extLst>
   </p:cSld>
@@ -2021,7 +2019,7 @@
           <a:p>
             <a:r>
               <a:rPr lang="en-US" dirty="0"/>
-              <a:t>Pre machine learning demo 1</a:t>
+              <a:t>Pre-stats demo</a:t>
             </a:r>
           </a:p>
           <a:p>
@@ -2030,7 +2028,7 @@
           <a:p>
             <a:r>
               <a:rPr lang="en-US" dirty="0"/>
-              <a:t>https://xkcd.com/1838/</a:t>
+              <a:t>https://xkcd.com/1725/</a:t>
             </a:r>
           </a:p>
         </p:txBody>
@@ -2061,7 +2059,7 @@
     </p:spTree>
     <p:extLst>
       <p:ext uri="{BB962C8B-B14F-4D97-AF65-F5344CB8AC3E}">
-        <p14:creationId xmlns:p14="http://schemas.microsoft.com/office/powerpoint/2010/main" val="3658383172"/>
+        <p14:creationId xmlns:p14="http://schemas.microsoft.com/office/powerpoint/2010/main" val="2941644832"/>
       </p:ext>
     </p:extLst>
   </p:cSld>
@@ -2117,7 +2115,7 @@
           <a:p>
             <a:r>
               <a:rPr lang="en-US" dirty="0"/>
-              <a:t>Let’s talk about flowers… our dataset uses these three species of flowers. </a:t>
+              <a:t>Pre machine learning demo 1</a:t>
             </a:r>
           </a:p>
           <a:p>
@@ -2125,10 +2123,9 @@
           </a:p>
           <a:p>
             <a:r>
-              <a:rPr lang="en-US"/>
-              <a:t>Pre machine learning 2</a:t>
-            </a:r>
-            <a:endParaRPr lang="en-US" dirty="0"/>
+              <a:rPr lang="en-US" dirty="0"/>
+              <a:t>https://xkcd.com/1838/</a:t>
+            </a:r>
           </a:p>
         </p:txBody>
       </p:sp>
@@ -2158,7 +2155,7 @@
     </p:spTree>
     <p:extLst>
       <p:ext uri="{BB962C8B-B14F-4D97-AF65-F5344CB8AC3E}">
-        <p14:creationId xmlns:p14="http://schemas.microsoft.com/office/powerpoint/2010/main" val="2029081766"/>
+        <p14:creationId xmlns:p14="http://schemas.microsoft.com/office/powerpoint/2010/main" val="3658383172"/>
       </p:ext>
     </p:extLst>
   </p:cSld>
@@ -2212,122 +2209,19 @@
           <a:bodyPr/>
           <a:lstStyle/>
           <a:p>
+            <a:r>
+              <a:rPr lang="en-US" dirty="0"/>
+              <a:t>Let’s talk about flowers… our dataset uses these three species of flowers. </a:t>
+            </a:r>
+          </a:p>
+          <a:p>
             <a:endParaRPr lang="en-US" dirty="0"/>
           </a:p>
           <a:p>
             <a:r>
-              <a:rPr lang="en-US" dirty="0"/>
-              <a:t>Over 10k packages</a:t>
-            </a:r>
-          </a:p>
-          <a:p>
-            <a:r>
-              <a:rPr lang="en-US" dirty="0"/>
-              <a:t>https://cran.r-project.org/web/packages/</a:t>
-            </a:r>
-          </a:p>
-          <a:p>
-            <a:endParaRPr lang="en-US" dirty="0"/>
-          </a:p>
-          <a:p>
-            <a:endParaRPr lang="en-US" dirty="0"/>
-          </a:p>
-          <a:p>
-            <a:r>
-              <a:rPr lang="en-US" dirty="0"/>
-              <a:t>https://support.rstudio.com/hc/en-us/articles/201057987-Quick-list-of-useful-R-packages</a:t>
-            </a:r>
-          </a:p>
-          <a:p>
-            <a:endParaRPr lang="en-US" dirty="0"/>
-          </a:p>
-          <a:p>
-            <a:endParaRPr lang="en-US" dirty="0"/>
-          </a:p>
-          <a:p>
-            <a:pPr marL="0" indent="0">
-              <a:buNone/>
-            </a:pPr>
-            <a:r>
-              <a:rPr lang="en-US" sz="1200" dirty="0" err="1"/>
-              <a:t>dplyr</a:t>
-            </a:r>
-            <a:r>
-              <a:rPr lang="en-US" sz="1200" dirty="0"/>
-              <a:t> -  data selection and cleanup </a:t>
-            </a:r>
-          </a:p>
-          <a:p>
-            <a:pPr marL="0" indent="0">
-              <a:buNone/>
-            </a:pPr>
-            <a:r>
-              <a:rPr lang="en-US" sz="1200" dirty="0"/>
-              <a:t>ggplot2 – popular data viz library</a:t>
-            </a:r>
-          </a:p>
-          <a:p>
-            <a:pPr marL="0" indent="0">
-              <a:buNone/>
-            </a:pPr>
-            <a:r>
-              <a:rPr lang="en-US" sz="1200" dirty="0" err="1"/>
-              <a:t>xlsx</a:t>
-            </a:r>
-            <a:r>
-              <a:rPr lang="en-US" sz="1200" dirty="0"/>
-              <a:t> – </a:t>
-            </a:r>
-            <a:r>
-              <a:rPr lang="en-US" sz="1200" dirty="0" err="1"/>
-              <a:t>workwith</a:t>
-            </a:r>
-            <a:r>
-              <a:rPr lang="en-US" sz="1200" dirty="0"/>
-              <a:t> Excel files</a:t>
-            </a:r>
-          </a:p>
-          <a:p>
-            <a:pPr marL="0" indent="0">
-              <a:buNone/>
-            </a:pPr>
-            <a:r>
-              <a:rPr lang="en-US" sz="1200" dirty="0" err="1"/>
-              <a:t>quantmod</a:t>
-            </a:r>
-            <a:r>
-              <a:rPr lang="en-US" sz="1200" dirty="0"/>
-              <a:t> – financial data</a:t>
-            </a:r>
-          </a:p>
-          <a:p>
-            <a:pPr marL="0" indent="0">
-              <a:buNone/>
-            </a:pPr>
-            <a:r>
-              <a:rPr lang="en-US" sz="1200" dirty="0"/>
-              <a:t>Shiny – web framework</a:t>
-            </a:r>
-          </a:p>
-          <a:p>
-            <a:endParaRPr lang="en-US" dirty="0"/>
-          </a:p>
-          <a:p>
-            <a:endParaRPr lang="en-US" dirty="0"/>
-          </a:p>
-          <a:p>
-            <a:endParaRPr lang="en-US" dirty="0"/>
-          </a:p>
-          <a:p>
-            <a:endParaRPr lang="en-US" dirty="0"/>
-          </a:p>
-          <a:p>
-            <a:endParaRPr lang="en-US" dirty="0"/>
-          </a:p>
-          <a:p>
-            <a:endParaRPr lang="en-US" dirty="0"/>
-          </a:p>
-          <a:p>
+              <a:rPr lang="en-US"/>
+              <a:t>Pre machine learning 2</a:t>
+            </a:r>
             <a:endParaRPr lang="en-US" dirty="0"/>
           </a:p>
         </p:txBody>
@@ -2358,7 +2252,7 @@
     </p:spTree>
     <p:extLst>
       <p:ext uri="{BB962C8B-B14F-4D97-AF65-F5344CB8AC3E}">
-        <p14:creationId xmlns:p14="http://schemas.microsoft.com/office/powerpoint/2010/main" val="3815729161"/>
+        <p14:creationId xmlns:p14="http://schemas.microsoft.com/office/powerpoint/2010/main" val="2029081766"/>
       </p:ext>
     </p:extLst>
   </p:cSld>
@@ -2412,6 +2306,206 @@
           <a:bodyPr/>
           <a:lstStyle/>
           <a:p>
+            <a:endParaRPr lang="en-US" dirty="0"/>
+          </a:p>
+          <a:p>
+            <a:r>
+              <a:rPr lang="en-US" dirty="0"/>
+              <a:t>Over 10k packages</a:t>
+            </a:r>
+          </a:p>
+          <a:p>
+            <a:r>
+              <a:rPr lang="en-US" dirty="0"/>
+              <a:t>https://cran.r-project.org/web/packages/</a:t>
+            </a:r>
+          </a:p>
+          <a:p>
+            <a:endParaRPr lang="en-US" dirty="0"/>
+          </a:p>
+          <a:p>
+            <a:endParaRPr lang="en-US" dirty="0"/>
+          </a:p>
+          <a:p>
+            <a:r>
+              <a:rPr lang="en-US" dirty="0"/>
+              <a:t>https://support.rstudio.com/hc/en-us/articles/201057987-Quick-list-of-useful-R-packages</a:t>
+            </a:r>
+          </a:p>
+          <a:p>
+            <a:endParaRPr lang="en-US" dirty="0"/>
+          </a:p>
+          <a:p>
+            <a:endParaRPr lang="en-US" dirty="0"/>
+          </a:p>
+          <a:p>
+            <a:pPr marL="0" indent="0">
+              <a:buNone/>
+            </a:pPr>
+            <a:r>
+              <a:rPr lang="en-US" sz="1200" dirty="0" err="1"/>
+              <a:t>dplyr</a:t>
+            </a:r>
+            <a:r>
+              <a:rPr lang="en-US" sz="1200" dirty="0"/>
+              <a:t> -  data selection and cleanup </a:t>
+            </a:r>
+          </a:p>
+          <a:p>
+            <a:pPr marL="0" indent="0">
+              <a:buNone/>
+            </a:pPr>
+            <a:r>
+              <a:rPr lang="en-US" sz="1200" dirty="0"/>
+              <a:t>ggplot2 – popular data viz library</a:t>
+            </a:r>
+          </a:p>
+          <a:p>
+            <a:pPr marL="0" indent="0">
+              <a:buNone/>
+            </a:pPr>
+            <a:r>
+              <a:rPr lang="en-US" sz="1200" dirty="0" err="1"/>
+              <a:t>xlsx</a:t>
+            </a:r>
+            <a:r>
+              <a:rPr lang="en-US" sz="1200" dirty="0"/>
+              <a:t> – </a:t>
+            </a:r>
+            <a:r>
+              <a:rPr lang="en-US" sz="1200" dirty="0" err="1"/>
+              <a:t>workwith</a:t>
+            </a:r>
+            <a:r>
+              <a:rPr lang="en-US" sz="1200" dirty="0"/>
+              <a:t> Excel files</a:t>
+            </a:r>
+          </a:p>
+          <a:p>
+            <a:pPr marL="0" indent="0">
+              <a:buNone/>
+            </a:pPr>
+            <a:r>
+              <a:rPr lang="en-US" sz="1200" dirty="0" err="1"/>
+              <a:t>quantmod</a:t>
+            </a:r>
+            <a:r>
+              <a:rPr lang="en-US" sz="1200" dirty="0"/>
+              <a:t> – financial data</a:t>
+            </a:r>
+          </a:p>
+          <a:p>
+            <a:pPr marL="0" indent="0">
+              <a:buNone/>
+            </a:pPr>
+            <a:r>
+              <a:rPr lang="en-US" sz="1200" dirty="0"/>
+              <a:t>Shiny – web framework</a:t>
+            </a:r>
+          </a:p>
+          <a:p>
+            <a:endParaRPr lang="en-US" dirty="0"/>
+          </a:p>
+          <a:p>
+            <a:endParaRPr lang="en-US" dirty="0"/>
+          </a:p>
+          <a:p>
+            <a:endParaRPr lang="en-US" dirty="0"/>
+          </a:p>
+          <a:p>
+            <a:endParaRPr lang="en-US" dirty="0"/>
+          </a:p>
+          <a:p>
+            <a:endParaRPr lang="en-US" dirty="0"/>
+          </a:p>
+          <a:p>
+            <a:endParaRPr lang="en-US" dirty="0"/>
+          </a:p>
+          <a:p>
+            <a:endParaRPr lang="en-US" dirty="0"/>
+          </a:p>
+        </p:txBody>
+      </p:sp>
+      <p:sp>
+        <p:nvSpPr>
+          <p:cNvPr id="4" name="Slide Number Placeholder 3"/>
+          <p:cNvSpPr>
+            <a:spLocks noGrp="1"/>
+          </p:cNvSpPr>
+          <p:nvPr>
+            <p:ph type="sldNum" sz="quarter" idx="10"/>
+          </p:nvPr>
+        </p:nvSpPr>
+        <p:spPr/>
+        <p:txBody>
+          <a:bodyPr/>
+          <a:lstStyle/>
+          <a:p>
+            <a:fld id="{E5A097B1-DDF2-47DB-BEB4-A56B76E0BD07}" type="slidenum">
+              <a:rPr lang="en-US" smtClean="0"/>
+              <a:t>26</a:t>
+            </a:fld>
+            <a:endParaRPr lang="en-US"/>
+          </a:p>
+        </p:txBody>
+      </p:sp>
+    </p:spTree>
+    <p:extLst>
+      <p:ext uri="{BB962C8B-B14F-4D97-AF65-F5344CB8AC3E}">
+        <p14:creationId xmlns:p14="http://schemas.microsoft.com/office/powerpoint/2010/main" val="3815729161"/>
+      </p:ext>
+    </p:extLst>
+  </p:cSld>
+  <p:clrMapOvr>
+    <a:masterClrMapping/>
+  </p:clrMapOvr>
+</p:notes>
+</file>
+
+<file path=ppt/notesSlides/notesSlide24.xml><?xml version="1.0" encoding="utf-8"?>
+<p:notes xmlns:a="http://schemas.openxmlformats.org/drawingml/2006/main" xmlns:r="http://schemas.openxmlformats.org/officeDocument/2006/relationships" xmlns:p="http://schemas.openxmlformats.org/presentationml/2006/main">
+  <p:cSld>
+    <p:spTree>
+      <p:nvGrpSpPr>
+        <p:cNvPr id="1" name=""/>
+        <p:cNvGrpSpPr/>
+        <p:nvPr/>
+      </p:nvGrpSpPr>
+      <p:grpSpPr>
+        <a:xfrm>
+          <a:off x="0" y="0"/>
+          <a:ext cx="0" cy="0"/>
+          <a:chOff x="0" y="0"/>
+          <a:chExt cx="0" cy="0"/>
+        </a:xfrm>
+      </p:grpSpPr>
+      <p:sp>
+        <p:nvSpPr>
+          <p:cNvPr id="2" name="Slide Image Placeholder 1"/>
+          <p:cNvSpPr>
+            <a:spLocks noGrp="1" noRot="1" noChangeAspect="1"/>
+          </p:cNvSpPr>
+          <p:nvPr>
+            <p:ph type="sldImg"/>
+          </p:nvPr>
+        </p:nvSpPr>
+        <p:spPr/>
+      </p:sp>
+      <p:sp>
+        <p:nvSpPr>
+          <p:cNvPr id="3" name="Notes Placeholder 2"/>
+          <p:cNvSpPr>
+            <a:spLocks noGrp="1"/>
+          </p:cNvSpPr>
+          <p:nvPr>
+            <p:ph type="body" idx="1"/>
+          </p:nvPr>
+        </p:nvSpPr>
+        <p:spPr/>
+        <p:txBody>
+          <a:bodyPr/>
+          <a:lstStyle/>
+          <a:p>
             <a:pPr marL="0" indent="0">
               <a:buNone/>
             </a:pPr>
@@ -2573,7 +2667,7 @@
           <a:p>
             <a:fld id="{E5A097B1-DDF2-47DB-BEB4-A56B76E0BD07}" type="slidenum">
               <a:rPr lang="en-US" smtClean="0"/>
-              <a:t>26</a:t>
+              <a:t>27</a:t>
             </a:fld>
             <a:endParaRPr lang="en-US"/>
           </a:p>
@@ -3138,6 +3232,24 @@
               <a:t>If you like money, data is for you. </a:t>
             </a:r>
           </a:p>
+          <a:p>
+            <a:endParaRPr lang="en-US" dirty="0"/>
+          </a:p>
+          <a:p>
+            <a:r>
+              <a:rPr lang="en-US" dirty="0"/>
+              <a:t>--- </a:t>
+            </a:r>
+          </a:p>
+          <a:p>
+            <a:endParaRPr lang="en-US" dirty="0"/>
+          </a:p>
+          <a:p>
+            <a:r>
+              <a:rPr lang="en-US" dirty="0"/>
+              <a:t>“If the service is free, you’re the product.”</a:t>
+            </a:r>
+          </a:p>
         </p:txBody>
       </p:sp>
       <p:sp>
@@ -3237,7 +3349,7 @@
           <a:p>
             <a:r>
               <a:rPr lang="en-US" dirty="0"/>
-              <a:t>Is able to make some scary predictions. </a:t>
+              <a:t>Is able to make some scary predictions. (Minority Report) </a:t>
             </a:r>
           </a:p>
           <a:p>
@@ -3848,7 +3960,7 @@
           <a:p>
             <a:fld id="{0E462D58-24D5-460E-A073-5F56B9E1F7E7}" type="datetimeFigureOut">
               <a:rPr lang="en-US" smtClean="0"/>
-              <a:t>6/15/2017</a:t>
+              <a:t>6/22/2017</a:t>
             </a:fld>
             <a:endParaRPr lang="en-US"/>
           </a:p>
@@ -4016,7 +4128,7 @@
           <a:p>
             <a:fld id="{0E462D58-24D5-460E-A073-5F56B9E1F7E7}" type="datetimeFigureOut">
               <a:rPr lang="en-US" smtClean="0"/>
-              <a:t>6/15/2017</a:t>
+              <a:t>6/22/2017</a:t>
             </a:fld>
             <a:endParaRPr lang="en-US"/>
           </a:p>
@@ -4194,7 +4306,7 @@
           <a:p>
             <a:fld id="{0E462D58-24D5-460E-A073-5F56B9E1F7E7}" type="datetimeFigureOut">
               <a:rPr lang="en-US" smtClean="0"/>
-              <a:t>6/15/2017</a:t>
+              <a:t>6/22/2017</a:t>
             </a:fld>
             <a:endParaRPr lang="en-US"/>
           </a:p>
@@ -4362,7 +4474,7 @@
           <a:p>
             <a:fld id="{0E462D58-24D5-460E-A073-5F56B9E1F7E7}" type="datetimeFigureOut">
               <a:rPr lang="en-US" smtClean="0"/>
-              <a:t>6/15/2017</a:t>
+              <a:t>6/22/2017</a:t>
             </a:fld>
             <a:endParaRPr lang="en-US"/>
           </a:p>
@@ -4607,7 +4719,7 @@
           <a:p>
             <a:fld id="{0E462D58-24D5-460E-A073-5F56B9E1F7E7}" type="datetimeFigureOut">
               <a:rPr lang="en-US" smtClean="0"/>
-              <a:t>6/15/2017</a:t>
+              <a:t>6/22/2017</a:t>
             </a:fld>
             <a:endParaRPr lang="en-US"/>
           </a:p>
@@ -4836,7 +4948,7 @@
           <a:p>
             <a:fld id="{0E462D58-24D5-460E-A073-5F56B9E1F7E7}" type="datetimeFigureOut">
               <a:rPr lang="en-US" smtClean="0"/>
-              <a:t>6/15/2017</a:t>
+              <a:t>6/22/2017</a:t>
             </a:fld>
             <a:endParaRPr lang="en-US"/>
           </a:p>
@@ -5200,7 +5312,7 @@
           <a:p>
             <a:fld id="{0E462D58-24D5-460E-A073-5F56B9E1F7E7}" type="datetimeFigureOut">
               <a:rPr lang="en-US" smtClean="0"/>
-              <a:t>6/15/2017</a:t>
+              <a:t>6/22/2017</a:t>
             </a:fld>
             <a:endParaRPr lang="en-US"/>
           </a:p>
@@ -5317,7 +5429,7 @@
           <a:p>
             <a:fld id="{0E462D58-24D5-460E-A073-5F56B9E1F7E7}" type="datetimeFigureOut">
               <a:rPr lang="en-US" smtClean="0"/>
-              <a:t>6/15/2017</a:t>
+              <a:t>6/22/2017</a:t>
             </a:fld>
             <a:endParaRPr lang="en-US"/>
           </a:p>
@@ -5412,7 +5524,7 @@
           <a:p>
             <a:fld id="{0E462D58-24D5-460E-A073-5F56B9E1F7E7}" type="datetimeFigureOut">
               <a:rPr lang="en-US" smtClean="0"/>
-              <a:t>6/15/2017</a:t>
+              <a:t>6/22/2017</a:t>
             </a:fld>
             <a:endParaRPr lang="en-US"/>
           </a:p>
@@ -5687,7 +5799,7 @@
           <a:p>
             <a:fld id="{0E462D58-24D5-460E-A073-5F56B9E1F7E7}" type="datetimeFigureOut">
               <a:rPr lang="en-US" smtClean="0"/>
-              <a:t>6/15/2017</a:t>
+              <a:t>6/22/2017</a:t>
             </a:fld>
             <a:endParaRPr lang="en-US"/>
           </a:p>
@@ -5939,7 +6051,7 @@
           <a:p>
             <a:fld id="{0E462D58-24D5-460E-A073-5F56B9E1F7E7}" type="datetimeFigureOut">
               <a:rPr lang="en-US" smtClean="0"/>
-              <a:t>6/15/2017</a:t>
+              <a:t>6/22/2017</a:t>
             </a:fld>
             <a:endParaRPr lang="en-US"/>
           </a:p>
@@ -6157,7 +6269,7 @@
           <a:p>
             <a:fld id="{0E462D58-24D5-460E-A073-5F56B9E1F7E7}" type="datetimeFigureOut">
               <a:rPr lang="en-US" smtClean="0"/>
-              <a:t>6/15/2017</a:t>
+              <a:t>6/22/2017</a:t>
             </a:fld>
             <a:endParaRPr lang="en-US" dirty="0"/>
           </a:p>
@@ -7062,6 +7174,119 @@
       </p:grpSpPr>
       <p:sp>
         <p:nvSpPr>
+          <p:cNvPr id="2" name="Title 1">
+            <a:extLst>
+              <a:ext uri="{FF2B5EF4-FFF2-40B4-BE49-F238E27FC236}">
+                <a16:creationId xmlns:a16="http://schemas.microsoft.com/office/drawing/2014/main" id="{EF59E7CF-7118-4CCC-8C04-FD939F2D1D7E}"/>
+              </a:ext>
+            </a:extLst>
+          </p:cNvPr>
+          <p:cNvSpPr>
+            <a:spLocks noGrp="1"/>
+          </p:cNvSpPr>
+          <p:nvPr>
+            <p:ph type="title"/>
+          </p:nvPr>
+        </p:nvSpPr>
+        <p:spPr>
+          <a:xfrm>
+            <a:off x="838200" y="365126"/>
+            <a:ext cx="10515600" cy="626548"/>
+          </a:xfrm>
+        </p:spPr>
+        <p:txBody>
+          <a:bodyPr>
+            <a:normAutofit fontScale="90000"/>
+          </a:bodyPr>
+          <a:lstStyle/>
+          <a:p>
+            <a:pPr algn="ctr"/>
+            <a:r>
+              <a:rPr lang="en-US" dirty="0"/>
+              <a:t>R vs. Other Stats Tools</a:t>
+            </a:r>
+          </a:p>
+        </p:txBody>
+      </p:sp>
+      <p:pic>
+        <p:nvPicPr>
+          <p:cNvPr id="1026" name="Picture 2" descr="https://s3.amazonaws.com/uploads.hipchat.com/34222/2236945/D4W6n8sKdvio46p/upload.png">
+            <a:extLst>
+              <a:ext uri="{FF2B5EF4-FFF2-40B4-BE49-F238E27FC236}">
+                <a16:creationId xmlns:a16="http://schemas.microsoft.com/office/drawing/2014/main" id="{01EF561B-5E53-490E-9DF7-3FC88730532F}"/>
+              </a:ext>
+            </a:extLst>
+          </p:cNvPr>
+          <p:cNvPicPr>
+            <a:picLocks noChangeAspect="1" noChangeArrowheads="1"/>
+          </p:cNvPicPr>
+          <p:nvPr/>
+        </p:nvPicPr>
+        <p:blipFill>
+          <a:blip r:embed="rId3">
+            <a:extLst>
+              <a:ext uri="{28A0092B-C50C-407E-A947-70E740481C1C}">
+                <a14:useLocalDpi xmlns:a14="http://schemas.microsoft.com/office/drawing/2010/main" val="0"/>
+              </a:ext>
+            </a:extLst>
+          </a:blip>
+          <a:srcRect/>
+          <a:stretch>
+            <a:fillRect/>
+          </a:stretch>
+        </p:blipFill>
+        <p:spPr bwMode="auto">
+          <a:xfrm>
+            <a:off x="385763" y="100013"/>
+            <a:ext cx="11420475" cy="6657975"/>
+          </a:xfrm>
+          <a:prstGeom prst="rect">
+            <a:avLst/>
+          </a:prstGeom>
+          <a:noFill/>
+          <a:extLst>
+            <a:ext uri="{909E8E84-426E-40DD-AFC4-6F175D3DCCD1}">
+              <a14:hiddenFill xmlns:a14="http://schemas.microsoft.com/office/drawing/2010/main">
+                <a:solidFill>
+                  <a:srgbClr val="FFFFFF"/>
+                </a:solidFill>
+              </a14:hiddenFill>
+            </a:ext>
+          </a:extLst>
+        </p:spPr>
+      </p:pic>
+    </p:spTree>
+    <p:extLst>
+      <p:ext uri="{BB962C8B-B14F-4D97-AF65-F5344CB8AC3E}">
+        <p14:creationId xmlns:p14="http://schemas.microsoft.com/office/powerpoint/2010/main" val="306598750"/>
+      </p:ext>
+    </p:extLst>
+  </p:cSld>
+  <p:clrMapOvr>
+    <a:masterClrMapping/>
+  </p:clrMapOvr>
+</p:sld>
+</file>
+
+<file path=ppt/slides/slide14.xml><?xml version="1.0" encoding="utf-8"?>
+<p:sld xmlns:a="http://schemas.openxmlformats.org/drawingml/2006/main" xmlns:r="http://schemas.openxmlformats.org/officeDocument/2006/relationships" xmlns:p="http://schemas.openxmlformats.org/presentationml/2006/main">
+  <p:cSld>
+    <p:spTree>
+      <p:nvGrpSpPr>
+        <p:cNvPr id="1" name=""/>
+        <p:cNvGrpSpPr/>
+        <p:nvPr/>
+      </p:nvGrpSpPr>
+      <p:grpSpPr>
+        <a:xfrm>
+          <a:off x="0" y="0"/>
+          <a:ext cx="0" cy="0"/>
+          <a:chOff x="0" y="0"/>
+          <a:chExt cx="0" cy="0"/>
+        </a:xfrm>
+      </p:grpSpPr>
+      <p:sp>
+        <p:nvSpPr>
           <p:cNvPr id="2" name="Title 1"/>
           <p:cNvSpPr>
             <a:spLocks noGrp="1"/>
@@ -7100,7 +7325,7 @@
 </p:sld>
 </file>
 
-<file path=ppt/slides/slide14.xml><?xml version="1.0" encoding="utf-8"?>
+<file path=ppt/slides/slide15.xml><?xml version="1.0" encoding="utf-8"?>
 <p:sld xmlns:a="http://schemas.openxmlformats.org/drawingml/2006/main" xmlns:r="http://schemas.openxmlformats.org/officeDocument/2006/relationships" xmlns:p="http://schemas.openxmlformats.org/presentationml/2006/main">
   <p:cSld>
     <p:spTree>
@@ -7239,7 +7464,7 @@
 </p:sld>
 </file>
 
-<file path=ppt/slides/slide15.xml><?xml version="1.0" encoding="utf-8"?>
+<file path=ppt/slides/slide16.xml><?xml version="1.0" encoding="utf-8"?>
 <p:sld xmlns:a="http://schemas.openxmlformats.org/drawingml/2006/main" xmlns:r="http://schemas.openxmlformats.org/officeDocument/2006/relationships" xmlns:p="http://schemas.openxmlformats.org/presentationml/2006/main">
   <p:cSld>
     <p:spTree>
@@ -7337,7 +7562,7 @@
 </p:sld>
 </file>
 
-<file path=ppt/slides/slide16.xml><?xml version="1.0" encoding="utf-8"?>
+<file path=ppt/slides/slide17.xml><?xml version="1.0" encoding="utf-8"?>
 <p:sld xmlns:a="http://schemas.openxmlformats.org/drawingml/2006/main" xmlns:r="http://schemas.openxmlformats.org/officeDocument/2006/relationships" xmlns:p="http://schemas.openxmlformats.org/presentationml/2006/main">
   <p:cSld>
     <p:spTree>
@@ -7408,117 +7633,6 @@
 </p:sld>
 </file>
 
-<file path=ppt/slides/slide17.xml><?xml version="1.0" encoding="utf-8"?>
-<p:sld xmlns:a="http://schemas.openxmlformats.org/drawingml/2006/main" xmlns:r="http://schemas.openxmlformats.org/officeDocument/2006/relationships" xmlns:p="http://schemas.openxmlformats.org/presentationml/2006/main">
-  <p:cSld>
-    <p:spTree>
-      <p:nvGrpSpPr>
-        <p:cNvPr id="1" name=""/>
-        <p:cNvGrpSpPr/>
-        <p:nvPr/>
-      </p:nvGrpSpPr>
-      <p:grpSpPr>
-        <a:xfrm>
-          <a:off x="0" y="0"/>
-          <a:ext cx="0" cy="0"/>
-          <a:chOff x="0" y="0"/>
-          <a:chExt cx="0" cy="0"/>
-        </a:xfrm>
-      </p:grpSpPr>
-      <p:sp>
-        <p:nvSpPr>
-          <p:cNvPr id="2" name="Title 1"/>
-          <p:cNvSpPr>
-            <a:spLocks noGrp="1"/>
-          </p:cNvSpPr>
-          <p:nvPr>
-            <p:ph type="title"/>
-          </p:nvPr>
-        </p:nvSpPr>
-        <p:spPr/>
-        <p:txBody>
-          <a:bodyPr>
-            <a:normAutofit/>
-          </a:bodyPr>
-          <a:lstStyle/>
-          <a:p>
-            <a:r>
-              <a:rPr lang="en-US" sz="6600" dirty="0"/>
-              <a:t>When to use it?</a:t>
-            </a:r>
-          </a:p>
-        </p:txBody>
-      </p:sp>
-      <p:sp>
-        <p:nvSpPr>
-          <p:cNvPr id="3" name="Content Placeholder 2"/>
-          <p:cNvSpPr>
-            <a:spLocks noGrp="1"/>
-          </p:cNvSpPr>
-          <p:nvPr>
-            <p:ph idx="1"/>
-          </p:nvPr>
-        </p:nvSpPr>
-        <p:spPr/>
-        <p:txBody>
-          <a:bodyPr>
-            <a:normAutofit/>
-          </a:bodyPr>
-          <a:lstStyle/>
-          <a:p>
-            <a:pPr marL="0" indent="0">
-              <a:buNone/>
-            </a:pPr>
-            <a:r>
-              <a:rPr lang="en-US" sz="4400" dirty="0"/>
-              <a:t>Data Exploration</a:t>
-            </a:r>
-          </a:p>
-          <a:p>
-            <a:pPr marL="0" indent="0">
-              <a:buNone/>
-            </a:pPr>
-            <a:endParaRPr lang="en-US" sz="4400" dirty="0"/>
-          </a:p>
-          <a:p>
-            <a:pPr marL="0" indent="0">
-              <a:buNone/>
-            </a:pPr>
-            <a:r>
-              <a:rPr lang="en-US" sz="4400" dirty="0"/>
-              <a:t>Statistical Analysis</a:t>
-            </a:r>
-          </a:p>
-          <a:p>
-            <a:pPr marL="0" indent="0">
-              <a:buNone/>
-            </a:pPr>
-            <a:endParaRPr lang="en-US" sz="4400" dirty="0"/>
-          </a:p>
-          <a:p>
-            <a:pPr marL="0" indent="0">
-              <a:buNone/>
-            </a:pPr>
-            <a:r>
-              <a:rPr lang="en-US" sz="4400" dirty="0"/>
-              <a:t>Data Visualization</a:t>
-            </a:r>
-          </a:p>
-        </p:txBody>
-      </p:sp>
-    </p:spTree>
-    <p:extLst>
-      <p:ext uri="{BB962C8B-B14F-4D97-AF65-F5344CB8AC3E}">
-        <p14:creationId xmlns:p14="http://schemas.microsoft.com/office/powerpoint/2010/main" val="3163846291"/>
-      </p:ext>
-    </p:extLst>
-  </p:cSld>
-  <p:clrMapOvr>
-    <a:masterClrMapping/>
-  </p:clrMapOvr>
-</p:sld>
-</file>
-
 <file path=ppt/slides/slide18.xml><?xml version="1.0" encoding="utf-8"?>
 <p:sld xmlns:a="http://schemas.openxmlformats.org/drawingml/2006/main" xmlns:r="http://schemas.openxmlformats.org/officeDocument/2006/relationships" xmlns:p="http://schemas.openxmlformats.org/presentationml/2006/main">
   <p:cSld>
@@ -7555,7 +7669,7 @@
           <a:p>
             <a:r>
               <a:rPr lang="en-US" sz="6600" dirty="0"/>
-              <a:t>When to not use it?</a:t>
+              <a:t>When to use it?</a:t>
             </a:r>
           </a:p>
         </p:txBody>
@@ -7570,12 +7684,7 @@
             <p:ph idx="1"/>
           </p:nvPr>
         </p:nvSpPr>
-        <p:spPr>
-          <a:xfrm>
-            <a:off x="838200" y="1690688"/>
-            <a:ext cx="10515600" cy="3386679"/>
-          </a:xfrm>
-        </p:spPr>
+        <p:spPr/>
         <p:txBody>
           <a:bodyPr>
             <a:normAutofit/>
@@ -7587,7 +7696,7 @@
             </a:pPr>
             <a:r>
               <a:rPr lang="en-US" sz="4400" dirty="0"/>
-              <a:t>Anything Non-statistical</a:t>
+              <a:t>Data Exploration</a:t>
             </a:r>
           </a:p>
           <a:p>
@@ -7602,7 +7711,7 @@
             </a:pPr>
             <a:r>
               <a:rPr lang="en-US" sz="4400" dirty="0"/>
-              <a:t>Complex applications</a:t>
+              <a:t>Statistical Analysis</a:t>
             </a:r>
           </a:p>
           <a:p>
@@ -7615,14 +7724,17 @@
             <a:pPr marL="0" indent="0">
               <a:buNone/>
             </a:pPr>
-            <a:endParaRPr lang="en-US" sz="4400" dirty="0"/>
+            <a:r>
+              <a:rPr lang="en-US" sz="4400" dirty="0"/>
+              <a:t>Data Visualization</a:t>
+            </a:r>
           </a:p>
         </p:txBody>
       </p:sp>
     </p:spTree>
     <p:extLst>
       <p:ext uri="{BB962C8B-B14F-4D97-AF65-F5344CB8AC3E}">
-        <p14:creationId xmlns:p14="http://schemas.microsoft.com/office/powerpoint/2010/main" val="2981051004"/>
+        <p14:creationId xmlns:p14="http://schemas.microsoft.com/office/powerpoint/2010/main" val="3163846291"/>
       </p:ext>
     </p:extLst>
   </p:cSld>
@@ -7659,27 +7771,83 @@
             <p:ph type="title"/>
           </p:nvPr>
         </p:nvSpPr>
+        <p:spPr/>
+        <p:txBody>
+          <a:bodyPr>
+            <a:normAutofit/>
+          </a:bodyPr>
+          <a:lstStyle/>
+          <a:p>
+            <a:r>
+              <a:rPr lang="en-US" sz="6600" dirty="0"/>
+              <a:t>When to not use it?</a:t>
+            </a:r>
+          </a:p>
+        </p:txBody>
+      </p:sp>
+      <p:sp>
+        <p:nvSpPr>
+          <p:cNvPr id="3" name="Content Placeholder 2"/>
+          <p:cNvSpPr>
+            <a:spLocks noGrp="1"/>
+          </p:cNvSpPr>
+          <p:nvPr>
+            <p:ph idx="1"/>
+          </p:nvPr>
+        </p:nvSpPr>
         <p:spPr>
           <a:xfrm>
-            <a:off x="398362" y="2610613"/>
-            <a:ext cx="10515600" cy="1325563"/>
+            <a:off x="838200" y="1690688"/>
+            <a:ext cx="10515600" cy="3386679"/>
           </a:xfrm>
         </p:spPr>
         <p:txBody>
-          <a:bodyPr/>
-          <a:lstStyle/>
-          <a:p>
-            <a:r>
-              <a:rPr lang="en-US" dirty="0"/>
-              <a:t>R Basics – Demo</a:t>
-            </a:r>
+          <a:bodyPr>
+            <a:normAutofit/>
+          </a:bodyPr>
+          <a:lstStyle/>
+          <a:p>
+            <a:pPr marL="0" indent="0">
+              <a:buNone/>
+            </a:pPr>
+            <a:r>
+              <a:rPr lang="en-US" sz="4400" dirty="0"/>
+              <a:t>Anything Non-statistical</a:t>
+            </a:r>
+          </a:p>
+          <a:p>
+            <a:pPr marL="0" indent="0">
+              <a:buNone/>
+            </a:pPr>
+            <a:endParaRPr lang="en-US" sz="4400" dirty="0"/>
+          </a:p>
+          <a:p>
+            <a:pPr marL="0" indent="0">
+              <a:buNone/>
+            </a:pPr>
+            <a:r>
+              <a:rPr lang="en-US" sz="4400" dirty="0"/>
+              <a:t>Complex applications</a:t>
+            </a:r>
+          </a:p>
+          <a:p>
+            <a:pPr marL="0" indent="0">
+              <a:buNone/>
+            </a:pPr>
+            <a:endParaRPr lang="en-US" sz="4400" dirty="0"/>
+          </a:p>
+          <a:p>
+            <a:pPr marL="0" indent="0">
+              <a:buNone/>
+            </a:pPr>
+            <a:endParaRPr lang="en-US" sz="4400" dirty="0"/>
           </a:p>
         </p:txBody>
       </p:sp>
     </p:spTree>
     <p:extLst>
       <p:ext uri="{BB962C8B-B14F-4D97-AF65-F5344CB8AC3E}">
-        <p14:creationId xmlns:p14="http://schemas.microsoft.com/office/powerpoint/2010/main" val="3521706402"/>
+        <p14:creationId xmlns:p14="http://schemas.microsoft.com/office/powerpoint/2010/main" val="2981051004"/>
       </p:ext>
     </p:extLst>
   </p:cSld>
@@ -7859,6 +8027,63 @@
         </p:nvSpPr>
         <p:spPr>
           <a:xfrm>
+            <a:off x="398362" y="2610613"/>
+            <a:ext cx="10515600" cy="1325563"/>
+          </a:xfrm>
+        </p:spPr>
+        <p:txBody>
+          <a:bodyPr/>
+          <a:lstStyle/>
+          <a:p>
+            <a:r>
+              <a:rPr lang="en-US" dirty="0"/>
+              <a:t>R Basics – Demo</a:t>
+            </a:r>
+          </a:p>
+        </p:txBody>
+      </p:sp>
+    </p:spTree>
+    <p:extLst>
+      <p:ext uri="{BB962C8B-B14F-4D97-AF65-F5344CB8AC3E}">
+        <p14:creationId xmlns:p14="http://schemas.microsoft.com/office/powerpoint/2010/main" val="3521706402"/>
+      </p:ext>
+    </p:extLst>
+  </p:cSld>
+  <p:clrMapOvr>
+    <a:masterClrMapping/>
+  </p:clrMapOvr>
+</p:sld>
+</file>
+
+<file path=ppt/slides/slide21.xml><?xml version="1.0" encoding="utf-8"?>
+<p:sld xmlns:a="http://schemas.openxmlformats.org/drawingml/2006/main" xmlns:r="http://schemas.openxmlformats.org/officeDocument/2006/relationships" xmlns:p="http://schemas.openxmlformats.org/presentationml/2006/main">
+  <p:cSld>
+    <p:spTree>
+      <p:nvGrpSpPr>
+        <p:cNvPr id="1" name=""/>
+        <p:cNvGrpSpPr/>
+        <p:nvPr/>
+      </p:nvGrpSpPr>
+      <p:grpSpPr>
+        <a:xfrm>
+          <a:off x="0" y="0"/>
+          <a:ext cx="0" cy="0"/>
+          <a:chOff x="0" y="0"/>
+          <a:chExt cx="0" cy="0"/>
+        </a:xfrm>
+      </p:grpSpPr>
+      <p:sp>
+        <p:nvSpPr>
+          <p:cNvPr id="2" name="Title 1"/>
+          <p:cNvSpPr>
+            <a:spLocks noGrp="1"/>
+          </p:cNvSpPr>
+          <p:nvPr>
+            <p:ph type="title"/>
+          </p:nvPr>
+        </p:nvSpPr>
+        <p:spPr>
+          <a:xfrm>
             <a:off x="0" y="0"/>
             <a:ext cx="12191999" cy="915535"/>
           </a:xfrm>
@@ -7929,7 +8154,7 @@
 </p:sld>
 </file>
 
-<file path=ppt/slides/slide21.xml><?xml version="1.0" encoding="utf-8"?>
+<file path=ppt/slides/slide22.xml><?xml version="1.0" encoding="utf-8"?>
 <p:sld xmlns:a="http://schemas.openxmlformats.org/drawingml/2006/main" xmlns:r="http://schemas.openxmlformats.org/officeDocument/2006/relationships" xmlns:p="http://schemas.openxmlformats.org/presentationml/2006/main">
   <p:cSld>
     <p:spTree>
@@ -7988,7 +8213,7 @@
 </p:sld>
 </file>
 
-<file path=ppt/slides/slide22.xml><?xml version="1.0" encoding="utf-8"?>
+<file path=ppt/slides/slide23.xml><?xml version="1.0" encoding="utf-8"?>
 <p:sld xmlns:a="http://schemas.openxmlformats.org/drawingml/2006/main" xmlns:r="http://schemas.openxmlformats.org/officeDocument/2006/relationships" xmlns:p="http://schemas.openxmlformats.org/presentationml/2006/main">
   <p:cSld>
     <p:spTree>
@@ -8059,7 +8284,7 @@
 </p:sld>
 </file>
 
-<file path=ppt/slides/slide23.xml><?xml version="1.0" encoding="utf-8"?>
+<file path=ppt/slides/slide24.xml><?xml version="1.0" encoding="utf-8"?>
 <p:sld xmlns:a="http://schemas.openxmlformats.org/drawingml/2006/main" xmlns:r="http://schemas.openxmlformats.org/officeDocument/2006/relationships" xmlns:p="http://schemas.openxmlformats.org/presentationml/2006/main">
   <p:cSld>
     <p:spTree>
@@ -8130,7 +8355,7 @@
 </p:sld>
 </file>
 
-<file path=ppt/slides/slide24.xml><?xml version="1.0" encoding="utf-8"?>
+<file path=ppt/slides/slide25.xml><?xml version="1.0" encoding="utf-8"?>
 <p:sld xmlns:a="http://schemas.openxmlformats.org/drawingml/2006/main" xmlns:r="http://schemas.openxmlformats.org/officeDocument/2006/relationships" xmlns:p="http://schemas.openxmlformats.org/presentationml/2006/main">
   <p:cSld>
     <p:spTree>
@@ -8422,7 +8647,7 @@
 </p:sld>
 </file>
 
-<file path=ppt/slides/slide25.xml><?xml version="1.0" encoding="utf-8"?>
+<file path=ppt/slides/slide26.xml><?xml version="1.0" encoding="utf-8"?>
 <p:sld xmlns:a="http://schemas.openxmlformats.org/drawingml/2006/main" xmlns:r="http://schemas.openxmlformats.org/officeDocument/2006/relationships" xmlns:p="http://schemas.openxmlformats.org/presentationml/2006/main">
   <p:cSld>
     <p:spTree>
@@ -8591,7 +8816,7 @@
 </p:sld>
 </file>
 
-<file path=ppt/slides/slide26.xml><?xml version="1.0" encoding="utf-8"?>
+<file path=ppt/slides/slide27.xml><?xml version="1.0" encoding="utf-8"?>
 <p:sld xmlns:a="http://schemas.openxmlformats.org/drawingml/2006/main" xmlns:r="http://schemas.openxmlformats.org/officeDocument/2006/relationships" xmlns:p="http://schemas.openxmlformats.org/presentationml/2006/main">
   <p:cSld>
     <p:spTree>

</xml_diff>